<commit_message>
Updated powerpoint data slides
</commit_message>
<xml_diff>
--- a/other/Group2_Phase1.pptx
+++ b/other/Group2_Phase1.pptx
@@ -5,22 +5,23 @@
     <p:sldMasterId id="2147483660" r:id="rId1"/>
   </p:sldMasterIdLst>
   <p:notesMasterIdLst>
-    <p:notesMasterId r:id="rId15"/>
+    <p:notesMasterId r:id="rId16"/>
   </p:notesMasterIdLst>
   <p:sldIdLst>
     <p:sldId id="256" r:id="rId2"/>
     <p:sldId id="257" r:id="rId3"/>
     <p:sldId id="264" r:id="rId4"/>
-    <p:sldId id="258" r:id="rId5"/>
-    <p:sldId id="267" r:id="rId6"/>
-    <p:sldId id="263" r:id="rId7"/>
-    <p:sldId id="259" r:id="rId8"/>
-    <p:sldId id="260" r:id="rId9"/>
-    <p:sldId id="268" r:id="rId10"/>
-    <p:sldId id="261" r:id="rId11"/>
-    <p:sldId id="265" r:id="rId12"/>
-    <p:sldId id="266" r:id="rId13"/>
-    <p:sldId id="262" r:id="rId14"/>
+    <p:sldId id="269" r:id="rId5"/>
+    <p:sldId id="258" r:id="rId6"/>
+    <p:sldId id="267" r:id="rId7"/>
+    <p:sldId id="263" r:id="rId8"/>
+    <p:sldId id="259" r:id="rId9"/>
+    <p:sldId id="260" r:id="rId10"/>
+    <p:sldId id="268" r:id="rId11"/>
+    <p:sldId id="261" r:id="rId12"/>
+    <p:sldId id="265" r:id="rId13"/>
+    <p:sldId id="266" r:id="rId14"/>
+    <p:sldId id="262" r:id="rId15"/>
   </p:sldIdLst>
   <p:sldSz cx="12192000" cy="6858000"/>
   <p:notesSz cx="6858000" cy="9144000"/>
@@ -988,7 +989,7 @@
     </p:spTree>
     <p:extLst>
       <p:ext uri="{BB962C8B-B14F-4D97-AF65-F5344CB8AC3E}">
-        <p14:creationId xmlns:p14="http://schemas.microsoft.com/office/powerpoint/2010/main" val="710768679"/>
+        <p14:creationId xmlns:p14="http://schemas.microsoft.com/office/powerpoint/2010/main" val="3148085847"/>
       </p:ext>
     </p:extLst>
   </p:cSld>
@@ -1223,7 +1224,7 @@
     </p:spTree>
     <p:extLst>
       <p:ext uri="{BB962C8B-B14F-4D97-AF65-F5344CB8AC3E}">
-        <p14:creationId xmlns:p14="http://schemas.microsoft.com/office/powerpoint/2010/main" val="2487888159"/>
+        <p14:creationId xmlns:p14="http://schemas.microsoft.com/office/powerpoint/2010/main" val="710768679"/>
       </p:ext>
     </p:extLst>
   </p:cSld>
@@ -1295,28 +1296,78 @@
               <a:defRPr/>
             </a:pPr>
             <a:r>
-              <a:rPr lang="en-US" sz="1200" b="0" i="0" kern="1200" dirty="0" err="1">
-                <a:solidFill>
-                  <a:schemeClr val="tx1"/>
-                </a:solidFill>
-                <a:effectLst/>
-                <a:latin typeface="+mn-lt"/>
-                <a:ea typeface="+mn-ea"/>
-                <a:cs typeface="+mn-cs"/>
-              </a:rPr>
-              <a:t>ConclusionExpectations</a:t>
-            </a:r>
-            <a:r>
-              <a:rPr lang="en-US" sz="1200" b="0" i="0" kern="1200" dirty="0">
-                <a:solidFill>
-                  <a:schemeClr val="tx1"/>
-                </a:solidFill>
-                <a:effectLst/>
-                <a:latin typeface="+mn-lt"/>
-                <a:ea typeface="+mn-ea"/>
-                <a:cs typeface="+mn-cs"/>
-              </a:rPr>
-              <a:t> here are to address the following following in your conclusion (in about 150 words) in a main section by itself:</a:t>
+              <a:rPr lang="en-US" sz="1200" b="0" i="0" kern="1200" dirty="0">
+                <a:solidFill>
+                  <a:schemeClr val="tx1"/>
+                </a:solidFill>
+                <a:effectLst/>
+                <a:latin typeface="+mn-lt"/>
+                <a:ea typeface="+mn-ea"/>
+                <a:cs typeface="+mn-cs"/>
+              </a:rPr>
+              <a:t>This criterion is linked to a Learning Outcome</a:t>
+            </a:r>
+          </a:p>
+          <a:p>
+            <a:pPr marL="0" marR="0" lvl="0" indent="0" algn="l" defTabSz="914400" rtl="0" eaLnBrk="1" fontAlgn="auto" latinLnBrk="0" hangingPunct="1">
+              <a:lnSpc>
+                <a:spcPct val="100000"/>
+              </a:lnSpc>
+              <a:spcBef>
+                <a:spcPts val="0"/>
+              </a:spcBef>
+              <a:spcAft>
+                <a:spcPts val="0"/>
+              </a:spcAft>
+              <a:buClrTx/>
+              <a:buSzTx/>
+              <a:buFontTx/>
+              <a:buNone/>
+              <a:tabLst/>
+              <a:defRPr/>
+            </a:pPr>
+            <a:r>
+              <a:rPr lang="en-US" sz="1200" b="0" i="0" kern="1200" dirty="0">
+                <a:solidFill>
+                  <a:schemeClr val="tx1"/>
+                </a:solidFill>
+                <a:effectLst/>
+                <a:latin typeface="+mn-lt"/>
+                <a:ea typeface="+mn-ea"/>
+                <a:cs typeface="+mn-cs"/>
+              </a:rPr>
+              <a:t>Results and discussion of results</a:t>
+            </a:r>
+          </a:p>
+          <a:p>
+            <a:pPr marL="0" marR="0" lvl="0" indent="0" algn="l" defTabSz="914400" rtl="0" eaLnBrk="1" fontAlgn="auto" latinLnBrk="0" hangingPunct="1">
+              <a:lnSpc>
+                <a:spcPct val="100000"/>
+              </a:lnSpc>
+              <a:spcBef>
+                <a:spcPts val="0"/>
+              </a:spcBef>
+              <a:spcAft>
+                <a:spcPts val="0"/>
+              </a:spcAft>
+              <a:buClrTx/>
+              <a:buSzTx/>
+              <a:buFontTx/>
+              <a:buNone/>
+              <a:tabLst/>
+              <a:defRPr/>
+            </a:pPr>
+            <a:r>
+              <a:rPr lang="en-US" sz="1200" b="0" i="0" kern="1200" dirty="0">
+                <a:solidFill>
+                  <a:schemeClr val="tx1"/>
+                </a:solidFill>
+                <a:effectLst/>
+                <a:latin typeface="+mn-lt"/>
+                <a:ea typeface="+mn-ea"/>
+                <a:cs typeface="+mn-cs"/>
+              </a:rPr>
+              <a:t>Expectations here are to provide the following in sections and subsections:</a:t>
             </a:r>
             <a:br>
               <a:rPr lang="en-US" sz="1200" b="0" i="0" kern="1200" dirty="0">
@@ -1350,143 +1401,31 @@
                 <a:ea typeface="+mn-ea"/>
                 <a:cs typeface="+mn-cs"/>
               </a:rPr>
-              <a:t>-- Restate your project focus explain why it’s important. Make sure that this part of the conclusion is concise and clear.</a:t>
-            </a:r>
-            <a:br>
-              <a:rPr lang="en-US" sz="1200" b="0" i="0" kern="1200" dirty="0">
-                <a:solidFill>
-                  <a:schemeClr val="tx1"/>
-                </a:solidFill>
-                <a:effectLst/>
-                <a:latin typeface="+mn-lt"/>
-                <a:ea typeface="+mn-ea"/>
-                <a:cs typeface="+mn-cs"/>
-              </a:rPr>
-            </a:br>
-            <a:br>
-              <a:rPr lang="en-US" sz="1200" b="0" i="0" kern="1200" dirty="0">
-                <a:solidFill>
-                  <a:schemeClr val="tx1"/>
-                </a:solidFill>
-                <a:effectLst/>
-                <a:latin typeface="+mn-lt"/>
-                <a:ea typeface="+mn-ea"/>
-                <a:cs typeface="+mn-cs"/>
-              </a:rPr>
-            </a:br>
-            <a:r>
-              <a:rPr lang="en-US" sz="1200" b="0" i="0" kern="1200" dirty="0">
-                <a:solidFill>
-                  <a:schemeClr val="tx1"/>
-                </a:solidFill>
-                <a:effectLst/>
-                <a:latin typeface="+mn-lt"/>
-                <a:ea typeface="+mn-ea"/>
-                <a:cs typeface="+mn-cs"/>
-              </a:rPr>
-              <a:t>-- Restate your hypothesis (e.g., ML pipelines with custom features can accurately forecast box office returns)</a:t>
-            </a:r>
-            <a:br>
-              <a:rPr lang="en-US" sz="1200" b="0" i="0" kern="1200" dirty="0">
-                <a:solidFill>
-                  <a:schemeClr val="tx1"/>
-                </a:solidFill>
-                <a:effectLst/>
-                <a:latin typeface="+mn-lt"/>
-                <a:ea typeface="+mn-ea"/>
-                <a:cs typeface="+mn-cs"/>
-              </a:rPr>
-            </a:br>
-            <a:br>
-              <a:rPr lang="en-US" sz="1200" b="0" i="0" kern="1200" dirty="0">
-                <a:solidFill>
-                  <a:schemeClr val="tx1"/>
-                </a:solidFill>
-                <a:effectLst/>
-                <a:latin typeface="+mn-lt"/>
-                <a:ea typeface="+mn-ea"/>
-                <a:cs typeface="+mn-cs"/>
-              </a:rPr>
-            </a:br>
-            <a:r>
-              <a:rPr lang="en-US" sz="1200" b="0" i="0" kern="1200" dirty="0">
-                <a:solidFill>
-                  <a:schemeClr val="tx1"/>
-                </a:solidFill>
-                <a:effectLst/>
-                <a:latin typeface="+mn-lt"/>
-                <a:ea typeface="+mn-ea"/>
-                <a:cs typeface="+mn-cs"/>
-              </a:rPr>
-              <a:t>-- Summarize main points of your project: Remind your readers your key points.</a:t>
-            </a:r>
-            <a:br>
-              <a:rPr lang="en-US" sz="1200" b="0" i="0" kern="1200" dirty="0">
-                <a:solidFill>
-                  <a:schemeClr val="tx1"/>
-                </a:solidFill>
-                <a:effectLst/>
-                <a:latin typeface="+mn-lt"/>
-                <a:ea typeface="+mn-ea"/>
-                <a:cs typeface="+mn-cs"/>
-              </a:rPr>
-            </a:br>
-            <a:br>
-              <a:rPr lang="en-US" sz="1200" b="0" i="0" kern="1200" dirty="0">
-                <a:solidFill>
-                  <a:schemeClr val="tx1"/>
-                </a:solidFill>
-                <a:effectLst/>
-                <a:latin typeface="+mn-lt"/>
-                <a:ea typeface="+mn-ea"/>
-                <a:cs typeface="+mn-cs"/>
-              </a:rPr>
-            </a:br>
-            <a:r>
-              <a:rPr lang="en-US" sz="1200" b="0" i="0" kern="1200" dirty="0">
-                <a:solidFill>
-                  <a:schemeClr val="tx1"/>
-                </a:solidFill>
-                <a:effectLst/>
-                <a:latin typeface="+mn-lt"/>
-                <a:ea typeface="+mn-ea"/>
-                <a:cs typeface="+mn-cs"/>
-              </a:rPr>
-              <a:t>-- Discuss the significance of your results</a:t>
-            </a:r>
-            <a:br>
-              <a:rPr lang="en-US" sz="1200" b="0" i="0" kern="1200" dirty="0">
-                <a:solidFill>
-                  <a:schemeClr val="tx1"/>
-                </a:solidFill>
-                <a:effectLst/>
-                <a:latin typeface="+mn-lt"/>
-                <a:ea typeface="+mn-ea"/>
-                <a:cs typeface="+mn-cs"/>
-              </a:rPr>
-            </a:br>
-            <a:br>
-              <a:rPr lang="en-US" sz="1200" b="0" i="0" kern="1200" dirty="0">
-                <a:solidFill>
-                  <a:schemeClr val="tx1"/>
-                </a:solidFill>
-                <a:effectLst/>
-                <a:latin typeface="+mn-lt"/>
-                <a:ea typeface="+mn-ea"/>
-                <a:cs typeface="+mn-cs"/>
-              </a:rPr>
-            </a:br>
-            <a:r>
-              <a:rPr lang="en-US" sz="1200" b="0" i="0" kern="1200" dirty="0">
-                <a:solidFill>
-                  <a:schemeClr val="tx1"/>
-                </a:solidFill>
-                <a:effectLst/>
-                <a:latin typeface="+mn-lt"/>
-                <a:ea typeface="+mn-ea"/>
-                <a:cs typeface="+mn-cs"/>
-              </a:rPr>
-              <a:t>-- Discuss the future of your project and closing thoughts.</a:t>
+              <a:t>Discussion’s aim is result interpretation, which means explain, </a:t>
+            </a:r>
+            <a:r>
+              <a:rPr lang="en-US" sz="1200" b="0" i="0" kern="1200" dirty="0" err="1">
+                <a:solidFill>
+                  <a:schemeClr val="tx1"/>
+                </a:solidFill>
+                <a:effectLst/>
+                <a:latin typeface="+mn-lt"/>
+                <a:ea typeface="+mn-ea"/>
+                <a:cs typeface="+mn-cs"/>
+              </a:rPr>
+              <a:t>analyse</a:t>
+            </a:r>
+            <a:r>
+              <a:rPr lang="en-US" sz="1200" b="0" i="0" kern="1200" dirty="0">
+                <a:solidFill>
+                  <a:schemeClr val="tx1"/>
+                </a:solidFill>
+                <a:effectLst/>
+                <a:latin typeface="+mn-lt"/>
+                <a:ea typeface="+mn-ea"/>
+                <a:cs typeface="+mn-cs"/>
+              </a:rPr>
+              <a:t>, and compare them. Often, this part is the most important, simply because it lets the researcher take a step back and give a broader look at the experiment. Do not discuss any outcomes not presented in the results part.</a:t>
             </a:r>
           </a:p>
           <a:p>
@@ -1512,6 +1451,303 @@
             <a:fld id="{25E2E259-F0C1-274B-BB83-2518BC0EEFC9}" type="slidenum">
               <a:rPr lang="en-US" smtClean="0"/>
               <a:t>13</a:t>
+            </a:fld>
+            <a:endParaRPr lang="en-US"/>
+          </a:p>
+        </p:txBody>
+      </p:sp>
+    </p:spTree>
+    <p:extLst>
+      <p:ext uri="{BB962C8B-B14F-4D97-AF65-F5344CB8AC3E}">
+        <p14:creationId xmlns:p14="http://schemas.microsoft.com/office/powerpoint/2010/main" val="2487888159"/>
+      </p:ext>
+    </p:extLst>
+  </p:cSld>
+  <p:clrMapOvr>
+    <a:masterClrMapping/>
+  </p:clrMapOvr>
+</p:notes>
+</file>
+
+<file path=ppt/notesSlides/notesSlide13.xml><?xml version="1.0" encoding="utf-8"?>
+<p:notes xmlns:a="http://schemas.openxmlformats.org/drawingml/2006/main" xmlns:r="http://schemas.openxmlformats.org/officeDocument/2006/relationships" xmlns:p="http://schemas.openxmlformats.org/presentationml/2006/main">
+  <p:cSld>
+    <p:spTree>
+      <p:nvGrpSpPr>
+        <p:cNvPr id="1" name=""/>
+        <p:cNvGrpSpPr/>
+        <p:nvPr/>
+      </p:nvGrpSpPr>
+      <p:grpSpPr>
+        <a:xfrm>
+          <a:off x="0" y="0"/>
+          <a:ext cx="0" cy="0"/>
+          <a:chOff x="0" y="0"/>
+          <a:chExt cx="0" cy="0"/>
+        </a:xfrm>
+      </p:grpSpPr>
+      <p:sp>
+        <p:nvSpPr>
+          <p:cNvPr id="2" name="Slide Image Placeholder 1"/>
+          <p:cNvSpPr>
+            <a:spLocks noGrp="1" noRot="1" noChangeAspect="1"/>
+          </p:cNvSpPr>
+          <p:nvPr>
+            <p:ph type="sldImg"/>
+          </p:nvPr>
+        </p:nvSpPr>
+        <p:spPr/>
+      </p:sp>
+      <p:sp>
+        <p:nvSpPr>
+          <p:cNvPr id="3" name="Notes Placeholder 2"/>
+          <p:cNvSpPr>
+            <a:spLocks noGrp="1"/>
+          </p:cNvSpPr>
+          <p:nvPr>
+            <p:ph type="body" idx="1"/>
+          </p:nvPr>
+        </p:nvSpPr>
+        <p:spPr/>
+        <p:txBody>
+          <a:bodyPr/>
+          <a:lstStyle/>
+          <a:p>
+            <a:pPr marL="0" marR="0" lvl="0" indent="0" algn="l" defTabSz="914400" rtl="0" eaLnBrk="1" fontAlgn="auto" latinLnBrk="0" hangingPunct="1">
+              <a:lnSpc>
+                <a:spcPct val="100000"/>
+              </a:lnSpc>
+              <a:spcBef>
+                <a:spcPts val="0"/>
+              </a:spcBef>
+              <a:spcAft>
+                <a:spcPts val="0"/>
+              </a:spcAft>
+              <a:buClrTx/>
+              <a:buSzTx/>
+              <a:buFontTx/>
+              <a:buNone/>
+              <a:tabLst/>
+              <a:defRPr/>
+            </a:pPr>
+            <a:r>
+              <a:rPr lang="en-US" sz="1200" b="0" i="0" kern="1200" dirty="0" err="1">
+                <a:solidFill>
+                  <a:schemeClr val="tx1"/>
+                </a:solidFill>
+                <a:effectLst/>
+                <a:latin typeface="+mn-lt"/>
+                <a:ea typeface="+mn-ea"/>
+                <a:cs typeface="+mn-cs"/>
+              </a:rPr>
+              <a:t>ConclusionExpectations</a:t>
+            </a:r>
+            <a:r>
+              <a:rPr lang="en-US" sz="1200" b="0" i="0" kern="1200" dirty="0">
+                <a:solidFill>
+                  <a:schemeClr val="tx1"/>
+                </a:solidFill>
+                <a:effectLst/>
+                <a:latin typeface="+mn-lt"/>
+                <a:ea typeface="+mn-ea"/>
+                <a:cs typeface="+mn-cs"/>
+              </a:rPr>
+              <a:t> here are to address the following following in your conclusion (in about 150 words) in a main section by itself:</a:t>
+            </a:r>
+            <a:br>
+              <a:rPr lang="en-US" sz="1200" b="0" i="0" kern="1200" dirty="0">
+                <a:solidFill>
+                  <a:schemeClr val="tx1"/>
+                </a:solidFill>
+                <a:effectLst/>
+                <a:latin typeface="+mn-lt"/>
+                <a:ea typeface="+mn-ea"/>
+                <a:cs typeface="+mn-cs"/>
+              </a:rPr>
+            </a:br>
+            <a:br>
+              <a:rPr lang="en-US" sz="1200" b="0" i="0" kern="1200" dirty="0">
+                <a:solidFill>
+                  <a:schemeClr val="tx1"/>
+                </a:solidFill>
+                <a:effectLst/>
+                <a:latin typeface="+mn-lt"/>
+                <a:ea typeface="+mn-ea"/>
+                <a:cs typeface="+mn-cs"/>
+              </a:rPr>
+            </a:br>
+            <a:r>
+              <a:rPr lang="en-US" sz="1200" b="0" i="0" kern="1200" dirty="0">
+                <a:solidFill>
+                  <a:schemeClr val="tx1"/>
+                </a:solidFill>
+                <a:effectLst/>
+                <a:latin typeface="+mn-lt"/>
+                <a:ea typeface="+mn-ea"/>
+                <a:cs typeface="+mn-cs"/>
+              </a:rPr>
+              <a:t>-- Restate your project focus explain why it’s important. Make sure that this part of the conclusion is concise and clear.</a:t>
+            </a:r>
+            <a:br>
+              <a:rPr lang="en-US" sz="1200" b="0" i="0" kern="1200" dirty="0">
+                <a:solidFill>
+                  <a:schemeClr val="tx1"/>
+                </a:solidFill>
+                <a:effectLst/>
+                <a:latin typeface="+mn-lt"/>
+                <a:ea typeface="+mn-ea"/>
+                <a:cs typeface="+mn-cs"/>
+              </a:rPr>
+            </a:br>
+            <a:br>
+              <a:rPr lang="en-US" sz="1200" b="0" i="0" kern="1200" dirty="0">
+                <a:solidFill>
+                  <a:schemeClr val="tx1"/>
+                </a:solidFill>
+                <a:effectLst/>
+                <a:latin typeface="+mn-lt"/>
+                <a:ea typeface="+mn-ea"/>
+                <a:cs typeface="+mn-cs"/>
+              </a:rPr>
+            </a:br>
+            <a:r>
+              <a:rPr lang="en-US" sz="1200" b="0" i="0" kern="1200" dirty="0">
+                <a:solidFill>
+                  <a:schemeClr val="tx1"/>
+                </a:solidFill>
+                <a:effectLst/>
+                <a:latin typeface="+mn-lt"/>
+                <a:ea typeface="+mn-ea"/>
+                <a:cs typeface="+mn-cs"/>
+              </a:rPr>
+              <a:t>-- Restate your hypothesis (e.g., ML pipelines with custom features can accurately forecast box office returns)</a:t>
+            </a:r>
+            <a:br>
+              <a:rPr lang="en-US" sz="1200" b="0" i="0" kern="1200" dirty="0">
+                <a:solidFill>
+                  <a:schemeClr val="tx1"/>
+                </a:solidFill>
+                <a:effectLst/>
+                <a:latin typeface="+mn-lt"/>
+                <a:ea typeface="+mn-ea"/>
+                <a:cs typeface="+mn-cs"/>
+              </a:rPr>
+            </a:br>
+            <a:br>
+              <a:rPr lang="en-US" sz="1200" b="0" i="0" kern="1200" dirty="0">
+                <a:solidFill>
+                  <a:schemeClr val="tx1"/>
+                </a:solidFill>
+                <a:effectLst/>
+                <a:latin typeface="+mn-lt"/>
+                <a:ea typeface="+mn-ea"/>
+                <a:cs typeface="+mn-cs"/>
+              </a:rPr>
+            </a:br>
+            <a:r>
+              <a:rPr lang="en-US" sz="1200" b="0" i="0" kern="1200" dirty="0">
+                <a:solidFill>
+                  <a:schemeClr val="tx1"/>
+                </a:solidFill>
+                <a:effectLst/>
+                <a:latin typeface="+mn-lt"/>
+                <a:ea typeface="+mn-ea"/>
+                <a:cs typeface="+mn-cs"/>
+              </a:rPr>
+              <a:t>-- Summarize main points of your project: Remind your readers your key points.</a:t>
+            </a:r>
+            <a:br>
+              <a:rPr lang="en-US" sz="1200" b="0" i="0" kern="1200" dirty="0">
+                <a:solidFill>
+                  <a:schemeClr val="tx1"/>
+                </a:solidFill>
+                <a:effectLst/>
+                <a:latin typeface="+mn-lt"/>
+                <a:ea typeface="+mn-ea"/>
+                <a:cs typeface="+mn-cs"/>
+              </a:rPr>
+            </a:br>
+            <a:br>
+              <a:rPr lang="en-US" sz="1200" b="0" i="0" kern="1200" dirty="0">
+                <a:solidFill>
+                  <a:schemeClr val="tx1"/>
+                </a:solidFill>
+                <a:effectLst/>
+                <a:latin typeface="+mn-lt"/>
+                <a:ea typeface="+mn-ea"/>
+                <a:cs typeface="+mn-cs"/>
+              </a:rPr>
+            </a:br>
+            <a:r>
+              <a:rPr lang="en-US" sz="1200" b="0" i="0" kern="1200" dirty="0">
+                <a:solidFill>
+                  <a:schemeClr val="tx1"/>
+                </a:solidFill>
+                <a:effectLst/>
+                <a:latin typeface="+mn-lt"/>
+                <a:ea typeface="+mn-ea"/>
+                <a:cs typeface="+mn-cs"/>
+              </a:rPr>
+              <a:t>-- Discuss the significance of your results</a:t>
+            </a:r>
+            <a:br>
+              <a:rPr lang="en-US" sz="1200" b="0" i="0" kern="1200" dirty="0">
+                <a:solidFill>
+                  <a:schemeClr val="tx1"/>
+                </a:solidFill>
+                <a:effectLst/>
+                <a:latin typeface="+mn-lt"/>
+                <a:ea typeface="+mn-ea"/>
+                <a:cs typeface="+mn-cs"/>
+              </a:rPr>
+            </a:br>
+            <a:br>
+              <a:rPr lang="en-US" sz="1200" b="0" i="0" kern="1200" dirty="0">
+                <a:solidFill>
+                  <a:schemeClr val="tx1"/>
+                </a:solidFill>
+                <a:effectLst/>
+                <a:latin typeface="+mn-lt"/>
+                <a:ea typeface="+mn-ea"/>
+                <a:cs typeface="+mn-cs"/>
+              </a:rPr>
+            </a:br>
+            <a:r>
+              <a:rPr lang="en-US" sz="1200" b="0" i="0" kern="1200" dirty="0">
+                <a:solidFill>
+                  <a:schemeClr val="tx1"/>
+                </a:solidFill>
+                <a:effectLst/>
+                <a:latin typeface="+mn-lt"/>
+                <a:ea typeface="+mn-ea"/>
+                <a:cs typeface="+mn-cs"/>
+              </a:rPr>
+              <a:t>-- Discuss the future of your project and closing thoughts.</a:t>
+            </a:r>
+          </a:p>
+          <a:p>
+            <a:endParaRPr lang="en-US" dirty="0"/>
+          </a:p>
+        </p:txBody>
+      </p:sp>
+      <p:sp>
+        <p:nvSpPr>
+          <p:cNvPr id="4" name="Slide Number Placeholder 3"/>
+          <p:cNvSpPr>
+            <a:spLocks noGrp="1"/>
+          </p:cNvSpPr>
+          <p:nvPr>
+            <p:ph type="sldNum" sz="quarter" idx="5"/>
+          </p:nvPr>
+        </p:nvSpPr>
+        <p:spPr/>
+        <p:txBody>
+          <a:bodyPr/>
+          <a:lstStyle/>
+          <a:p>
+            <a:fld id="{25E2E259-F0C1-274B-BB83-2518BC0EEFC9}" type="slidenum">
+              <a:rPr lang="en-US" smtClean="0"/>
+              <a:t>14</a:t>
             </a:fld>
             <a:endParaRPr lang="en-US"/>
           </a:p>
@@ -2590,7 +2826,7 @@
     </p:spTree>
     <p:extLst>
       <p:ext uri="{BB962C8B-B14F-4D97-AF65-F5344CB8AC3E}">
-        <p14:creationId xmlns:p14="http://schemas.microsoft.com/office/powerpoint/2010/main" val="978033684"/>
+        <p14:creationId xmlns:p14="http://schemas.microsoft.com/office/powerpoint/2010/main" val="3625870038"/>
       </p:ext>
     </p:extLst>
   </p:cSld>
@@ -2829,7 +3065,7 @@
     </p:spTree>
     <p:extLst>
       <p:ext uri="{BB962C8B-B14F-4D97-AF65-F5344CB8AC3E}">
-        <p14:creationId xmlns:p14="http://schemas.microsoft.com/office/powerpoint/2010/main" val="3310434117"/>
+        <p14:creationId xmlns:p14="http://schemas.microsoft.com/office/powerpoint/2010/main" val="978033684"/>
       </p:ext>
     </p:extLst>
   </p:cSld>
@@ -2883,9 +3119,6 @@
           <a:bodyPr/>
           <a:lstStyle/>
           <a:p>
-            <a:endParaRPr lang="en-US" dirty="0"/>
-          </a:p>
-          <a:p>
             <a:pPr marL="0" marR="0" lvl="0" indent="0" algn="l" defTabSz="914400" rtl="0" eaLnBrk="1" fontAlgn="auto" latinLnBrk="0" hangingPunct="1">
               <a:lnSpc>
                 <a:spcPct val="100000"/>
@@ -2913,83 +3146,7 @@
                 <a:ea typeface="+mn-ea"/>
                 <a:cs typeface="+mn-cs"/>
               </a:rPr>
-              <a:t>This criterion is linked to a Learning Outcome</a:t>
-            </a:r>
-          </a:p>
-          <a:p>
-            <a:pPr marL="0" marR="0" lvl="0" indent="0" algn="l" defTabSz="914400" rtl="0" eaLnBrk="1" fontAlgn="auto" latinLnBrk="0" hangingPunct="1">
-              <a:lnSpc>
-                <a:spcPct val="100000"/>
-              </a:lnSpc>
-              <a:spcBef>
-                <a:spcPts val="0"/>
-              </a:spcBef>
-              <a:spcAft>
-                <a:spcPts val="0"/>
-              </a:spcAft>
-              <a:buClrTx/>
-              <a:buSzTx/>
-              <a:buFontTx/>
-              <a:buNone/>
-              <a:tabLst/>
-              <a:defRPr/>
-            </a:pPr>
-            <a:r>
-              <a:rPr lang="en-US" sz="1200" b="0" i="0" kern="1200" dirty="0">
-                <a:solidFill>
-                  <a:schemeClr val="tx1"/>
-                </a:solidFill>
-                <a:effectLst/>
-                <a:latin typeface="+mn-lt"/>
-                <a:ea typeface="+mn-ea"/>
-                <a:cs typeface="+mn-cs"/>
-              </a:rPr>
-              <a:t>EDA</a:t>
-            </a:r>
-          </a:p>
-          <a:p>
-            <a:pPr marL="0" marR="0" lvl="0" indent="0" algn="l" defTabSz="914400" rtl="0" eaLnBrk="1" fontAlgn="auto" latinLnBrk="0" hangingPunct="1">
-              <a:lnSpc>
-                <a:spcPct val="100000"/>
-              </a:lnSpc>
-              <a:spcBef>
-                <a:spcPts val="0"/>
-              </a:spcBef>
-              <a:spcAft>
-                <a:spcPts val="0"/>
-              </a:spcAft>
-              <a:buClrTx/>
-              <a:buSzTx/>
-              <a:buFontTx/>
-              <a:buNone/>
-              <a:tabLst/>
-              <a:defRPr/>
-            </a:pPr>
-            <a:r>
-              <a:rPr lang="en-US" sz="1200" b="0" i="0" kern="1200" dirty="0">
-                <a:solidFill>
-                  <a:schemeClr val="tx1"/>
-                </a:solidFill>
-                <a:effectLst/>
-                <a:latin typeface="+mn-lt"/>
-                <a:ea typeface="+mn-ea"/>
-                <a:cs typeface="+mn-cs"/>
-              </a:rPr>
-              <a:t>Expectations here are to provide the following in sections and subsections:</a:t>
-            </a:r>
-          </a:p>
-          <a:p>
-            <a:r>
-              <a:rPr lang="en-US" sz="1200" b="0" i="0" kern="1200" dirty="0">
-                <a:solidFill>
-                  <a:schemeClr val="tx1"/>
-                </a:solidFill>
-                <a:effectLst/>
-                <a:latin typeface="+mn-lt"/>
-                <a:ea typeface="+mn-ea"/>
-                <a:cs typeface="+mn-cs"/>
-              </a:rPr>
-              <a:t>[</a:t>
+              <a:t>This criterion is linked to a Learning </a:t>
             </a:r>
             <a:r>
               <a:rPr lang="en-US" sz="1200" b="0" i="0" kern="1200" dirty="0" err="1">
@@ -3001,37 +3158,41 @@
                 <a:ea typeface="+mn-ea"/>
                 <a:cs typeface="+mn-cs"/>
               </a:rPr>
-              <a:t>CaDoD</a:t>
-            </a:r>
-            <a:r>
-              <a:rPr lang="en-US" sz="1200" b="0" i="0" kern="1200" dirty="0">
-                <a:solidFill>
-                  <a:schemeClr val="tx1"/>
-                </a:solidFill>
-                <a:effectLst/>
-                <a:latin typeface="+mn-lt"/>
-                <a:ea typeface="+mn-ea"/>
-                <a:cs typeface="+mn-cs"/>
-              </a:rPr>
-              <a:t>]</a:t>
+              <a:t>OutcomeProject</a:t>
+            </a:r>
+            <a:r>
+              <a:rPr lang="en-US" sz="1200" b="0" i="0" kern="1200" dirty="0">
+                <a:solidFill>
+                  <a:schemeClr val="tx1"/>
+                </a:solidFill>
+                <a:effectLst/>
+                <a:latin typeface="+mn-lt"/>
+                <a:ea typeface="+mn-ea"/>
+                <a:cs typeface="+mn-cs"/>
+              </a:rPr>
+              <a:t> Description (data and tasks)Expectations here are to provide the following in sections and subsections:</a:t>
             </a:r>
             <a:br>
-              <a:rPr lang="en-US" dirty="0"/>
+              <a:rPr lang="en-US" sz="1200" b="0" i="0" kern="1200" dirty="0">
+                <a:solidFill>
+                  <a:schemeClr val="tx1"/>
+                </a:solidFill>
+                <a:effectLst/>
+                <a:latin typeface="+mn-lt"/>
+                <a:ea typeface="+mn-ea"/>
+                <a:cs typeface="+mn-cs"/>
+              </a:rPr>
             </a:br>
-            <a:r>
-              <a:rPr lang="en-US" sz="1200" b="0" i="0" kern="1200" dirty="0">
-                <a:solidFill>
-                  <a:schemeClr val="tx1"/>
-                </a:solidFill>
-                <a:effectLst/>
-                <a:latin typeface="+mn-lt"/>
-                <a:ea typeface="+mn-ea"/>
-                <a:cs typeface="+mn-cs"/>
-              </a:rPr>
-              <a:t>-- Overview of images (i.e. count of cat images, dog images, total images, memory size of images, etc..)</a:t>
-            </a:r>
             <a:br>
-              <a:rPr lang="en-US" dirty="0"/>
+              <a:rPr lang="en-US" sz="1200" b="0" i="0" kern="1200" dirty="0">
+                <a:solidFill>
+                  <a:schemeClr val="tx1"/>
+                </a:solidFill>
+                <a:effectLst/>
+                <a:latin typeface="+mn-lt"/>
+                <a:ea typeface="+mn-ea"/>
+                <a:cs typeface="+mn-cs"/>
+              </a:rPr>
             </a:br>
             <a:r>
               <a:rPr lang="en-US" sz="1200" b="0" i="0" kern="1200" dirty="0">
@@ -3043,163 +3204,18 @@
                 <a:ea typeface="+mn-ea"/>
                 <a:cs typeface="+mn-cs"/>
               </a:rPr>
-              <a:t>-- Other useful text-based analysis (as opposed to graphic-based)</a:t>
-            </a:r>
-          </a:p>
-          <a:p>
-            <a:endParaRPr lang="en-US" sz="1200" b="0" i="0" kern="1200" dirty="0">
-              <a:solidFill>
-                <a:schemeClr val="tx1"/>
-              </a:solidFill>
-              <a:effectLst/>
-              <a:latin typeface="+mn-lt"/>
-              <a:ea typeface="+mn-ea"/>
-              <a:cs typeface="+mn-cs"/>
-            </a:endParaRPr>
-          </a:p>
-          <a:p>
-            <a:endParaRPr lang="en-US" sz="1200" b="0" i="0" kern="1200" dirty="0">
-              <a:solidFill>
-                <a:schemeClr val="tx1"/>
-              </a:solidFill>
-              <a:effectLst/>
-              <a:latin typeface="+mn-lt"/>
-              <a:ea typeface="+mn-ea"/>
-              <a:cs typeface="+mn-cs"/>
-            </a:endParaRPr>
-          </a:p>
-          <a:p>
-            <a:pPr marL="0" marR="0" lvl="0" indent="0" algn="l" defTabSz="914400" rtl="0" eaLnBrk="1" fontAlgn="auto" latinLnBrk="0" hangingPunct="1">
-              <a:lnSpc>
-                <a:spcPct val="100000"/>
-              </a:lnSpc>
-              <a:spcBef>
-                <a:spcPts val="0"/>
-              </a:spcBef>
-              <a:spcAft>
-                <a:spcPts val="0"/>
-              </a:spcAft>
-              <a:buClrTx/>
-              <a:buSzTx/>
-              <a:buFontTx/>
-              <a:buNone/>
-              <a:tabLst/>
-              <a:defRPr/>
-            </a:pPr>
-            <a:r>
-              <a:rPr lang="en-US" sz="1200" b="0" i="0" kern="1200" dirty="0">
-                <a:solidFill>
-                  <a:schemeClr val="tx1"/>
-                </a:solidFill>
-                <a:effectLst/>
-                <a:latin typeface="+mn-lt"/>
-                <a:ea typeface="+mn-ea"/>
-                <a:cs typeface="+mn-cs"/>
-              </a:rPr>
-              <a:t>This criterion is linked to a Learning Outcome</a:t>
-            </a:r>
-          </a:p>
-          <a:p>
-            <a:pPr marL="0" marR="0" lvl="0" indent="0" algn="l" defTabSz="914400" rtl="0" eaLnBrk="1" fontAlgn="auto" latinLnBrk="0" hangingPunct="1">
-              <a:lnSpc>
-                <a:spcPct val="100000"/>
-              </a:lnSpc>
-              <a:spcBef>
-                <a:spcPts val="0"/>
-              </a:spcBef>
-              <a:spcAft>
-                <a:spcPts val="0"/>
-              </a:spcAft>
-              <a:buClrTx/>
-              <a:buSzTx/>
-              <a:buFontTx/>
-              <a:buNone/>
-              <a:tabLst/>
-              <a:defRPr/>
-            </a:pPr>
-            <a:r>
-              <a:rPr lang="en-US" sz="1200" b="0" i="0" kern="1200" dirty="0">
-                <a:solidFill>
-                  <a:schemeClr val="tx1"/>
-                </a:solidFill>
-                <a:effectLst/>
-                <a:latin typeface="+mn-lt"/>
-                <a:ea typeface="+mn-ea"/>
-                <a:cs typeface="+mn-cs"/>
-              </a:rPr>
-              <a:t>Visual EDA</a:t>
-            </a:r>
-          </a:p>
-          <a:p>
-            <a:pPr marL="0" marR="0" lvl="0" indent="0" algn="l" defTabSz="914400" rtl="0" eaLnBrk="1" fontAlgn="auto" latinLnBrk="0" hangingPunct="1">
-              <a:lnSpc>
-                <a:spcPct val="100000"/>
-              </a:lnSpc>
-              <a:spcBef>
-                <a:spcPts val="0"/>
-              </a:spcBef>
-              <a:spcAft>
-                <a:spcPts val="0"/>
-              </a:spcAft>
-              <a:buClrTx/>
-              <a:buSzTx/>
-              <a:buFontTx/>
-              <a:buNone/>
-              <a:tabLst/>
-              <a:defRPr/>
-            </a:pPr>
-            <a:r>
-              <a:rPr lang="en-US" sz="1200" b="0" i="0" kern="1200" dirty="0">
-                <a:solidFill>
-                  <a:schemeClr val="tx1"/>
-                </a:solidFill>
-                <a:effectLst/>
-                <a:latin typeface="+mn-lt"/>
-                <a:ea typeface="+mn-ea"/>
-                <a:cs typeface="+mn-cs"/>
-              </a:rPr>
-              <a:t>Expectations here are to provide the following in sections and subsections:</a:t>
-            </a:r>
-          </a:p>
-          <a:p>
-            <a:r>
-              <a:rPr lang="en-US" sz="1200" b="0" i="0" kern="1200" dirty="0">
-                <a:solidFill>
-                  <a:schemeClr val="tx1"/>
-                </a:solidFill>
-                <a:effectLst/>
-                <a:latin typeface="+mn-lt"/>
-                <a:ea typeface="+mn-ea"/>
-                <a:cs typeface="+mn-cs"/>
-              </a:rPr>
-              <a:t>[</a:t>
-            </a:r>
-            <a:r>
-              <a:rPr lang="en-US" sz="1200" b="0" i="0" kern="1200" dirty="0" err="1">
-                <a:solidFill>
-                  <a:schemeClr val="tx1"/>
-                </a:solidFill>
-                <a:effectLst/>
-                <a:latin typeface="+mn-lt"/>
-                <a:ea typeface="+mn-ea"/>
-                <a:cs typeface="+mn-cs"/>
-              </a:rPr>
-              <a:t>CaDoD</a:t>
-            </a:r>
-            <a:r>
-              <a:rPr lang="en-US" sz="1200" b="0" i="0" kern="1200" dirty="0">
-                <a:solidFill>
-                  <a:schemeClr val="tx1"/>
-                </a:solidFill>
-                <a:effectLst/>
-                <a:latin typeface="+mn-lt"/>
-                <a:ea typeface="+mn-ea"/>
-                <a:cs typeface="+mn-cs"/>
-              </a:rPr>
-              <a:t>]</a:t>
+              <a:t>Description of the data and task at hand</a:t>
             </a:r>
             <a:br>
-              <a:rPr lang="en-US" dirty="0"/>
+              <a:rPr lang="en-US" sz="1200" b="0" i="0" kern="1200" dirty="0">
+                <a:solidFill>
+                  <a:schemeClr val="tx1"/>
+                </a:solidFill>
+                <a:effectLst/>
+                <a:latin typeface="+mn-lt"/>
+                <a:ea typeface="+mn-ea"/>
+                <a:cs typeface="+mn-cs"/>
+              </a:rPr>
             </a:br>
             <a:r>
               <a:rPr lang="en-US" sz="1200" b="0" i="0" kern="1200" dirty="0">
@@ -3211,9 +3227,54 @@
                 <a:ea typeface="+mn-ea"/>
                 <a:cs typeface="+mn-cs"/>
               </a:rPr>
-              <a:t>-- preview and a small sample of images before and after transformations</a:t>
-            </a:r>
-            <a:endParaRPr lang="en-US" dirty="0"/>
+              <a:t>--Data description</a:t>
+            </a:r>
+            <a:br>
+              <a:rPr lang="en-US" sz="1200" b="0" i="0" kern="1200" dirty="0">
+                <a:solidFill>
+                  <a:schemeClr val="tx1"/>
+                </a:solidFill>
+                <a:effectLst/>
+                <a:latin typeface="+mn-lt"/>
+                <a:ea typeface="+mn-ea"/>
+                <a:cs typeface="+mn-cs"/>
+              </a:rPr>
+            </a:br>
+            <a:r>
+              <a:rPr lang="en-US" sz="1200" b="0" i="0" kern="1200" dirty="0">
+                <a:solidFill>
+                  <a:schemeClr val="tx1"/>
+                </a:solidFill>
+                <a:effectLst/>
+                <a:latin typeface="+mn-lt"/>
+                <a:ea typeface="+mn-ea"/>
+                <a:cs typeface="+mn-cs"/>
+              </a:rPr>
+              <a:t>--Task to be tackled</a:t>
+            </a:r>
+            <a:br>
+              <a:rPr lang="en-US" sz="1200" b="0" i="0" kern="1200" dirty="0">
+                <a:solidFill>
+                  <a:schemeClr val="tx1"/>
+                </a:solidFill>
+                <a:effectLst/>
+                <a:latin typeface="+mn-lt"/>
+                <a:ea typeface="+mn-ea"/>
+                <a:cs typeface="+mn-cs"/>
+              </a:rPr>
+            </a:br>
+            <a:r>
+              <a:rPr lang="en-US" sz="1200" b="0" i="0" kern="1200" dirty="0">
+                <a:solidFill>
+                  <a:schemeClr val="tx1"/>
+                </a:solidFill>
+                <a:effectLst/>
+                <a:latin typeface="+mn-lt"/>
+                <a:ea typeface="+mn-ea"/>
+                <a:cs typeface="+mn-cs"/>
+              </a:rPr>
+              <a:t>-- Provide diagrams to aid understanding the workflow</a:t>
+            </a:r>
           </a:p>
         </p:txBody>
       </p:sp>
@@ -3234,7 +3295,7 @@
           <a:p>
             <a:fld id="{25E2E259-F0C1-274B-BB83-2518BC0EEFC9}" type="slidenum">
               <a:rPr lang="en-US" smtClean="0"/>
-              <a:t>7</a:t>
+              <a:t>6</a:t>
             </a:fld>
             <a:endParaRPr lang="en-US"/>
           </a:p>
@@ -3243,7 +3304,7 @@
     </p:spTree>
     <p:extLst>
       <p:ext uri="{BB962C8B-B14F-4D97-AF65-F5344CB8AC3E}">
-        <p14:creationId xmlns:p14="http://schemas.microsoft.com/office/powerpoint/2010/main" val="2413518338"/>
+        <p14:creationId xmlns:p14="http://schemas.microsoft.com/office/powerpoint/2010/main" val="3310434117"/>
       </p:ext>
     </p:extLst>
   </p:cSld>
@@ -3297,6 +3358,420 @@
           <a:bodyPr/>
           <a:lstStyle/>
           <a:p>
+            <a:endParaRPr lang="en-US" dirty="0"/>
+          </a:p>
+          <a:p>
+            <a:pPr marL="0" marR="0" lvl="0" indent="0" algn="l" defTabSz="914400" rtl="0" eaLnBrk="1" fontAlgn="auto" latinLnBrk="0" hangingPunct="1">
+              <a:lnSpc>
+                <a:spcPct val="100000"/>
+              </a:lnSpc>
+              <a:spcBef>
+                <a:spcPts val="0"/>
+              </a:spcBef>
+              <a:spcAft>
+                <a:spcPts val="0"/>
+              </a:spcAft>
+              <a:buClrTx/>
+              <a:buSzTx/>
+              <a:buFontTx/>
+              <a:buNone/>
+              <a:tabLst/>
+              <a:defRPr/>
+            </a:pPr>
+            <a:r>
+              <a:rPr lang="en-US" sz="1200" b="0" i="0" kern="1200" dirty="0">
+                <a:solidFill>
+                  <a:schemeClr val="tx1"/>
+                </a:solidFill>
+                <a:effectLst/>
+                <a:latin typeface="+mn-lt"/>
+                <a:ea typeface="+mn-ea"/>
+                <a:cs typeface="+mn-cs"/>
+              </a:rPr>
+              <a:t>This criterion is linked to a Learning Outcome</a:t>
+            </a:r>
+          </a:p>
+          <a:p>
+            <a:pPr marL="0" marR="0" lvl="0" indent="0" algn="l" defTabSz="914400" rtl="0" eaLnBrk="1" fontAlgn="auto" latinLnBrk="0" hangingPunct="1">
+              <a:lnSpc>
+                <a:spcPct val="100000"/>
+              </a:lnSpc>
+              <a:spcBef>
+                <a:spcPts val="0"/>
+              </a:spcBef>
+              <a:spcAft>
+                <a:spcPts val="0"/>
+              </a:spcAft>
+              <a:buClrTx/>
+              <a:buSzTx/>
+              <a:buFontTx/>
+              <a:buNone/>
+              <a:tabLst/>
+              <a:defRPr/>
+            </a:pPr>
+            <a:r>
+              <a:rPr lang="en-US" sz="1200" b="0" i="0" kern="1200" dirty="0">
+                <a:solidFill>
+                  <a:schemeClr val="tx1"/>
+                </a:solidFill>
+                <a:effectLst/>
+                <a:latin typeface="+mn-lt"/>
+                <a:ea typeface="+mn-ea"/>
+                <a:cs typeface="+mn-cs"/>
+              </a:rPr>
+              <a:t>EDA</a:t>
+            </a:r>
+          </a:p>
+          <a:p>
+            <a:pPr marL="0" marR="0" lvl="0" indent="0" algn="l" defTabSz="914400" rtl="0" eaLnBrk="1" fontAlgn="auto" latinLnBrk="0" hangingPunct="1">
+              <a:lnSpc>
+                <a:spcPct val="100000"/>
+              </a:lnSpc>
+              <a:spcBef>
+                <a:spcPts val="0"/>
+              </a:spcBef>
+              <a:spcAft>
+                <a:spcPts val="0"/>
+              </a:spcAft>
+              <a:buClrTx/>
+              <a:buSzTx/>
+              <a:buFontTx/>
+              <a:buNone/>
+              <a:tabLst/>
+              <a:defRPr/>
+            </a:pPr>
+            <a:r>
+              <a:rPr lang="en-US" sz="1200" b="0" i="0" kern="1200" dirty="0">
+                <a:solidFill>
+                  <a:schemeClr val="tx1"/>
+                </a:solidFill>
+                <a:effectLst/>
+                <a:latin typeface="+mn-lt"/>
+                <a:ea typeface="+mn-ea"/>
+                <a:cs typeface="+mn-cs"/>
+              </a:rPr>
+              <a:t>Expectations here are to provide the following in sections and subsections:</a:t>
+            </a:r>
+          </a:p>
+          <a:p>
+            <a:r>
+              <a:rPr lang="en-US" sz="1200" b="0" i="0" kern="1200" dirty="0">
+                <a:solidFill>
+                  <a:schemeClr val="tx1"/>
+                </a:solidFill>
+                <a:effectLst/>
+                <a:latin typeface="+mn-lt"/>
+                <a:ea typeface="+mn-ea"/>
+                <a:cs typeface="+mn-cs"/>
+              </a:rPr>
+              <a:t>[</a:t>
+            </a:r>
+            <a:r>
+              <a:rPr lang="en-US" sz="1200" b="0" i="0" kern="1200" dirty="0" err="1">
+                <a:solidFill>
+                  <a:schemeClr val="tx1"/>
+                </a:solidFill>
+                <a:effectLst/>
+                <a:latin typeface="+mn-lt"/>
+                <a:ea typeface="+mn-ea"/>
+                <a:cs typeface="+mn-cs"/>
+              </a:rPr>
+              <a:t>CaDoD</a:t>
+            </a:r>
+            <a:r>
+              <a:rPr lang="en-US" sz="1200" b="0" i="0" kern="1200" dirty="0">
+                <a:solidFill>
+                  <a:schemeClr val="tx1"/>
+                </a:solidFill>
+                <a:effectLst/>
+                <a:latin typeface="+mn-lt"/>
+                <a:ea typeface="+mn-ea"/>
+                <a:cs typeface="+mn-cs"/>
+              </a:rPr>
+              <a:t>]</a:t>
+            </a:r>
+            <a:br>
+              <a:rPr lang="en-US" dirty="0"/>
+            </a:br>
+            <a:r>
+              <a:rPr lang="en-US" sz="1200" b="0" i="0" kern="1200" dirty="0">
+                <a:solidFill>
+                  <a:schemeClr val="tx1"/>
+                </a:solidFill>
+                <a:effectLst/>
+                <a:latin typeface="+mn-lt"/>
+                <a:ea typeface="+mn-ea"/>
+                <a:cs typeface="+mn-cs"/>
+              </a:rPr>
+              <a:t>-- Overview of images (i.e. count of cat images, dog images, total images, memory size of images, etc..)</a:t>
+            </a:r>
+            <a:br>
+              <a:rPr lang="en-US" dirty="0"/>
+            </a:br>
+            <a:r>
+              <a:rPr lang="en-US" sz="1200" b="0" i="0" kern="1200" dirty="0">
+                <a:solidFill>
+                  <a:schemeClr val="tx1"/>
+                </a:solidFill>
+                <a:effectLst/>
+                <a:latin typeface="+mn-lt"/>
+                <a:ea typeface="+mn-ea"/>
+                <a:cs typeface="+mn-cs"/>
+              </a:rPr>
+              <a:t>-- Other useful text-based analysis (as opposed to graphic-based)</a:t>
+            </a:r>
+          </a:p>
+          <a:p>
+            <a:endParaRPr lang="en-US" sz="1200" b="0" i="0" kern="1200" dirty="0">
+              <a:solidFill>
+                <a:schemeClr val="tx1"/>
+              </a:solidFill>
+              <a:effectLst/>
+              <a:latin typeface="+mn-lt"/>
+              <a:ea typeface="+mn-ea"/>
+              <a:cs typeface="+mn-cs"/>
+            </a:endParaRPr>
+          </a:p>
+          <a:p>
+            <a:endParaRPr lang="en-US" sz="1200" b="0" i="0" kern="1200" dirty="0">
+              <a:solidFill>
+                <a:schemeClr val="tx1"/>
+              </a:solidFill>
+              <a:effectLst/>
+              <a:latin typeface="+mn-lt"/>
+              <a:ea typeface="+mn-ea"/>
+              <a:cs typeface="+mn-cs"/>
+            </a:endParaRPr>
+          </a:p>
+          <a:p>
+            <a:pPr marL="0" marR="0" lvl="0" indent="0" algn="l" defTabSz="914400" rtl="0" eaLnBrk="1" fontAlgn="auto" latinLnBrk="0" hangingPunct="1">
+              <a:lnSpc>
+                <a:spcPct val="100000"/>
+              </a:lnSpc>
+              <a:spcBef>
+                <a:spcPts val="0"/>
+              </a:spcBef>
+              <a:spcAft>
+                <a:spcPts val="0"/>
+              </a:spcAft>
+              <a:buClrTx/>
+              <a:buSzTx/>
+              <a:buFontTx/>
+              <a:buNone/>
+              <a:tabLst/>
+              <a:defRPr/>
+            </a:pPr>
+            <a:r>
+              <a:rPr lang="en-US" sz="1200" b="0" i="0" kern="1200" dirty="0">
+                <a:solidFill>
+                  <a:schemeClr val="tx1"/>
+                </a:solidFill>
+                <a:effectLst/>
+                <a:latin typeface="+mn-lt"/>
+                <a:ea typeface="+mn-ea"/>
+                <a:cs typeface="+mn-cs"/>
+              </a:rPr>
+              <a:t>This criterion is linked to a Learning Outcome</a:t>
+            </a:r>
+          </a:p>
+          <a:p>
+            <a:pPr marL="0" marR="0" lvl="0" indent="0" algn="l" defTabSz="914400" rtl="0" eaLnBrk="1" fontAlgn="auto" latinLnBrk="0" hangingPunct="1">
+              <a:lnSpc>
+                <a:spcPct val="100000"/>
+              </a:lnSpc>
+              <a:spcBef>
+                <a:spcPts val="0"/>
+              </a:spcBef>
+              <a:spcAft>
+                <a:spcPts val="0"/>
+              </a:spcAft>
+              <a:buClrTx/>
+              <a:buSzTx/>
+              <a:buFontTx/>
+              <a:buNone/>
+              <a:tabLst/>
+              <a:defRPr/>
+            </a:pPr>
+            <a:r>
+              <a:rPr lang="en-US" sz="1200" b="0" i="0" kern="1200" dirty="0">
+                <a:solidFill>
+                  <a:schemeClr val="tx1"/>
+                </a:solidFill>
+                <a:effectLst/>
+                <a:latin typeface="+mn-lt"/>
+                <a:ea typeface="+mn-ea"/>
+                <a:cs typeface="+mn-cs"/>
+              </a:rPr>
+              <a:t>Visual EDA</a:t>
+            </a:r>
+          </a:p>
+          <a:p>
+            <a:pPr marL="0" marR="0" lvl="0" indent="0" algn="l" defTabSz="914400" rtl="0" eaLnBrk="1" fontAlgn="auto" latinLnBrk="0" hangingPunct="1">
+              <a:lnSpc>
+                <a:spcPct val="100000"/>
+              </a:lnSpc>
+              <a:spcBef>
+                <a:spcPts val="0"/>
+              </a:spcBef>
+              <a:spcAft>
+                <a:spcPts val="0"/>
+              </a:spcAft>
+              <a:buClrTx/>
+              <a:buSzTx/>
+              <a:buFontTx/>
+              <a:buNone/>
+              <a:tabLst/>
+              <a:defRPr/>
+            </a:pPr>
+            <a:r>
+              <a:rPr lang="en-US" sz="1200" b="0" i="0" kern="1200" dirty="0">
+                <a:solidFill>
+                  <a:schemeClr val="tx1"/>
+                </a:solidFill>
+                <a:effectLst/>
+                <a:latin typeface="+mn-lt"/>
+                <a:ea typeface="+mn-ea"/>
+                <a:cs typeface="+mn-cs"/>
+              </a:rPr>
+              <a:t>Expectations here are to provide the following in sections and subsections:</a:t>
+            </a:r>
+          </a:p>
+          <a:p>
+            <a:r>
+              <a:rPr lang="en-US" sz="1200" b="0" i="0" kern="1200" dirty="0">
+                <a:solidFill>
+                  <a:schemeClr val="tx1"/>
+                </a:solidFill>
+                <a:effectLst/>
+                <a:latin typeface="+mn-lt"/>
+                <a:ea typeface="+mn-ea"/>
+                <a:cs typeface="+mn-cs"/>
+              </a:rPr>
+              <a:t>[</a:t>
+            </a:r>
+            <a:r>
+              <a:rPr lang="en-US" sz="1200" b="0" i="0" kern="1200" dirty="0" err="1">
+                <a:solidFill>
+                  <a:schemeClr val="tx1"/>
+                </a:solidFill>
+                <a:effectLst/>
+                <a:latin typeface="+mn-lt"/>
+                <a:ea typeface="+mn-ea"/>
+                <a:cs typeface="+mn-cs"/>
+              </a:rPr>
+              <a:t>CaDoD</a:t>
+            </a:r>
+            <a:r>
+              <a:rPr lang="en-US" sz="1200" b="0" i="0" kern="1200" dirty="0">
+                <a:solidFill>
+                  <a:schemeClr val="tx1"/>
+                </a:solidFill>
+                <a:effectLst/>
+                <a:latin typeface="+mn-lt"/>
+                <a:ea typeface="+mn-ea"/>
+                <a:cs typeface="+mn-cs"/>
+              </a:rPr>
+              <a:t>]</a:t>
+            </a:r>
+            <a:br>
+              <a:rPr lang="en-US" dirty="0"/>
+            </a:br>
+            <a:r>
+              <a:rPr lang="en-US" sz="1200" b="0" i="0" kern="1200" dirty="0">
+                <a:solidFill>
+                  <a:schemeClr val="tx1"/>
+                </a:solidFill>
+                <a:effectLst/>
+                <a:latin typeface="+mn-lt"/>
+                <a:ea typeface="+mn-ea"/>
+                <a:cs typeface="+mn-cs"/>
+              </a:rPr>
+              <a:t>-- preview and a small sample of images before and after transformations</a:t>
+            </a:r>
+            <a:endParaRPr lang="en-US" dirty="0"/>
+          </a:p>
+        </p:txBody>
+      </p:sp>
+      <p:sp>
+        <p:nvSpPr>
+          <p:cNvPr id="4" name="Slide Number Placeholder 3"/>
+          <p:cNvSpPr>
+            <a:spLocks noGrp="1"/>
+          </p:cNvSpPr>
+          <p:nvPr>
+            <p:ph type="sldNum" sz="quarter" idx="5"/>
+          </p:nvPr>
+        </p:nvSpPr>
+        <p:spPr/>
+        <p:txBody>
+          <a:bodyPr/>
+          <a:lstStyle/>
+          <a:p>
+            <a:fld id="{25E2E259-F0C1-274B-BB83-2518BC0EEFC9}" type="slidenum">
+              <a:rPr lang="en-US" smtClean="0"/>
+              <a:t>8</a:t>
+            </a:fld>
+            <a:endParaRPr lang="en-US"/>
+          </a:p>
+        </p:txBody>
+      </p:sp>
+    </p:spTree>
+    <p:extLst>
+      <p:ext uri="{BB962C8B-B14F-4D97-AF65-F5344CB8AC3E}">
+        <p14:creationId xmlns:p14="http://schemas.microsoft.com/office/powerpoint/2010/main" val="2413518338"/>
+      </p:ext>
+    </p:extLst>
+  </p:cSld>
+  <p:clrMapOvr>
+    <a:masterClrMapping/>
+  </p:clrMapOvr>
+</p:notes>
+</file>
+
+<file path=ppt/notesSlides/notesSlide8.xml><?xml version="1.0" encoding="utf-8"?>
+<p:notes xmlns:a="http://schemas.openxmlformats.org/drawingml/2006/main" xmlns:r="http://schemas.openxmlformats.org/officeDocument/2006/relationships" xmlns:p="http://schemas.openxmlformats.org/presentationml/2006/main">
+  <p:cSld>
+    <p:spTree>
+      <p:nvGrpSpPr>
+        <p:cNvPr id="1" name=""/>
+        <p:cNvGrpSpPr/>
+        <p:nvPr/>
+      </p:nvGrpSpPr>
+      <p:grpSpPr>
+        <a:xfrm>
+          <a:off x="0" y="0"/>
+          <a:ext cx="0" cy="0"/>
+          <a:chOff x="0" y="0"/>
+          <a:chExt cx="0" cy="0"/>
+        </a:xfrm>
+      </p:grpSpPr>
+      <p:sp>
+        <p:nvSpPr>
+          <p:cNvPr id="2" name="Slide Image Placeholder 1"/>
+          <p:cNvSpPr>
+            <a:spLocks noGrp="1" noRot="1" noChangeAspect="1"/>
+          </p:cNvSpPr>
+          <p:nvPr>
+            <p:ph type="sldImg"/>
+          </p:nvPr>
+        </p:nvSpPr>
+        <p:spPr/>
+      </p:sp>
+      <p:sp>
+        <p:nvSpPr>
+          <p:cNvPr id="3" name="Notes Placeholder 2"/>
+          <p:cNvSpPr>
+            <a:spLocks noGrp="1"/>
+          </p:cNvSpPr>
+          <p:nvPr>
+            <p:ph type="body" idx="1"/>
+          </p:nvPr>
+        </p:nvSpPr>
+        <p:spPr/>
+        <p:txBody>
+          <a:bodyPr/>
+          <a:lstStyle/>
+          <a:p>
             <a:pPr marL="0" marR="0" lvl="0" indent="0" algn="l" defTabSz="914400" rtl="0" eaLnBrk="1" fontAlgn="auto" latinLnBrk="0" hangingPunct="1">
               <a:lnSpc>
                 <a:spcPct val="100000"/>
@@ -3637,7 +4112,7 @@
           <a:p>
             <a:fld id="{25E2E259-F0C1-274B-BB83-2518BC0EEFC9}" type="slidenum">
               <a:rPr lang="en-US" smtClean="0"/>
-              <a:t>8</a:t>
+              <a:t>9</a:t>
             </a:fld>
             <a:endParaRPr lang="en-US"/>
           </a:p>
@@ -3647,241 +4122,6 @@
     <p:extLst>
       <p:ext uri="{BB962C8B-B14F-4D97-AF65-F5344CB8AC3E}">
         <p14:creationId xmlns:p14="http://schemas.microsoft.com/office/powerpoint/2010/main" val="3798094749"/>
-      </p:ext>
-    </p:extLst>
-  </p:cSld>
-  <p:clrMapOvr>
-    <a:masterClrMapping/>
-  </p:clrMapOvr>
-</p:notes>
-</file>
-
-<file path=ppt/notesSlides/notesSlide8.xml><?xml version="1.0" encoding="utf-8"?>
-<p:notes xmlns:a="http://schemas.openxmlformats.org/drawingml/2006/main" xmlns:r="http://schemas.openxmlformats.org/officeDocument/2006/relationships" xmlns:p="http://schemas.openxmlformats.org/presentationml/2006/main">
-  <p:cSld>
-    <p:spTree>
-      <p:nvGrpSpPr>
-        <p:cNvPr id="1" name=""/>
-        <p:cNvGrpSpPr/>
-        <p:nvPr/>
-      </p:nvGrpSpPr>
-      <p:grpSpPr>
-        <a:xfrm>
-          <a:off x="0" y="0"/>
-          <a:ext cx="0" cy="0"/>
-          <a:chOff x="0" y="0"/>
-          <a:chExt cx="0" cy="0"/>
-        </a:xfrm>
-      </p:grpSpPr>
-      <p:sp>
-        <p:nvSpPr>
-          <p:cNvPr id="2" name="Slide Image Placeholder 1"/>
-          <p:cNvSpPr>
-            <a:spLocks noGrp="1" noRot="1" noChangeAspect="1"/>
-          </p:cNvSpPr>
-          <p:nvPr>
-            <p:ph type="sldImg"/>
-          </p:nvPr>
-        </p:nvSpPr>
-        <p:spPr/>
-      </p:sp>
-      <p:sp>
-        <p:nvSpPr>
-          <p:cNvPr id="3" name="Notes Placeholder 2"/>
-          <p:cNvSpPr>
-            <a:spLocks noGrp="1"/>
-          </p:cNvSpPr>
-          <p:nvPr>
-            <p:ph type="body" idx="1"/>
-          </p:nvPr>
-        </p:nvSpPr>
-        <p:spPr/>
-        <p:txBody>
-          <a:bodyPr/>
-          <a:lstStyle/>
-          <a:p>
-            <a:pPr marL="0" marR="0" lvl="0" indent="0" algn="l" defTabSz="914400" rtl="0" eaLnBrk="1" fontAlgn="auto" latinLnBrk="0" hangingPunct="1">
-              <a:lnSpc>
-                <a:spcPct val="100000"/>
-              </a:lnSpc>
-              <a:spcBef>
-                <a:spcPts val="0"/>
-              </a:spcBef>
-              <a:spcAft>
-                <a:spcPts val="0"/>
-              </a:spcAft>
-              <a:buClrTx/>
-              <a:buSzTx/>
-              <a:buFontTx/>
-              <a:buNone/>
-              <a:tabLst/>
-              <a:defRPr/>
-            </a:pPr>
-            <a:r>
-              <a:rPr lang="en-US" sz="1200" b="0" i="0" kern="1200" dirty="0">
-                <a:solidFill>
-                  <a:schemeClr val="tx1"/>
-                </a:solidFill>
-                <a:effectLst/>
-                <a:latin typeface="+mn-lt"/>
-                <a:ea typeface="+mn-ea"/>
-                <a:cs typeface="+mn-cs"/>
-              </a:rPr>
-              <a:t>This criterion is linked to a Learning Outcome</a:t>
-            </a:r>
-          </a:p>
-          <a:p>
-            <a:pPr marL="0" marR="0" lvl="0" indent="0" algn="l" defTabSz="914400" rtl="0" eaLnBrk="1" fontAlgn="auto" latinLnBrk="0" hangingPunct="1">
-              <a:lnSpc>
-                <a:spcPct val="100000"/>
-              </a:lnSpc>
-              <a:spcBef>
-                <a:spcPts val="0"/>
-              </a:spcBef>
-              <a:spcAft>
-                <a:spcPts val="0"/>
-              </a:spcAft>
-              <a:buClrTx/>
-              <a:buSzTx/>
-              <a:buFontTx/>
-              <a:buNone/>
-              <a:tabLst/>
-              <a:defRPr/>
-            </a:pPr>
-            <a:r>
-              <a:rPr lang="en-US" sz="1200" b="0" i="0" kern="1200" dirty="0">
-                <a:solidFill>
-                  <a:schemeClr val="tx1"/>
-                </a:solidFill>
-                <a:effectLst/>
-                <a:latin typeface="+mn-lt"/>
-                <a:ea typeface="+mn-ea"/>
-                <a:cs typeface="+mn-cs"/>
-              </a:rPr>
-              <a:t>Results and discussion of results</a:t>
-            </a:r>
-          </a:p>
-          <a:p>
-            <a:pPr marL="0" marR="0" lvl="0" indent="0" algn="l" defTabSz="914400" rtl="0" eaLnBrk="1" fontAlgn="auto" latinLnBrk="0" hangingPunct="1">
-              <a:lnSpc>
-                <a:spcPct val="100000"/>
-              </a:lnSpc>
-              <a:spcBef>
-                <a:spcPts val="0"/>
-              </a:spcBef>
-              <a:spcAft>
-                <a:spcPts val="0"/>
-              </a:spcAft>
-              <a:buClrTx/>
-              <a:buSzTx/>
-              <a:buFontTx/>
-              <a:buNone/>
-              <a:tabLst/>
-              <a:defRPr/>
-            </a:pPr>
-            <a:r>
-              <a:rPr lang="en-US" sz="1200" b="0" i="0" kern="1200" dirty="0">
-                <a:solidFill>
-                  <a:schemeClr val="tx1"/>
-                </a:solidFill>
-                <a:effectLst/>
-                <a:latin typeface="+mn-lt"/>
-                <a:ea typeface="+mn-ea"/>
-                <a:cs typeface="+mn-cs"/>
-              </a:rPr>
-              <a:t>Expectations here are to provide the following in sections and subsections:</a:t>
-            </a:r>
-            <a:br>
-              <a:rPr lang="en-US" sz="1200" b="0" i="0" kern="1200" dirty="0">
-                <a:solidFill>
-                  <a:schemeClr val="tx1"/>
-                </a:solidFill>
-                <a:effectLst/>
-                <a:latin typeface="+mn-lt"/>
-                <a:ea typeface="+mn-ea"/>
-                <a:cs typeface="+mn-cs"/>
-              </a:rPr>
-            </a:br>
-            <a:br>
-              <a:rPr lang="en-US" sz="1200" b="0" i="0" kern="1200" dirty="0">
-                <a:solidFill>
-                  <a:schemeClr val="tx1"/>
-                </a:solidFill>
-                <a:effectLst/>
-                <a:latin typeface="+mn-lt"/>
-                <a:ea typeface="+mn-ea"/>
-                <a:cs typeface="+mn-cs"/>
-              </a:rPr>
-            </a:br>
-            <a:r>
-              <a:rPr lang="en-US" sz="1200" b="0" i="0" kern="1200" dirty="0">
-                <a:solidFill>
-                  <a:schemeClr val="tx1"/>
-                </a:solidFill>
-                <a:effectLst/>
-                <a:latin typeface="+mn-lt"/>
-                <a:ea typeface="+mn-ea"/>
-                <a:cs typeface="+mn-cs"/>
-              </a:rPr>
-              <a:t>Discussion’s aim is result interpretation, which means explain, </a:t>
-            </a:r>
-            <a:r>
-              <a:rPr lang="en-US" sz="1200" b="0" i="0" kern="1200" dirty="0" err="1">
-                <a:solidFill>
-                  <a:schemeClr val="tx1"/>
-                </a:solidFill>
-                <a:effectLst/>
-                <a:latin typeface="+mn-lt"/>
-                <a:ea typeface="+mn-ea"/>
-                <a:cs typeface="+mn-cs"/>
-              </a:rPr>
-              <a:t>analyse</a:t>
-            </a:r>
-            <a:r>
-              <a:rPr lang="en-US" sz="1200" b="0" i="0" kern="1200" dirty="0">
-                <a:solidFill>
-                  <a:schemeClr val="tx1"/>
-                </a:solidFill>
-                <a:effectLst/>
-                <a:latin typeface="+mn-lt"/>
-                <a:ea typeface="+mn-ea"/>
-                <a:cs typeface="+mn-cs"/>
-              </a:rPr>
-              <a:t>, and compare them. Often, this part is the most important, simply because it lets the researcher take a step back and give a broader look at the experiment. Do not discuss any outcomes not presented in the results part.</a:t>
-            </a:r>
-          </a:p>
-          <a:p>
-            <a:endParaRPr lang="en-US" dirty="0"/>
-          </a:p>
-        </p:txBody>
-      </p:sp>
-      <p:sp>
-        <p:nvSpPr>
-          <p:cNvPr id="4" name="Slide Number Placeholder 3"/>
-          <p:cNvSpPr>
-            <a:spLocks noGrp="1"/>
-          </p:cNvSpPr>
-          <p:nvPr>
-            <p:ph type="sldNum" sz="quarter" idx="5"/>
-          </p:nvPr>
-        </p:nvSpPr>
-        <p:spPr/>
-        <p:txBody>
-          <a:bodyPr/>
-          <a:lstStyle/>
-          <a:p>
-            <a:fld id="{25E2E259-F0C1-274B-BB83-2518BC0EEFC9}" type="slidenum">
-              <a:rPr lang="en-US" smtClean="0"/>
-              <a:t>9</a:t>
-            </a:fld>
-            <a:endParaRPr lang="en-US"/>
-          </a:p>
-        </p:txBody>
-      </p:sp>
-    </p:spTree>
-    <p:extLst>
-      <p:ext uri="{BB962C8B-B14F-4D97-AF65-F5344CB8AC3E}">
-        <p14:creationId xmlns:p14="http://schemas.microsoft.com/office/powerpoint/2010/main" val="2529856133"/>
       </p:ext>
     </p:extLst>
   </p:cSld>
@@ -4116,7 +4356,7 @@
     </p:spTree>
     <p:extLst>
       <p:ext uri="{BB962C8B-B14F-4D97-AF65-F5344CB8AC3E}">
-        <p14:creationId xmlns:p14="http://schemas.microsoft.com/office/powerpoint/2010/main" val="3148085847"/>
+        <p14:creationId xmlns:p14="http://schemas.microsoft.com/office/powerpoint/2010/main" val="2529856133"/>
       </p:ext>
     </p:extLst>
   </p:cSld>
@@ -9466,7 +9706,7 @@
         </p:nvSpPr>
         <p:spPr>
           <a:xfrm>
-            <a:off x="810000" y="5280846"/>
+            <a:off x="546342" y="5151728"/>
             <a:ext cx="10835659" cy="1484361"/>
           </a:xfrm>
         </p:spPr>
@@ -9679,47 +9919,6 @@
           </p:spPr>
         </p:pic>
       </p:grpSp>
-      <p:sp>
-        <p:nvSpPr>
-          <p:cNvPr id="12" name="TextBox 11">
-            <a:extLst>
-              <a:ext uri="{FF2B5EF4-FFF2-40B4-BE49-F238E27FC236}">
-                <a16:creationId xmlns:a16="http://schemas.microsoft.com/office/drawing/2014/main" id="{4513CB98-841B-3C42-A829-BFCCA0F50781}"/>
-              </a:ext>
-            </a:extLst>
-          </p:cNvPr>
-          <p:cNvSpPr txBox="1"/>
-          <p:nvPr/>
-        </p:nvSpPr>
-        <p:spPr>
-          <a:xfrm>
-            <a:off x="6752091" y="5902086"/>
-            <a:ext cx="3899139" cy="276999"/>
-          </a:xfrm>
-          <a:prstGeom prst="rect">
-            <a:avLst/>
-          </a:prstGeom>
-          <a:noFill/>
-        </p:spPr>
-        <p:txBody>
-          <a:bodyPr wrap="square" rtlCol="0">
-            <a:spAutoFit/>
-          </a:bodyPr>
-          <a:lstStyle/>
-          <a:p>
-            <a:r>
-              <a:rPr lang="en-US" sz="1200" dirty="0">
-                <a:hlinkClick r:id="rId5"/>
-              </a:rPr>
-              <a:t>mwalimbe@iu.edu</a:t>
-            </a:r>
-            <a:r>
-              <a:rPr lang="en-US" sz="1200" dirty="0"/>
-              <a:t> </a:t>
-            </a:r>
-          </a:p>
-        </p:txBody>
-      </p:sp>
     </p:spTree>
     <p:extLst>
       <p:ext uri="{BB962C8B-B14F-4D97-AF65-F5344CB8AC3E}">
@@ -9855,52 +10054,7 @@
             </a:pPr>
             <a:r>
               <a:rPr lang="en-US" dirty="0"/>
-              <a:t>3 models evaluated with </a:t>
-            </a:r>
-            <a:r>
-              <a:rPr lang="en-US" dirty="0" err="1"/>
-              <a:t>GridSearchCV</a:t>
-            </a:r>
-            <a:r>
-              <a:rPr lang="en-US" dirty="0"/>
-              <a:t> and different alpha parameters and KNN parameters (in order of performance)</a:t>
-            </a:r>
-          </a:p>
-          <a:p>
-            <a:r>
-              <a:rPr lang="en-US" dirty="0"/>
-              <a:t>Lasso Linear Regression *</a:t>
-            </a:r>
-          </a:p>
-          <a:p>
-            <a:r>
-              <a:rPr lang="en-US" dirty="0"/>
-              <a:t>K Nearest Neighbor</a:t>
-            </a:r>
-          </a:p>
-          <a:p>
-            <a:r>
-              <a:rPr lang="en-US" dirty="0"/>
-              <a:t>Ridge Linear Regression</a:t>
-            </a:r>
-          </a:p>
-          <a:p>
-            <a:pPr marL="0" indent="0">
-              <a:buNone/>
-            </a:pPr>
-            <a:r>
-              <a:rPr lang="en-US" dirty="0"/>
-              <a:t>* winner with alpha = 1 during subset training</a:t>
-            </a:r>
-            <a:br>
-              <a:rPr lang="en-US" dirty="0"/>
-            </a:br>
-            <a:br>
-              <a:rPr lang="en-US" dirty="0"/>
-            </a:br>
-            <a:r>
-              <a:rPr lang="en-US" dirty="0"/>
-              <a:t>Winning model (along with its params) placed into the localization pipeline.</a:t>
+              <a:t>describe</a:t>
             </a:r>
           </a:p>
         </p:txBody>
@@ -9957,28 +10111,12 @@
           </a:bodyPr>
           <a:lstStyle/>
           <a:p>
-            <a:r>
-              <a:rPr lang="en-US" dirty="0" err="1"/>
-              <a:t>SKLearn</a:t>
-            </a:r>
-            <a:r>
-              <a:rPr lang="en-US" dirty="0"/>
-              <a:t> Logistic Regression model</a:t>
-            </a:r>
-          </a:p>
-          <a:p>
-            <a:r>
-              <a:rPr lang="en-US" dirty="0"/>
-              <a:t>Homegrown Logistic Regression model using gradient descent</a:t>
-            </a:r>
-          </a:p>
-          <a:p>
             <a:pPr marL="0" indent="0">
               <a:buNone/>
             </a:pPr>
             <a:r>
               <a:rPr lang="en-US" dirty="0"/>
-              <a:t>We did not have sufficient time to perform CV on these two models, but ran them both through training and test sets to compare predictions and performance.</a:t>
+              <a:t>describe</a:t>
             </a:r>
           </a:p>
         </p:txBody>
@@ -9986,7 +10124,7 @@
     </p:spTree>
     <p:extLst>
       <p:ext uri="{BB962C8B-B14F-4D97-AF65-F5344CB8AC3E}">
-        <p14:creationId xmlns:p14="http://schemas.microsoft.com/office/powerpoint/2010/main" val="4092814027"/>
+        <p14:creationId xmlns:p14="http://schemas.microsoft.com/office/powerpoint/2010/main" val="2995467700"/>
       </p:ext>
     </p:extLst>
   </p:cSld>
@@ -10036,7 +10174,7 @@
           <a:p>
             <a:r>
               <a:rPr lang="en-US" dirty="0"/>
-              <a:t>Metrics, Results, Discussion </a:t>
+              <a:t>Models </a:t>
             </a:r>
             <a:r>
               <a:rPr lang="en-US" sz="2400" dirty="0"/>
@@ -10050,7 +10188,7 @@
                   </a:schemeClr>
                 </a:solidFill>
               </a:rPr>
-              <a:t>Ben</a:t>
+              <a:t>Mangesh</a:t>
             </a:r>
             <a:endParaRPr lang="en-US" sz="2400" dirty="0"/>
           </a:p>
@@ -10077,9 +10215,10 @@
           <a:bodyPr/>
           <a:lstStyle/>
           <a:p>
-            <a:r>
-              <a:rPr lang="en-US" dirty="0"/>
-              <a:t>Results Summary</a:t>
+            <a:pPr algn="l"/>
+            <a:r>
+              <a:rPr lang="en-US" b="1" dirty="0"/>
+              <a:t>Bounding Box Prediction Models</a:t>
             </a:r>
           </a:p>
         </p:txBody>
@@ -10100,32 +10239,69 @@
             <p:ph sz="half" idx="2"/>
           </p:nvPr>
         </p:nvSpPr>
-        <p:spPr/>
-        <p:txBody>
-          <a:bodyPr/>
+        <p:spPr>
+          <a:xfrm>
+            <a:off x="814729" y="2751138"/>
+            <a:ext cx="5189856" cy="3409632"/>
+          </a:xfrm>
+        </p:spPr>
+        <p:txBody>
+          <a:bodyPr>
+            <a:normAutofit/>
+          </a:bodyPr>
           <a:lstStyle/>
           <a:p>
+            <a:pPr marL="0" indent="0">
+              <a:buNone/>
+            </a:pPr>
             <a:r>
               <a:rPr lang="en-US" dirty="0"/>
-              <a:t>Explain</a:t>
-            </a:r>
-          </a:p>
-          <a:p>
+              <a:t>3 models evaluated with </a:t>
+            </a:r>
+            <a:r>
+              <a:rPr lang="en-US" dirty="0" err="1"/>
+              <a:t>GridSearchCV</a:t>
+            </a:r>
             <a:r>
               <a:rPr lang="en-US" dirty="0"/>
-              <a:t>Analyze</a:t>
+              <a:t> and different alpha parameters and KNN parameters (in order of performance)</a:t>
             </a:r>
           </a:p>
           <a:p>
             <a:r>
               <a:rPr lang="en-US" dirty="0"/>
-              <a:t>Compare</a:t>
+              <a:t>Lasso Linear Regression *</a:t>
             </a:r>
           </a:p>
           <a:p>
             <a:r>
               <a:rPr lang="en-US" dirty="0"/>
-              <a:t>Outcomes to be discussed</a:t>
+              <a:t>K Nearest Neighbor</a:t>
+            </a:r>
+          </a:p>
+          <a:p>
+            <a:r>
+              <a:rPr lang="en-US" dirty="0"/>
+              <a:t>Ridge Linear Regression</a:t>
+            </a:r>
+          </a:p>
+          <a:p>
+            <a:pPr marL="0" indent="0">
+              <a:buNone/>
+            </a:pPr>
+            <a:r>
+              <a:rPr lang="en-US" dirty="0"/>
+              <a:t>* winner with alpha = 1 during subset training</a:t>
+            </a:r>
+            <a:br>
+              <a:rPr lang="en-US" dirty="0"/>
+            </a:br>
+            <a:br>
+              <a:rPr lang="en-US" dirty="0"/>
+            </a:br>
+            <a:r>
+              <a:rPr lang="en-US" dirty="0"/>
+              <a:t>Winning model (along with its params) placed into the localization pipeline.</a:t>
             </a:r>
           </a:p>
         </p:txBody>
@@ -10151,9 +10327,10 @@
           <a:bodyPr/>
           <a:lstStyle/>
           <a:p>
-            <a:r>
-              <a:rPr lang="en-US" dirty="0"/>
-              <a:t>Discussion</a:t>
+            <a:pPr algn="l"/>
+            <a:r>
+              <a:rPr lang="en-US" b="1" dirty="0"/>
+              <a:t>Classification Models</a:t>
             </a:r>
           </a:p>
         </p:txBody>
@@ -10176,12 +10353,33 @@
         </p:nvSpPr>
         <p:spPr/>
         <p:txBody>
-          <a:bodyPr/>
+          <a:bodyPr>
+            <a:normAutofit/>
+          </a:bodyPr>
           <a:lstStyle/>
           <a:p>
             <a:r>
+              <a:rPr lang="en-US" dirty="0" err="1"/>
+              <a:t>SKLearn</a:t>
+            </a:r>
+            <a:r>
               <a:rPr lang="en-US" dirty="0"/>
-              <a:t>Discussion for any of the results to the left</a:t>
+              <a:t> Logistic Regression model</a:t>
+            </a:r>
+          </a:p>
+          <a:p>
+            <a:r>
+              <a:rPr lang="en-US" dirty="0"/>
+              <a:t>Homegrown Logistic Regression model using gradient descent</a:t>
+            </a:r>
+          </a:p>
+          <a:p>
+            <a:pPr marL="0" indent="0">
+              <a:buNone/>
+            </a:pPr>
+            <a:r>
+              <a:rPr lang="en-US" dirty="0"/>
+              <a:t>We did not have sufficient time to perform CV on these two models, but ran them both through training and test sets to compare predictions and performance.</a:t>
             </a:r>
           </a:p>
         </p:txBody>
@@ -10189,7 +10387,7 @@
     </p:spTree>
     <p:extLst>
       <p:ext uri="{BB962C8B-B14F-4D97-AF65-F5344CB8AC3E}">
-        <p14:creationId xmlns:p14="http://schemas.microsoft.com/office/powerpoint/2010/main" val="3656580415"/>
+        <p14:creationId xmlns:p14="http://schemas.microsoft.com/office/powerpoint/2010/main" val="4092814027"/>
       </p:ext>
     </p:extLst>
   </p:cSld>
@@ -10261,6 +10459,209 @@
       </p:sp>
       <p:sp>
         <p:nvSpPr>
+          <p:cNvPr id="3" name="Text Placeholder 2">
+            <a:extLst>
+              <a:ext uri="{FF2B5EF4-FFF2-40B4-BE49-F238E27FC236}">
+                <a16:creationId xmlns:a16="http://schemas.microsoft.com/office/drawing/2014/main" id="{20A48431-64F0-3A41-9438-12793F22BE0C}"/>
+              </a:ext>
+            </a:extLst>
+          </p:cNvPr>
+          <p:cNvSpPr>
+            <a:spLocks noGrp="1"/>
+          </p:cNvSpPr>
+          <p:nvPr>
+            <p:ph type="body" idx="1"/>
+          </p:nvPr>
+        </p:nvSpPr>
+        <p:spPr/>
+        <p:txBody>
+          <a:bodyPr/>
+          <a:lstStyle/>
+          <a:p>
+            <a:r>
+              <a:rPr lang="en-US" dirty="0"/>
+              <a:t>Results Summary</a:t>
+            </a:r>
+          </a:p>
+        </p:txBody>
+      </p:sp>
+      <p:sp>
+        <p:nvSpPr>
+          <p:cNvPr id="4" name="Content Placeholder 3">
+            <a:extLst>
+              <a:ext uri="{FF2B5EF4-FFF2-40B4-BE49-F238E27FC236}">
+                <a16:creationId xmlns:a16="http://schemas.microsoft.com/office/drawing/2014/main" id="{7E935AF4-F7C7-9748-99D9-82C158F6E60A}"/>
+              </a:ext>
+            </a:extLst>
+          </p:cNvPr>
+          <p:cNvSpPr>
+            <a:spLocks noGrp="1"/>
+          </p:cNvSpPr>
+          <p:nvPr>
+            <p:ph sz="half" idx="2"/>
+          </p:nvPr>
+        </p:nvSpPr>
+        <p:spPr/>
+        <p:txBody>
+          <a:bodyPr/>
+          <a:lstStyle/>
+          <a:p>
+            <a:r>
+              <a:rPr lang="en-US" dirty="0"/>
+              <a:t>Explain</a:t>
+            </a:r>
+          </a:p>
+          <a:p>
+            <a:r>
+              <a:rPr lang="en-US" dirty="0"/>
+              <a:t>Analyze</a:t>
+            </a:r>
+          </a:p>
+          <a:p>
+            <a:r>
+              <a:rPr lang="en-US" dirty="0"/>
+              <a:t>Compare</a:t>
+            </a:r>
+          </a:p>
+          <a:p>
+            <a:r>
+              <a:rPr lang="en-US" dirty="0"/>
+              <a:t>Outcomes to be discussed</a:t>
+            </a:r>
+          </a:p>
+        </p:txBody>
+      </p:sp>
+      <p:sp>
+        <p:nvSpPr>
+          <p:cNvPr id="5" name="Text Placeholder 4">
+            <a:extLst>
+              <a:ext uri="{FF2B5EF4-FFF2-40B4-BE49-F238E27FC236}">
+                <a16:creationId xmlns:a16="http://schemas.microsoft.com/office/drawing/2014/main" id="{7E4336B0-BB02-A142-A285-FD9A822C128D}"/>
+              </a:ext>
+            </a:extLst>
+          </p:cNvPr>
+          <p:cNvSpPr>
+            <a:spLocks noGrp="1"/>
+          </p:cNvSpPr>
+          <p:nvPr>
+            <p:ph type="body" sz="quarter" idx="3"/>
+          </p:nvPr>
+        </p:nvSpPr>
+        <p:spPr/>
+        <p:txBody>
+          <a:bodyPr/>
+          <a:lstStyle/>
+          <a:p>
+            <a:r>
+              <a:rPr lang="en-US" dirty="0"/>
+              <a:t>Discussion</a:t>
+            </a:r>
+          </a:p>
+        </p:txBody>
+      </p:sp>
+      <p:sp>
+        <p:nvSpPr>
+          <p:cNvPr id="6" name="Content Placeholder 5">
+            <a:extLst>
+              <a:ext uri="{FF2B5EF4-FFF2-40B4-BE49-F238E27FC236}">
+                <a16:creationId xmlns:a16="http://schemas.microsoft.com/office/drawing/2014/main" id="{D12C8C3A-B4EC-FE46-AD92-3ADD3B823098}"/>
+              </a:ext>
+            </a:extLst>
+          </p:cNvPr>
+          <p:cNvSpPr>
+            <a:spLocks noGrp="1"/>
+          </p:cNvSpPr>
+          <p:nvPr>
+            <p:ph sz="quarter" idx="4"/>
+          </p:nvPr>
+        </p:nvSpPr>
+        <p:spPr/>
+        <p:txBody>
+          <a:bodyPr/>
+          <a:lstStyle/>
+          <a:p>
+            <a:r>
+              <a:rPr lang="en-US" dirty="0"/>
+              <a:t>Discussion for any of the results to the left</a:t>
+            </a:r>
+          </a:p>
+        </p:txBody>
+      </p:sp>
+    </p:spTree>
+    <p:extLst>
+      <p:ext uri="{BB962C8B-B14F-4D97-AF65-F5344CB8AC3E}">
+        <p14:creationId xmlns:p14="http://schemas.microsoft.com/office/powerpoint/2010/main" val="3656580415"/>
+      </p:ext>
+    </p:extLst>
+  </p:cSld>
+  <p:clrMapOvr>
+    <a:masterClrMapping/>
+  </p:clrMapOvr>
+</p:sld>
+</file>
+
+<file path=ppt/slides/slide13.xml><?xml version="1.0" encoding="utf-8"?>
+<p:sld xmlns:a="http://schemas.openxmlformats.org/drawingml/2006/main" xmlns:r="http://schemas.openxmlformats.org/officeDocument/2006/relationships" xmlns:p="http://schemas.openxmlformats.org/presentationml/2006/main">
+  <p:cSld>
+    <p:spTree>
+      <p:nvGrpSpPr>
+        <p:cNvPr id="1" name=""/>
+        <p:cNvGrpSpPr/>
+        <p:nvPr/>
+      </p:nvGrpSpPr>
+      <p:grpSpPr>
+        <a:xfrm>
+          <a:off x="0" y="0"/>
+          <a:ext cx="0" cy="0"/>
+          <a:chOff x="0" y="0"/>
+          <a:chExt cx="0" cy="0"/>
+        </a:xfrm>
+      </p:grpSpPr>
+      <p:sp>
+        <p:nvSpPr>
+          <p:cNvPr id="2" name="Title 1">
+            <a:extLst>
+              <a:ext uri="{FF2B5EF4-FFF2-40B4-BE49-F238E27FC236}">
+                <a16:creationId xmlns:a16="http://schemas.microsoft.com/office/drawing/2014/main" id="{0CAFC94C-B8F1-2F46-8429-1C6AC60091C5}"/>
+              </a:ext>
+            </a:extLst>
+          </p:cNvPr>
+          <p:cNvSpPr>
+            <a:spLocks noGrp="1"/>
+          </p:cNvSpPr>
+          <p:nvPr>
+            <p:ph type="title"/>
+          </p:nvPr>
+        </p:nvSpPr>
+        <p:spPr/>
+        <p:txBody>
+          <a:bodyPr/>
+          <a:lstStyle/>
+          <a:p>
+            <a:r>
+              <a:rPr lang="en-US" dirty="0"/>
+              <a:t>Metrics, Results, Discussion </a:t>
+            </a:r>
+            <a:r>
+              <a:rPr lang="en-US" sz="2400" dirty="0"/>
+              <a:t>- </a:t>
+            </a:r>
+            <a:r>
+              <a:rPr lang="en-US" sz="2400" dirty="0">
+                <a:solidFill>
+                  <a:schemeClr val="accent1">
+                    <a:lumMod val="50000"/>
+                  </a:schemeClr>
+                </a:solidFill>
+              </a:rPr>
+              <a:t>Ben</a:t>
+            </a:r>
+            <a:endParaRPr lang="en-US" sz="2400" dirty="0"/>
+          </a:p>
+        </p:txBody>
+      </p:sp>
+      <p:sp>
+        <p:nvSpPr>
           <p:cNvPr id="4" name="Content Placeholder 3">
             <a:extLst>
               <a:ext uri="{FF2B5EF4-FFF2-40B4-BE49-F238E27FC236}">
@@ -10345,7 +10746,7 @@
 </p:sld>
 </file>
 
-<file path=ppt/slides/slide13.xml><?xml version="1.0" encoding="utf-8"?>
+<file path=ppt/slides/slide14.xml><?xml version="1.0" encoding="utf-8"?>
 <p:sld xmlns:a="http://schemas.openxmlformats.org/drawingml/2006/main" xmlns:r="http://schemas.openxmlformats.org/officeDocument/2006/relationships" xmlns:p="http://schemas.openxmlformats.org/presentationml/2006/main">
   <p:cSld>
     <p:spTree>
@@ -10633,21 +11034,7 @@
           <a:p>
             <a:r>
               <a:rPr lang="en-US" dirty="0"/>
-              <a:t>Abstract </a:t>
-            </a:r>
-            <a:r>
-              <a:rPr lang="en-US" sz="2400" b="0" dirty="0"/>
-              <a:t>- </a:t>
-            </a:r>
-            <a:r>
-              <a:rPr lang="en-US" sz="2400" b="0" dirty="0" err="1">
-                <a:solidFill>
-                  <a:schemeClr val="accent1">
-                    <a:lumMod val="50000"/>
-                  </a:schemeClr>
-                </a:solidFill>
-              </a:rPr>
-              <a:t>Samin</a:t>
+              <a:t>Abstract</a:t>
             </a:r>
             <a:endParaRPr lang="en-US" b="0" dirty="0">
               <a:solidFill>
@@ -10831,24 +11218,6 @@
               <a:rPr lang="en-US" dirty="0"/>
               <a:t>Overview</a:t>
             </a:r>
-            <a:r>
-              <a:rPr lang="en-US" b="0" dirty="0"/>
-              <a:t> </a:t>
-            </a:r>
-            <a:r>
-              <a:rPr lang="en-US" sz="2400" b="0" dirty="0"/>
-              <a:t>- </a:t>
-            </a:r>
-            <a:r>
-              <a:rPr lang="en-US" sz="2400" b="0" dirty="0" err="1">
-                <a:solidFill>
-                  <a:schemeClr val="accent1">
-                    <a:lumMod val="50000"/>
-                  </a:schemeClr>
-                </a:solidFill>
-              </a:rPr>
-              <a:t>Samin</a:t>
-            </a:r>
             <a:endParaRPr lang="en-US" sz="2400" dirty="0"/>
           </a:p>
         </p:txBody>
@@ -11040,57 +11409,27 @@
             <p:ph type="title"/>
           </p:nvPr>
         </p:nvSpPr>
-        <p:spPr/>
-        <p:txBody>
-          <a:bodyPr/>
+        <p:spPr>
+          <a:xfrm>
+            <a:off x="713859" y="935829"/>
+            <a:ext cx="10571998" cy="576262"/>
+          </a:xfrm>
+        </p:spPr>
+        <p:txBody>
+          <a:bodyPr anchor="t"/>
           <a:lstStyle/>
           <a:p>
             <a:r>
-              <a:rPr lang="en-US" dirty="0"/>
-              <a:t>Data &amp; Tasks </a:t>
-            </a:r>
-            <a:r>
-              <a:rPr lang="en-US" sz="2400" dirty="0"/>
-              <a:t>- </a:t>
-            </a:r>
-            <a:r>
-              <a:rPr lang="en-US" sz="2400" dirty="0">
-                <a:solidFill>
-                  <a:schemeClr val="accent1">
-                    <a:lumMod val="50000"/>
-                  </a:schemeClr>
-                </a:solidFill>
-              </a:rPr>
-              <a:t>Lauren</a:t>
-            </a:r>
-          </a:p>
-        </p:txBody>
-      </p:sp>
-      <p:sp>
-        <p:nvSpPr>
-          <p:cNvPr id="3" name="Text Placeholder 2">
-            <a:extLst>
-              <a:ext uri="{FF2B5EF4-FFF2-40B4-BE49-F238E27FC236}">
-                <a16:creationId xmlns:a16="http://schemas.microsoft.com/office/drawing/2014/main" id="{FB175BCF-07D1-EC4F-B451-933F1AE1A4F3}"/>
-              </a:ext>
-            </a:extLst>
-          </p:cNvPr>
-          <p:cNvSpPr>
-            <a:spLocks noGrp="1"/>
-          </p:cNvSpPr>
-          <p:nvPr>
-            <p:ph type="body" idx="1"/>
-          </p:nvPr>
-        </p:nvSpPr>
-        <p:spPr/>
-        <p:txBody>
-          <a:bodyPr/>
-          <a:lstStyle/>
-          <a:p>
-            <a:r>
-              <a:rPr lang="en-US" dirty="0"/>
-              <a:t>Data Stats</a:t>
-            </a:r>
+              <a:rPr lang="en-US" sz="3600" dirty="0"/>
+              <a:t>Data – Description and Statistics</a:t>
+            </a:r>
+            <a:endParaRPr lang="en-US" sz="2000" dirty="0">
+              <a:solidFill>
+                <a:schemeClr val="accent1">
+                  <a:lumMod val="50000"/>
+                </a:schemeClr>
+              </a:solidFill>
+            </a:endParaRPr>
           </a:p>
         </p:txBody>
       </p:sp>
@@ -11112,7 +11451,7 @@
         </p:nvSpPr>
         <p:spPr>
           <a:xfrm>
-            <a:off x="814729" y="2751138"/>
+            <a:off x="810002" y="2210137"/>
             <a:ext cx="5189856" cy="3659674"/>
           </a:xfrm>
         </p:spPr>
@@ -11124,7 +11463,15 @@
           <a:p>
             <a:r>
               <a:rPr lang="en-US" dirty="0"/>
-              <a:t>Summarize # of images</a:t>
+              <a:t>12966 images varying in </a:t>
+            </a:r>
+            <a:r>
+              <a:rPr lang="en-US" dirty="0" err="1"/>
+              <a:t>filesize</a:t>
+            </a:r>
+            <a:r>
+              <a:rPr lang="en-US" dirty="0"/>
+              <a:t> from</a:t>
             </a:r>
           </a:p>
           <a:p>
@@ -11141,31 +11488,103 @@
           </a:p>
         </p:txBody>
       </p:sp>
-      <p:sp>
-        <p:nvSpPr>
-          <p:cNvPr id="5" name="Text Placeholder 4">
+      <p:pic>
+        <p:nvPicPr>
+          <p:cNvPr id="9" name="Picture 8" descr="Chart, box and whisker chart&#10;&#10;Description automatically generated">
             <a:extLst>
               <a:ext uri="{FF2B5EF4-FFF2-40B4-BE49-F238E27FC236}">
-                <a16:creationId xmlns:a16="http://schemas.microsoft.com/office/drawing/2014/main" id="{FAC477F1-4FBC-404B-AEEF-6A7653555993}"/>
+                <a16:creationId xmlns:a16="http://schemas.microsoft.com/office/drawing/2014/main" id="{1EF909B7-58B3-B740-A4B4-AAAC0CC90AF0}"/>
               </a:ext>
             </a:extLst>
           </p:cNvPr>
+          <p:cNvPicPr>
+            <a:picLocks noChangeAspect="1"/>
+          </p:cNvPicPr>
+          <p:nvPr/>
+        </p:nvPicPr>
+        <p:blipFill>
+          <a:blip r:embed="rId3"/>
+          <a:stretch>
+            <a:fillRect/>
+          </a:stretch>
+        </p:blipFill>
+        <p:spPr>
+          <a:xfrm>
+            <a:off x="312773" y="4182491"/>
+            <a:ext cx="5687085" cy="2309749"/>
+          </a:xfrm>
+          <a:prstGeom prst="rect">
+            <a:avLst/>
+          </a:prstGeom>
+        </p:spPr>
+      </p:pic>
+    </p:spTree>
+    <p:extLst>
+      <p:ext uri="{BB962C8B-B14F-4D97-AF65-F5344CB8AC3E}">
+        <p14:creationId xmlns:p14="http://schemas.microsoft.com/office/powerpoint/2010/main" val="3278842571"/>
+      </p:ext>
+    </p:extLst>
+  </p:cSld>
+  <p:clrMapOvr>
+    <a:masterClrMapping/>
+  </p:clrMapOvr>
+</p:sld>
+</file>
+
+<file path=ppt/slides/slide5.xml><?xml version="1.0" encoding="utf-8"?>
+<p:sld xmlns:a="http://schemas.openxmlformats.org/drawingml/2006/main" xmlns:r="http://schemas.openxmlformats.org/officeDocument/2006/relationships" xmlns:p="http://schemas.openxmlformats.org/presentationml/2006/main">
+  <p:cSld>
+    <p:spTree>
+      <p:nvGrpSpPr>
+        <p:cNvPr id="1" name=""/>
+        <p:cNvGrpSpPr/>
+        <p:nvPr/>
+      </p:nvGrpSpPr>
+      <p:grpSpPr>
+        <a:xfrm>
+          <a:off x="0" y="0"/>
+          <a:ext cx="0" cy="0"/>
+          <a:chOff x="0" y="0"/>
+          <a:chExt cx="0" cy="0"/>
+        </a:xfrm>
+      </p:grpSpPr>
+      <p:sp>
+        <p:nvSpPr>
+          <p:cNvPr id="2" name="Title 1">
+            <a:extLst>
+              <a:ext uri="{FF2B5EF4-FFF2-40B4-BE49-F238E27FC236}">
+                <a16:creationId xmlns:a16="http://schemas.microsoft.com/office/drawing/2014/main" id="{270EC188-A6EC-CA47-B52E-241DA02EA7A9}"/>
+              </a:ext>
+            </a:extLst>
+          </p:cNvPr>
           <p:cNvSpPr>
             <a:spLocks noGrp="1"/>
           </p:cNvSpPr>
           <p:nvPr>
-            <p:ph type="body" sz="quarter" idx="3"/>
-          </p:nvPr>
-        </p:nvSpPr>
-        <p:spPr/>
-        <p:txBody>
-          <a:bodyPr/>
+            <p:ph type="title"/>
+          </p:nvPr>
+        </p:nvSpPr>
+        <p:spPr>
+          <a:xfrm>
+            <a:off x="1008108" y="1123639"/>
+            <a:ext cx="10571998" cy="576262"/>
+          </a:xfrm>
+        </p:spPr>
+        <p:txBody>
+          <a:bodyPr anchor="t"/>
           <a:lstStyle/>
           <a:p>
             <a:r>
-              <a:rPr lang="en-US" dirty="0"/>
+              <a:rPr lang="en-US" sz="3600" dirty="0"/>
               <a:t>Data Tasks</a:t>
             </a:r>
+            <a:endParaRPr lang="en-US" sz="2000" dirty="0">
+              <a:solidFill>
+                <a:schemeClr val="accent1">
+                  <a:lumMod val="50000"/>
+                </a:schemeClr>
+              </a:solidFill>
+            </a:endParaRPr>
           </a:p>
         </p:txBody>
       </p:sp>
@@ -11187,8 +11606,8 @@
         </p:nvSpPr>
         <p:spPr>
           <a:xfrm>
-            <a:off x="6187415" y="2751138"/>
-            <a:ext cx="5194583" cy="3659674"/>
+            <a:off x="769595" y="2387671"/>
+            <a:ext cx="11049025" cy="3659674"/>
           </a:xfrm>
         </p:spPr>
         <p:txBody>
@@ -11205,7 +11624,15 @@
           <a:p>
             <a:r>
               <a:rPr lang="en-US" dirty="0"/>
-              <a:t>Import images &amp; examine shape</a:t>
+              <a:t>Unzip and import images &amp; examine width, height, ratios, </a:t>
+            </a:r>
+            <a:r>
+              <a:rPr lang="en-US" dirty="0" err="1"/>
+              <a:t>filesize</a:t>
+            </a:r>
+            <a:r>
+              <a:rPr lang="en-US" dirty="0"/>
+              <a:t>, etc.</a:t>
             </a:r>
           </a:p>
           <a:p>
@@ -11217,7 +11644,7 @@
           <a:p>
             <a:r>
               <a:rPr lang="en-US" dirty="0"/>
-              <a:t>Save resized images, bounding box and image data to </a:t>
+              <a:t>Convert resized image data to a </a:t>
             </a:r>
             <a:r>
               <a:rPr lang="en-US" dirty="0" err="1"/>
@@ -11225,19 +11652,68 @@
             </a:r>
             <a:r>
               <a:rPr lang="en-US" dirty="0"/>
-              <a:t> files as a checkpoint (later, describe memory issues)</a:t>
+              <a:t> array</a:t>
             </a:r>
           </a:p>
           <a:p>
             <a:r>
               <a:rPr lang="en-US" dirty="0"/>
-              <a:t>EDA </a:t>
-            </a:r>
-          </a:p>
-          <a:p>
+              <a:t>Save resized images, bounding box points and image labels to </a:t>
+            </a:r>
+            <a:r>
+              <a:rPr lang="en-US" dirty="0" err="1"/>
+              <a:t>numpy</a:t>
+            </a:r>
             <a:r>
               <a:rPr lang="en-US" dirty="0"/>
-              <a:t>Feature engineering</a:t>
+              <a:t> files as a checkpoint</a:t>
+            </a:r>
+          </a:p>
+          <a:p>
+            <a:r>
+              <a:rPr lang="en-US" dirty="0"/>
+              <a:t>Exploratory Data Analysis </a:t>
+            </a:r>
+          </a:p>
+          <a:p>
+            <a:r>
+              <a:rPr lang="en-US" dirty="0"/>
+              <a:t>Feature engineering, create additional columns from bounding box </a:t>
+            </a:r>
+            <a:r>
+              <a:rPr lang="en-US" dirty="0" err="1"/>
+              <a:t>XMin</a:t>
+            </a:r>
+            <a:r>
+              <a:rPr lang="en-US" dirty="0"/>
+              <a:t>, </a:t>
+            </a:r>
+            <a:r>
+              <a:rPr lang="en-US" dirty="0" err="1"/>
+              <a:t>YMin</a:t>
+            </a:r>
+            <a:r>
+              <a:rPr lang="en-US" dirty="0"/>
+              <a:t>, </a:t>
+            </a:r>
+            <a:r>
+              <a:rPr lang="en-US" dirty="0" err="1"/>
+              <a:t>XMax</a:t>
+            </a:r>
+            <a:r>
+              <a:rPr lang="en-US" dirty="0"/>
+              <a:t>, </a:t>
+            </a:r>
+            <a:r>
+              <a:rPr lang="en-US" dirty="0" err="1"/>
+              <a:t>YMax</a:t>
+            </a:r>
+            <a:endParaRPr lang="en-US" dirty="0"/>
+          </a:p>
+          <a:p>
+            <a:r>
+              <a:rPr lang="en-US" dirty="0"/>
+              <a:t>Train/Test split data</a:t>
             </a:r>
           </a:p>
         </p:txBody>
@@ -11255,7 +11731,7 @@
 </p:sld>
 </file>
 
-<file path=ppt/slides/slide5.xml><?xml version="1.0" encoding="utf-8"?>
+<file path=ppt/slides/slide6.xml><?xml version="1.0" encoding="utf-8"?>
 <p:sld xmlns:a="http://schemas.openxmlformats.org/drawingml/2006/main" xmlns:r="http://schemas.openxmlformats.org/officeDocument/2006/relationships" xmlns:p="http://schemas.openxmlformats.org/presentationml/2006/main">
   <p:cSld>
     <p:spTree>
@@ -12483,7 +12959,7 @@
 </p:sld>
 </file>
 
-<file path=ppt/slides/slide6.xml><?xml version="1.0" encoding="utf-8"?>
+<file path=ppt/slides/slide7.xml><?xml version="1.0" encoding="utf-8"?>
 <p:sld xmlns:a="http://schemas.openxmlformats.org/drawingml/2006/main" xmlns:r="http://schemas.openxmlformats.org/officeDocument/2006/relationships" xmlns:p="http://schemas.openxmlformats.org/presentationml/2006/main">
   <p:cSld>
     <p:spTree>
@@ -13974,210 +14450,6 @@
 </p:sld>
 </file>
 
-<file path=ppt/slides/slide7.xml><?xml version="1.0" encoding="utf-8"?>
-<p:sld xmlns:a="http://schemas.openxmlformats.org/drawingml/2006/main" xmlns:r="http://schemas.openxmlformats.org/officeDocument/2006/relationships" xmlns:p="http://schemas.openxmlformats.org/presentationml/2006/main">
-  <p:cSld>
-    <p:spTree>
-      <p:nvGrpSpPr>
-        <p:cNvPr id="1" name=""/>
-        <p:cNvGrpSpPr/>
-        <p:nvPr/>
-      </p:nvGrpSpPr>
-      <p:grpSpPr>
-        <a:xfrm>
-          <a:off x="0" y="0"/>
-          <a:ext cx="0" cy="0"/>
-          <a:chOff x="0" y="0"/>
-          <a:chExt cx="0" cy="0"/>
-        </a:xfrm>
-      </p:grpSpPr>
-      <p:sp>
-        <p:nvSpPr>
-          <p:cNvPr id="2" name="Title 1">
-            <a:extLst>
-              <a:ext uri="{FF2B5EF4-FFF2-40B4-BE49-F238E27FC236}">
-                <a16:creationId xmlns:a16="http://schemas.microsoft.com/office/drawing/2014/main" id="{270EC188-A6EC-CA47-B52E-241DA02EA7A9}"/>
-              </a:ext>
-            </a:extLst>
-          </p:cNvPr>
-          <p:cNvSpPr>
-            <a:spLocks noGrp="1"/>
-          </p:cNvSpPr>
-          <p:nvPr>
-            <p:ph type="title"/>
-          </p:nvPr>
-        </p:nvSpPr>
-        <p:spPr/>
-        <p:txBody>
-          <a:bodyPr/>
-          <a:lstStyle/>
-          <a:p>
-            <a:r>
-              <a:rPr lang="en-US" dirty="0"/>
-              <a:t>EDA and Feature Engineering </a:t>
-            </a:r>
-            <a:r>
-              <a:rPr lang="en-US" sz="2400" dirty="0"/>
-              <a:t>- </a:t>
-            </a:r>
-            <a:r>
-              <a:rPr lang="en-US" sz="2400" dirty="0">
-                <a:solidFill>
-                  <a:schemeClr val="accent1">
-                    <a:lumMod val="50000"/>
-                  </a:schemeClr>
-                </a:solidFill>
-              </a:rPr>
-              <a:t>Lauren</a:t>
-            </a:r>
-            <a:endParaRPr lang="en-US" sz="2400" dirty="0"/>
-          </a:p>
-        </p:txBody>
-      </p:sp>
-      <p:sp>
-        <p:nvSpPr>
-          <p:cNvPr id="3" name="Text Placeholder 2">
-            <a:extLst>
-              <a:ext uri="{FF2B5EF4-FFF2-40B4-BE49-F238E27FC236}">
-                <a16:creationId xmlns:a16="http://schemas.microsoft.com/office/drawing/2014/main" id="{FB175BCF-07D1-EC4F-B451-933F1AE1A4F3}"/>
-              </a:ext>
-            </a:extLst>
-          </p:cNvPr>
-          <p:cNvSpPr>
-            <a:spLocks noGrp="1"/>
-          </p:cNvSpPr>
-          <p:nvPr>
-            <p:ph type="body" idx="1"/>
-          </p:nvPr>
-        </p:nvSpPr>
-        <p:spPr/>
-        <p:txBody>
-          <a:bodyPr/>
-          <a:lstStyle/>
-          <a:p>
-            <a:r>
-              <a:rPr lang="en-US" dirty="0"/>
-              <a:t>Correlation, Missing Data, </a:t>
-            </a:r>
-            <a:r>
-              <a:rPr lang="en-US" dirty="0" err="1"/>
-              <a:t>etc</a:t>
-            </a:r>
-            <a:endParaRPr lang="en-US" dirty="0"/>
-          </a:p>
-        </p:txBody>
-      </p:sp>
-      <p:sp>
-        <p:nvSpPr>
-          <p:cNvPr id="4" name="Content Placeholder 3">
-            <a:extLst>
-              <a:ext uri="{FF2B5EF4-FFF2-40B4-BE49-F238E27FC236}">
-                <a16:creationId xmlns:a16="http://schemas.microsoft.com/office/drawing/2014/main" id="{FBCB5062-A64F-C148-B1C2-CEAC9BB01156}"/>
-              </a:ext>
-            </a:extLst>
-          </p:cNvPr>
-          <p:cNvSpPr>
-            <a:spLocks noGrp="1"/>
-          </p:cNvSpPr>
-          <p:nvPr>
-            <p:ph sz="half" idx="2"/>
-          </p:nvPr>
-        </p:nvSpPr>
-        <p:spPr>
-          <a:xfrm>
-            <a:off x="814729" y="2751138"/>
-            <a:ext cx="5189856" cy="3908454"/>
-          </a:xfrm>
-        </p:spPr>
-        <p:txBody>
-          <a:bodyPr>
-            <a:normAutofit/>
-          </a:bodyPr>
-          <a:lstStyle/>
-          <a:p>
-            <a:r>
-              <a:rPr lang="en-US" dirty="0"/>
-              <a:t>TBD</a:t>
-            </a:r>
-          </a:p>
-        </p:txBody>
-      </p:sp>
-      <p:sp>
-        <p:nvSpPr>
-          <p:cNvPr id="5" name="Text Placeholder 4">
-            <a:extLst>
-              <a:ext uri="{FF2B5EF4-FFF2-40B4-BE49-F238E27FC236}">
-                <a16:creationId xmlns:a16="http://schemas.microsoft.com/office/drawing/2014/main" id="{FAC477F1-4FBC-404B-AEEF-6A7653555993}"/>
-              </a:ext>
-            </a:extLst>
-          </p:cNvPr>
-          <p:cNvSpPr>
-            <a:spLocks noGrp="1"/>
-          </p:cNvSpPr>
-          <p:nvPr>
-            <p:ph type="body" sz="quarter" idx="3"/>
-          </p:nvPr>
-        </p:nvSpPr>
-        <p:spPr/>
-        <p:txBody>
-          <a:bodyPr/>
-          <a:lstStyle/>
-          <a:p>
-            <a:r>
-              <a:rPr lang="en-US" dirty="0"/>
-              <a:t>Feature Engineering</a:t>
-            </a:r>
-          </a:p>
-        </p:txBody>
-      </p:sp>
-      <p:sp>
-        <p:nvSpPr>
-          <p:cNvPr id="6" name="Content Placeholder 5">
-            <a:extLst>
-              <a:ext uri="{FF2B5EF4-FFF2-40B4-BE49-F238E27FC236}">
-                <a16:creationId xmlns:a16="http://schemas.microsoft.com/office/drawing/2014/main" id="{C3DC9D5F-B396-8A46-BF7D-C05C7AE76AFC}"/>
-              </a:ext>
-            </a:extLst>
-          </p:cNvPr>
-          <p:cNvSpPr>
-            <a:spLocks noGrp="1"/>
-          </p:cNvSpPr>
-          <p:nvPr>
-            <p:ph sz="quarter" idx="4"/>
-          </p:nvPr>
-        </p:nvSpPr>
-        <p:spPr>
-          <a:xfrm>
-            <a:off x="6187415" y="2751138"/>
-            <a:ext cx="5194583" cy="3908454"/>
-          </a:xfrm>
-        </p:spPr>
-        <p:txBody>
-          <a:bodyPr>
-            <a:normAutofit/>
-          </a:bodyPr>
-          <a:lstStyle/>
-          <a:p>
-            <a:r>
-              <a:rPr lang="en-US" dirty="0"/>
-              <a:t>Describe transformer</a:t>
-            </a:r>
-          </a:p>
-        </p:txBody>
-      </p:sp>
-    </p:spTree>
-    <p:extLst>
-      <p:ext uri="{BB962C8B-B14F-4D97-AF65-F5344CB8AC3E}">
-        <p14:creationId xmlns:p14="http://schemas.microsoft.com/office/powerpoint/2010/main" val="1234540890"/>
-      </p:ext>
-    </p:extLst>
-  </p:cSld>
-  <p:clrMapOvr>
-    <a:masterClrMapping/>
-  </p:clrMapOvr>
-</p:sld>
-</file>
-
 <file path=ppt/slides/slide8.xml><?xml version="1.0" encoding="utf-8"?>
 <p:sld xmlns:a="http://schemas.openxmlformats.org/drawingml/2006/main" xmlns:r="http://schemas.openxmlformats.org/officeDocument/2006/relationships" xmlns:p="http://schemas.openxmlformats.org/presentationml/2006/main">
   <p:cSld>
@@ -14200,7 +14472,7 @@
           <p:cNvPr id="2" name="Title 1">
             <a:extLst>
               <a:ext uri="{FF2B5EF4-FFF2-40B4-BE49-F238E27FC236}">
-                <a16:creationId xmlns:a16="http://schemas.microsoft.com/office/drawing/2014/main" id="{D9D8CB60-0A8C-9C4B-A752-E6E560BA3B7A}"/>
+                <a16:creationId xmlns:a16="http://schemas.microsoft.com/office/drawing/2014/main" id="{270EC188-A6EC-CA47-B52E-241DA02EA7A9}"/>
               </a:ext>
             </a:extLst>
           </p:cNvPr>
@@ -14218,7 +14490,7 @@
           <a:p>
             <a:r>
               <a:rPr lang="en-US" dirty="0"/>
-              <a:t>Pipelines </a:t>
+              <a:t>EDA and Feature Engineering </a:t>
             </a:r>
             <a:r>
               <a:rPr lang="en-US" sz="2400" dirty="0"/>
@@ -14243,7 +14515,7 @@
           <p:cNvPr id="3" name="Text Placeholder 2">
             <a:extLst>
               <a:ext uri="{FF2B5EF4-FFF2-40B4-BE49-F238E27FC236}">
-                <a16:creationId xmlns:a16="http://schemas.microsoft.com/office/drawing/2014/main" id="{5BDCF00A-B562-A54D-BF9D-1AE3FA38C9A2}"/>
+                <a16:creationId xmlns:a16="http://schemas.microsoft.com/office/drawing/2014/main" id="{FB175BCF-07D1-EC4F-B451-933F1AE1A4F3}"/>
               </a:ext>
             </a:extLst>
           </p:cNvPr>
@@ -14259,7 +14531,15 @@
           <a:bodyPr/>
           <a:lstStyle/>
           <a:p>
-            <a:endParaRPr lang="en-US"/>
+            <a:r>
+              <a:rPr lang="en-US" dirty="0"/>
+              <a:t>Correlation, Missing Data, </a:t>
+            </a:r>
+            <a:r>
+              <a:rPr lang="en-US" dirty="0" err="1"/>
+              <a:t>etc</a:t>
+            </a:r>
+            <a:endParaRPr lang="en-US" dirty="0"/>
           </a:p>
         </p:txBody>
       </p:sp>
@@ -14268,7 +14548,7 @@
           <p:cNvPr id="4" name="Content Placeholder 3">
             <a:extLst>
               <a:ext uri="{FF2B5EF4-FFF2-40B4-BE49-F238E27FC236}">
-                <a16:creationId xmlns:a16="http://schemas.microsoft.com/office/drawing/2014/main" id="{E7B95454-C76B-DC4E-8B7F-B8A3CFDCD7C8}"/>
+                <a16:creationId xmlns:a16="http://schemas.microsoft.com/office/drawing/2014/main" id="{FBCB5062-A64F-C148-B1C2-CEAC9BB01156}"/>
               </a:ext>
             </a:extLst>
           </p:cNvPr>
@@ -14279,12 +14559,22 @@
             <p:ph sz="half" idx="2"/>
           </p:nvPr>
         </p:nvSpPr>
-        <p:spPr/>
-        <p:txBody>
-          <a:bodyPr/>
+        <p:spPr>
+          <a:xfrm>
+            <a:off x="814729" y="2751138"/>
+            <a:ext cx="5189856" cy="3908454"/>
+          </a:xfrm>
+        </p:spPr>
+        <p:txBody>
+          <a:bodyPr>
+            <a:normAutofit/>
+          </a:bodyPr>
           <a:lstStyle/>
           <a:p>
-            <a:endParaRPr lang="en-US"/>
+            <a:r>
+              <a:rPr lang="en-US" dirty="0"/>
+              <a:t>TBD</a:t>
+            </a:r>
           </a:p>
         </p:txBody>
       </p:sp>
@@ -14293,7 +14583,7 @@
           <p:cNvPr id="5" name="Text Placeholder 4">
             <a:extLst>
               <a:ext uri="{FF2B5EF4-FFF2-40B4-BE49-F238E27FC236}">
-                <a16:creationId xmlns:a16="http://schemas.microsoft.com/office/drawing/2014/main" id="{20ADD62E-D885-B34E-9B41-F05823741C00}"/>
+                <a16:creationId xmlns:a16="http://schemas.microsoft.com/office/drawing/2014/main" id="{FAC477F1-4FBC-404B-AEEF-6A7653555993}"/>
               </a:ext>
             </a:extLst>
           </p:cNvPr>
@@ -14309,7 +14599,10 @@
           <a:bodyPr/>
           <a:lstStyle/>
           <a:p>
-            <a:endParaRPr lang="en-US"/>
+            <a:r>
+              <a:rPr lang="en-US" dirty="0"/>
+              <a:t>Feature Engineering</a:t>
+            </a:r>
           </a:p>
         </p:txBody>
       </p:sp>
@@ -14318,7 +14611,7 @@
           <p:cNvPr id="6" name="Content Placeholder 5">
             <a:extLst>
               <a:ext uri="{FF2B5EF4-FFF2-40B4-BE49-F238E27FC236}">
-                <a16:creationId xmlns:a16="http://schemas.microsoft.com/office/drawing/2014/main" id="{D4537803-017A-6C43-8965-23235FD67E2B}"/>
+                <a16:creationId xmlns:a16="http://schemas.microsoft.com/office/drawing/2014/main" id="{C3DC9D5F-B396-8A46-BF7D-C05C7AE76AFC}"/>
               </a:ext>
             </a:extLst>
           </p:cNvPr>
@@ -14329,19 +14622,29 @@
             <p:ph sz="quarter" idx="4"/>
           </p:nvPr>
         </p:nvSpPr>
-        <p:spPr/>
-        <p:txBody>
-          <a:bodyPr/>
+        <p:spPr>
+          <a:xfrm>
+            <a:off x="6187415" y="2751138"/>
+            <a:ext cx="5194583" cy="3908454"/>
+          </a:xfrm>
+        </p:spPr>
+        <p:txBody>
+          <a:bodyPr>
+            <a:normAutofit/>
+          </a:bodyPr>
           <a:lstStyle/>
           <a:p>
-            <a:endParaRPr lang="en-US"/>
+            <a:r>
+              <a:rPr lang="en-US" dirty="0"/>
+              <a:t>Describe transformer</a:t>
+            </a:r>
           </a:p>
         </p:txBody>
       </p:sp>
     </p:spTree>
     <p:extLst>
       <p:ext uri="{BB962C8B-B14F-4D97-AF65-F5344CB8AC3E}">
-        <p14:creationId xmlns:p14="http://schemas.microsoft.com/office/powerpoint/2010/main" val="1994469208"/>
+        <p14:creationId xmlns:p14="http://schemas.microsoft.com/office/powerpoint/2010/main" val="1234540890"/>
       </p:ext>
     </p:extLst>
   </p:cSld>
@@ -14373,7 +14676,7 @@
           <p:cNvPr id="2" name="Title 1">
             <a:extLst>
               <a:ext uri="{FF2B5EF4-FFF2-40B4-BE49-F238E27FC236}">
-                <a16:creationId xmlns:a16="http://schemas.microsoft.com/office/drawing/2014/main" id="{0CAFC94C-B8F1-2F46-8429-1C6AC60091C5}"/>
+                <a16:creationId xmlns:a16="http://schemas.microsoft.com/office/drawing/2014/main" id="{D9D8CB60-0A8C-9C4B-A752-E6E560BA3B7A}"/>
               </a:ext>
             </a:extLst>
           </p:cNvPr>
@@ -14391,7 +14694,7 @@
           <a:p>
             <a:r>
               <a:rPr lang="en-US" dirty="0"/>
-              <a:t>Models </a:t>
+              <a:t>Pipelines </a:t>
             </a:r>
             <a:r>
               <a:rPr lang="en-US" sz="2400" dirty="0"/>
@@ -14405,7 +14708,7 @@
                   </a:schemeClr>
                 </a:solidFill>
               </a:rPr>
-              <a:t>Mangesh</a:t>
+              <a:t>Lauren</a:t>
             </a:r>
             <a:endParaRPr lang="en-US" sz="2400" dirty="0"/>
           </a:p>
@@ -14416,7 +14719,7 @@
           <p:cNvPr id="3" name="Text Placeholder 2">
             <a:extLst>
               <a:ext uri="{FF2B5EF4-FFF2-40B4-BE49-F238E27FC236}">
-                <a16:creationId xmlns:a16="http://schemas.microsoft.com/office/drawing/2014/main" id="{20A48431-64F0-3A41-9438-12793F22BE0C}"/>
+                <a16:creationId xmlns:a16="http://schemas.microsoft.com/office/drawing/2014/main" id="{5BDCF00A-B562-A54D-BF9D-1AE3FA38C9A2}"/>
               </a:ext>
             </a:extLst>
           </p:cNvPr>
@@ -14432,11 +14735,7 @@
           <a:bodyPr/>
           <a:lstStyle/>
           <a:p>
-            <a:pPr algn="l"/>
-            <a:r>
-              <a:rPr lang="en-US" b="1" dirty="0"/>
-              <a:t>Bounding Box Prediction Models</a:t>
-            </a:r>
+            <a:endParaRPr lang="en-US"/>
           </a:p>
         </p:txBody>
       </p:sp>
@@ -14445,7 +14744,7 @@
           <p:cNvPr id="4" name="Content Placeholder 3">
             <a:extLst>
               <a:ext uri="{FF2B5EF4-FFF2-40B4-BE49-F238E27FC236}">
-                <a16:creationId xmlns:a16="http://schemas.microsoft.com/office/drawing/2014/main" id="{7E935AF4-F7C7-9748-99D9-82C158F6E60A}"/>
+                <a16:creationId xmlns:a16="http://schemas.microsoft.com/office/drawing/2014/main" id="{E7B95454-C76B-DC4E-8B7F-B8A3CFDCD7C8}"/>
               </a:ext>
             </a:extLst>
           </p:cNvPr>
@@ -14456,25 +14755,12 @@
             <p:ph sz="half" idx="2"/>
           </p:nvPr>
         </p:nvSpPr>
-        <p:spPr>
-          <a:xfrm>
-            <a:off x="814729" y="2751138"/>
-            <a:ext cx="5189856" cy="3409632"/>
-          </a:xfrm>
-        </p:spPr>
-        <p:txBody>
-          <a:bodyPr>
-            <a:normAutofit/>
-          </a:bodyPr>
+        <p:spPr/>
+        <p:txBody>
+          <a:bodyPr/>
           <a:lstStyle/>
           <a:p>
-            <a:pPr marL="0" indent="0">
-              <a:buNone/>
-            </a:pPr>
-            <a:r>
-              <a:rPr lang="en-US" dirty="0"/>
-              <a:t>describe</a:t>
-            </a:r>
+            <a:endParaRPr lang="en-US"/>
           </a:p>
         </p:txBody>
       </p:sp>
@@ -14483,7 +14769,7 @@
           <p:cNvPr id="5" name="Text Placeholder 4">
             <a:extLst>
               <a:ext uri="{FF2B5EF4-FFF2-40B4-BE49-F238E27FC236}">
-                <a16:creationId xmlns:a16="http://schemas.microsoft.com/office/drawing/2014/main" id="{7E4336B0-BB02-A142-A285-FD9A822C128D}"/>
+                <a16:creationId xmlns:a16="http://schemas.microsoft.com/office/drawing/2014/main" id="{20ADD62E-D885-B34E-9B41-F05823741C00}"/>
               </a:ext>
             </a:extLst>
           </p:cNvPr>
@@ -14499,11 +14785,7 @@
           <a:bodyPr/>
           <a:lstStyle/>
           <a:p>
-            <a:pPr algn="l"/>
-            <a:r>
-              <a:rPr lang="en-US" b="1" dirty="0"/>
-              <a:t>Classification Models</a:t>
-            </a:r>
+            <a:endParaRPr lang="en-US"/>
           </a:p>
         </p:txBody>
       </p:sp>
@@ -14512,7 +14794,7 @@
           <p:cNvPr id="6" name="Content Placeholder 5">
             <a:extLst>
               <a:ext uri="{FF2B5EF4-FFF2-40B4-BE49-F238E27FC236}">
-                <a16:creationId xmlns:a16="http://schemas.microsoft.com/office/drawing/2014/main" id="{D12C8C3A-B4EC-FE46-AD92-3ADD3B823098}"/>
+                <a16:creationId xmlns:a16="http://schemas.microsoft.com/office/drawing/2014/main" id="{D4537803-017A-6C43-8965-23235FD67E2B}"/>
               </a:ext>
             </a:extLst>
           </p:cNvPr>
@@ -14525,25 +14807,17 @@
         </p:nvSpPr>
         <p:spPr/>
         <p:txBody>
-          <a:bodyPr>
-            <a:normAutofit/>
-          </a:bodyPr>
+          <a:bodyPr/>
           <a:lstStyle/>
           <a:p>
-            <a:pPr marL="0" indent="0">
-              <a:buNone/>
-            </a:pPr>
-            <a:r>
-              <a:rPr lang="en-US" dirty="0"/>
-              <a:t>describe</a:t>
-            </a:r>
+            <a:endParaRPr lang="en-US"/>
           </a:p>
         </p:txBody>
       </p:sp>
     </p:spTree>
     <p:extLst>
       <p:ext uri="{BB962C8B-B14F-4D97-AF65-F5344CB8AC3E}">
-        <p14:creationId xmlns:p14="http://schemas.microsoft.com/office/powerpoint/2010/main" val="2995467700"/>
+        <p14:creationId xmlns:p14="http://schemas.microsoft.com/office/powerpoint/2010/main" val="1994469208"/>
       </p:ext>
     </p:extLst>
   </p:cSld>

</xml_diff>

<commit_message>
Updated slides and finished Conclusion statement. Still needs more for Metrics sllide and Data slides.
</commit_message>
<xml_diff>
--- a/other/Group2_Phase1.pptx
+++ b/other/Group2_Phase1.pptx
@@ -5,7 +5,7 @@
     <p:sldMasterId id="2147483660" r:id="rId1"/>
   </p:sldMasterIdLst>
   <p:notesMasterIdLst>
-    <p:notesMasterId r:id="rId16"/>
+    <p:notesMasterId r:id="rId15"/>
   </p:notesMasterIdLst>
   <p:sldIdLst>
     <p:sldId id="256" r:id="rId2"/>
@@ -17,11 +17,10 @@
     <p:sldId id="263" r:id="rId8"/>
     <p:sldId id="259" r:id="rId9"/>
     <p:sldId id="260" r:id="rId10"/>
-    <p:sldId id="268" r:id="rId11"/>
-    <p:sldId id="261" r:id="rId12"/>
-    <p:sldId id="265" r:id="rId13"/>
-    <p:sldId id="266" r:id="rId14"/>
-    <p:sldId id="262" r:id="rId15"/>
+    <p:sldId id="261" r:id="rId11"/>
+    <p:sldId id="265" r:id="rId12"/>
+    <p:sldId id="266" r:id="rId13"/>
+    <p:sldId id="262" r:id="rId14"/>
   </p:sldIdLst>
   <p:sldSz cx="12192000" cy="6858000"/>
   <p:notesSz cx="6858000" cy="9144000"/>
@@ -989,7 +988,7 @@
     </p:spTree>
     <p:extLst>
       <p:ext uri="{BB962C8B-B14F-4D97-AF65-F5344CB8AC3E}">
-        <p14:creationId xmlns:p14="http://schemas.microsoft.com/office/powerpoint/2010/main" val="3148085847"/>
+        <p14:creationId xmlns:p14="http://schemas.microsoft.com/office/powerpoint/2010/main" val="710768679"/>
       </p:ext>
     </p:extLst>
   </p:cSld>
@@ -1224,7 +1223,7 @@
     </p:spTree>
     <p:extLst>
       <p:ext uri="{BB962C8B-B14F-4D97-AF65-F5344CB8AC3E}">
-        <p14:creationId xmlns:p14="http://schemas.microsoft.com/office/powerpoint/2010/main" val="710768679"/>
+        <p14:creationId xmlns:p14="http://schemas.microsoft.com/office/powerpoint/2010/main" val="2487888159"/>
       </p:ext>
     </p:extLst>
   </p:cSld>
@@ -1296,78 +1295,28 @@
               <a:defRPr/>
             </a:pPr>
             <a:r>
-              <a:rPr lang="en-US" sz="1200" b="0" i="0" kern="1200" dirty="0">
-                <a:solidFill>
-                  <a:schemeClr val="tx1"/>
-                </a:solidFill>
-                <a:effectLst/>
-                <a:latin typeface="+mn-lt"/>
-                <a:ea typeface="+mn-ea"/>
-                <a:cs typeface="+mn-cs"/>
-              </a:rPr>
-              <a:t>This criterion is linked to a Learning Outcome</a:t>
-            </a:r>
-          </a:p>
-          <a:p>
-            <a:pPr marL="0" marR="0" lvl="0" indent="0" algn="l" defTabSz="914400" rtl="0" eaLnBrk="1" fontAlgn="auto" latinLnBrk="0" hangingPunct="1">
-              <a:lnSpc>
-                <a:spcPct val="100000"/>
-              </a:lnSpc>
-              <a:spcBef>
-                <a:spcPts val="0"/>
-              </a:spcBef>
-              <a:spcAft>
-                <a:spcPts val="0"/>
-              </a:spcAft>
-              <a:buClrTx/>
-              <a:buSzTx/>
-              <a:buFontTx/>
-              <a:buNone/>
-              <a:tabLst/>
-              <a:defRPr/>
-            </a:pPr>
-            <a:r>
-              <a:rPr lang="en-US" sz="1200" b="0" i="0" kern="1200" dirty="0">
-                <a:solidFill>
-                  <a:schemeClr val="tx1"/>
-                </a:solidFill>
-                <a:effectLst/>
-                <a:latin typeface="+mn-lt"/>
-                <a:ea typeface="+mn-ea"/>
-                <a:cs typeface="+mn-cs"/>
-              </a:rPr>
-              <a:t>Results and discussion of results</a:t>
-            </a:r>
-          </a:p>
-          <a:p>
-            <a:pPr marL="0" marR="0" lvl="0" indent="0" algn="l" defTabSz="914400" rtl="0" eaLnBrk="1" fontAlgn="auto" latinLnBrk="0" hangingPunct="1">
-              <a:lnSpc>
-                <a:spcPct val="100000"/>
-              </a:lnSpc>
-              <a:spcBef>
-                <a:spcPts val="0"/>
-              </a:spcBef>
-              <a:spcAft>
-                <a:spcPts val="0"/>
-              </a:spcAft>
-              <a:buClrTx/>
-              <a:buSzTx/>
-              <a:buFontTx/>
-              <a:buNone/>
-              <a:tabLst/>
-              <a:defRPr/>
-            </a:pPr>
-            <a:r>
-              <a:rPr lang="en-US" sz="1200" b="0" i="0" kern="1200" dirty="0">
-                <a:solidFill>
-                  <a:schemeClr val="tx1"/>
-                </a:solidFill>
-                <a:effectLst/>
-                <a:latin typeface="+mn-lt"/>
-                <a:ea typeface="+mn-ea"/>
-                <a:cs typeface="+mn-cs"/>
-              </a:rPr>
-              <a:t>Expectations here are to provide the following in sections and subsections:</a:t>
+              <a:rPr lang="en-US" sz="1200" b="0" i="0" kern="1200" dirty="0" err="1">
+                <a:solidFill>
+                  <a:schemeClr val="tx1"/>
+                </a:solidFill>
+                <a:effectLst/>
+                <a:latin typeface="+mn-lt"/>
+                <a:ea typeface="+mn-ea"/>
+                <a:cs typeface="+mn-cs"/>
+              </a:rPr>
+              <a:t>ConclusionExpectations</a:t>
+            </a:r>
+            <a:r>
+              <a:rPr lang="en-US" sz="1200" b="0" i="0" kern="1200" dirty="0">
+                <a:solidFill>
+                  <a:schemeClr val="tx1"/>
+                </a:solidFill>
+                <a:effectLst/>
+                <a:latin typeface="+mn-lt"/>
+                <a:ea typeface="+mn-ea"/>
+                <a:cs typeface="+mn-cs"/>
+              </a:rPr>
+              <a:t> here are to address the following following in your conclusion (in about 150 words) in a main section by itself:</a:t>
             </a:r>
             <a:br>
               <a:rPr lang="en-US" sz="1200" b="0" i="0" kern="1200" dirty="0">
@@ -1401,31 +1350,143 @@
                 <a:ea typeface="+mn-ea"/>
                 <a:cs typeface="+mn-cs"/>
               </a:rPr>
-              <a:t>Discussion’s aim is result interpretation, which means explain, </a:t>
-            </a:r>
-            <a:r>
-              <a:rPr lang="en-US" sz="1200" b="0" i="0" kern="1200" dirty="0" err="1">
-                <a:solidFill>
-                  <a:schemeClr val="tx1"/>
-                </a:solidFill>
-                <a:effectLst/>
-                <a:latin typeface="+mn-lt"/>
-                <a:ea typeface="+mn-ea"/>
-                <a:cs typeface="+mn-cs"/>
-              </a:rPr>
-              <a:t>analyse</a:t>
-            </a:r>
-            <a:r>
-              <a:rPr lang="en-US" sz="1200" b="0" i="0" kern="1200" dirty="0">
-                <a:solidFill>
-                  <a:schemeClr val="tx1"/>
-                </a:solidFill>
-                <a:effectLst/>
-                <a:latin typeface="+mn-lt"/>
-                <a:ea typeface="+mn-ea"/>
-                <a:cs typeface="+mn-cs"/>
-              </a:rPr>
-              <a:t>, and compare them. Often, this part is the most important, simply because it lets the researcher take a step back and give a broader look at the experiment. Do not discuss any outcomes not presented in the results part.</a:t>
+              <a:t>-- Restate your project focus explain why it’s important. Make sure that this part of the conclusion is concise and clear.</a:t>
+            </a:r>
+            <a:br>
+              <a:rPr lang="en-US" sz="1200" b="0" i="0" kern="1200" dirty="0">
+                <a:solidFill>
+                  <a:schemeClr val="tx1"/>
+                </a:solidFill>
+                <a:effectLst/>
+                <a:latin typeface="+mn-lt"/>
+                <a:ea typeface="+mn-ea"/>
+                <a:cs typeface="+mn-cs"/>
+              </a:rPr>
+            </a:br>
+            <a:br>
+              <a:rPr lang="en-US" sz="1200" b="0" i="0" kern="1200" dirty="0">
+                <a:solidFill>
+                  <a:schemeClr val="tx1"/>
+                </a:solidFill>
+                <a:effectLst/>
+                <a:latin typeface="+mn-lt"/>
+                <a:ea typeface="+mn-ea"/>
+                <a:cs typeface="+mn-cs"/>
+              </a:rPr>
+            </a:br>
+            <a:r>
+              <a:rPr lang="en-US" sz="1200" b="0" i="0" kern="1200" dirty="0">
+                <a:solidFill>
+                  <a:schemeClr val="tx1"/>
+                </a:solidFill>
+                <a:effectLst/>
+                <a:latin typeface="+mn-lt"/>
+                <a:ea typeface="+mn-ea"/>
+                <a:cs typeface="+mn-cs"/>
+              </a:rPr>
+              <a:t>-- Restate your hypothesis (e.g., ML pipelines with custom features can accurately forecast box office returns)</a:t>
+            </a:r>
+            <a:br>
+              <a:rPr lang="en-US" sz="1200" b="0" i="0" kern="1200" dirty="0">
+                <a:solidFill>
+                  <a:schemeClr val="tx1"/>
+                </a:solidFill>
+                <a:effectLst/>
+                <a:latin typeface="+mn-lt"/>
+                <a:ea typeface="+mn-ea"/>
+                <a:cs typeface="+mn-cs"/>
+              </a:rPr>
+            </a:br>
+            <a:br>
+              <a:rPr lang="en-US" sz="1200" b="0" i="0" kern="1200" dirty="0">
+                <a:solidFill>
+                  <a:schemeClr val="tx1"/>
+                </a:solidFill>
+                <a:effectLst/>
+                <a:latin typeface="+mn-lt"/>
+                <a:ea typeface="+mn-ea"/>
+                <a:cs typeface="+mn-cs"/>
+              </a:rPr>
+            </a:br>
+            <a:r>
+              <a:rPr lang="en-US" sz="1200" b="0" i="0" kern="1200" dirty="0">
+                <a:solidFill>
+                  <a:schemeClr val="tx1"/>
+                </a:solidFill>
+                <a:effectLst/>
+                <a:latin typeface="+mn-lt"/>
+                <a:ea typeface="+mn-ea"/>
+                <a:cs typeface="+mn-cs"/>
+              </a:rPr>
+              <a:t>-- Summarize main points of your project: Remind your readers your key points.</a:t>
+            </a:r>
+            <a:br>
+              <a:rPr lang="en-US" sz="1200" b="0" i="0" kern="1200" dirty="0">
+                <a:solidFill>
+                  <a:schemeClr val="tx1"/>
+                </a:solidFill>
+                <a:effectLst/>
+                <a:latin typeface="+mn-lt"/>
+                <a:ea typeface="+mn-ea"/>
+                <a:cs typeface="+mn-cs"/>
+              </a:rPr>
+            </a:br>
+            <a:br>
+              <a:rPr lang="en-US" sz="1200" b="0" i="0" kern="1200" dirty="0">
+                <a:solidFill>
+                  <a:schemeClr val="tx1"/>
+                </a:solidFill>
+                <a:effectLst/>
+                <a:latin typeface="+mn-lt"/>
+                <a:ea typeface="+mn-ea"/>
+                <a:cs typeface="+mn-cs"/>
+              </a:rPr>
+            </a:br>
+            <a:r>
+              <a:rPr lang="en-US" sz="1200" b="0" i="0" kern="1200" dirty="0">
+                <a:solidFill>
+                  <a:schemeClr val="tx1"/>
+                </a:solidFill>
+                <a:effectLst/>
+                <a:latin typeface="+mn-lt"/>
+                <a:ea typeface="+mn-ea"/>
+                <a:cs typeface="+mn-cs"/>
+              </a:rPr>
+              <a:t>-- Discuss the significance of your results</a:t>
+            </a:r>
+            <a:br>
+              <a:rPr lang="en-US" sz="1200" b="0" i="0" kern="1200" dirty="0">
+                <a:solidFill>
+                  <a:schemeClr val="tx1"/>
+                </a:solidFill>
+                <a:effectLst/>
+                <a:latin typeface="+mn-lt"/>
+                <a:ea typeface="+mn-ea"/>
+                <a:cs typeface="+mn-cs"/>
+              </a:rPr>
+            </a:br>
+            <a:br>
+              <a:rPr lang="en-US" sz="1200" b="0" i="0" kern="1200" dirty="0">
+                <a:solidFill>
+                  <a:schemeClr val="tx1"/>
+                </a:solidFill>
+                <a:effectLst/>
+                <a:latin typeface="+mn-lt"/>
+                <a:ea typeface="+mn-ea"/>
+                <a:cs typeface="+mn-cs"/>
+              </a:rPr>
+            </a:br>
+            <a:r>
+              <a:rPr lang="en-US" sz="1200" b="0" i="0" kern="1200" dirty="0">
+                <a:solidFill>
+                  <a:schemeClr val="tx1"/>
+                </a:solidFill>
+                <a:effectLst/>
+                <a:latin typeface="+mn-lt"/>
+                <a:ea typeface="+mn-ea"/>
+                <a:cs typeface="+mn-cs"/>
+              </a:rPr>
+              <a:t>-- Discuss the future of your project and closing thoughts.</a:t>
             </a:r>
           </a:p>
           <a:p>
@@ -1451,303 +1512,6 @@
             <a:fld id="{25E2E259-F0C1-274B-BB83-2518BC0EEFC9}" type="slidenum">
               <a:rPr lang="en-US" smtClean="0"/>
               <a:t>13</a:t>
-            </a:fld>
-            <a:endParaRPr lang="en-US"/>
-          </a:p>
-        </p:txBody>
-      </p:sp>
-    </p:spTree>
-    <p:extLst>
-      <p:ext uri="{BB962C8B-B14F-4D97-AF65-F5344CB8AC3E}">
-        <p14:creationId xmlns:p14="http://schemas.microsoft.com/office/powerpoint/2010/main" val="2487888159"/>
-      </p:ext>
-    </p:extLst>
-  </p:cSld>
-  <p:clrMapOvr>
-    <a:masterClrMapping/>
-  </p:clrMapOvr>
-</p:notes>
-</file>
-
-<file path=ppt/notesSlides/notesSlide13.xml><?xml version="1.0" encoding="utf-8"?>
-<p:notes xmlns:a="http://schemas.openxmlformats.org/drawingml/2006/main" xmlns:r="http://schemas.openxmlformats.org/officeDocument/2006/relationships" xmlns:p="http://schemas.openxmlformats.org/presentationml/2006/main">
-  <p:cSld>
-    <p:spTree>
-      <p:nvGrpSpPr>
-        <p:cNvPr id="1" name=""/>
-        <p:cNvGrpSpPr/>
-        <p:nvPr/>
-      </p:nvGrpSpPr>
-      <p:grpSpPr>
-        <a:xfrm>
-          <a:off x="0" y="0"/>
-          <a:ext cx="0" cy="0"/>
-          <a:chOff x="0" y="0"/>
-          <a:chExt cx="0" cy="0"/>
-        </a:xfrm>
-      </p:grpSpPr>
-      <p:sp>
-        <p:nvSpPr>
-          <p:cNvPr id="2" name="Slide Image Placeholder 1"/>
-          <p:cNvSpPr>
-            <a:spLocks noGrp="1" noRot="1" noChangeAspect="1"/>
-          </p:cNvSpPr>
-          <p:nvPr>
-            <p:ph type="sldImg"/>
-          </p:nvPr>
-        </p:nvSpPr>
-        <p:spPr/>
-      </p:sp>
-      <p:sp>
-        <p:nvSpPr>
-          <p:cNvPr id="3" name="Notes Placeholder 2"/>
-          <p:cNvSpPr>
-            <a:spLocks noGrp="1"/>
-          </p:cNvSpPr>
-          <p:nvPr>
-            <p:ph type="body" idx="1"/>
-          </p:nvPr>
-        </p:nvSpPr>
-        <p:spPr/>
-        <p:txBody>
-          <a:bodyPr/>
-          <a:lstStyle/>
-          <a:p>
-            <a:pPr marL="0" marR="0" lvl="0" indent="0" algn="l" defTabSz="914400" rtl="0" eaLnBrk="1" fontAlgn="auto" latinLnBrk="0" hangingPunct="1">
-              <a:lnSpc>
-                <a:spcPct val="100000"/>
-              </a:lnSpc>
-              <a:spcBef>
-                <a:spcPts val="0"/>
-              </a:spcBef>
-              <a:spcAft>
-                <a:spcPts val="0"/>
-              </a:spcAft>
-              <a:buClrTx/>
-              <a:buSzTx/>
-              <a:buFontTx/>
-              <a:buNone/>
-              <a:tabLst/>
-              <a:defRPr/>
-            </a:pPr>
-            <a:r>
-              <a:rPr lang="en-US" sz="1200" b="0" i="0" kern="1200" dirty="0" err="1">
-                <a:solidFill>
-                  <a:schemeClr val="tx1"/>
-                </a:solidFill>
-                <a:effectLst/>
-                <a:latin typeface="+mn-lt"/>
-                <a:ea typeface="+mn-ea"/>
-                <a:cs typeface="+mn-cs"/>
-              </a:rPr>
-              <a:t>ConclusionExpectations</a:t>
-            </a:r>
-            <a:r>
-              <a:rPr lang="en-US" sz="1200" b="0" i="0" kern="1200" dirty="0">
-                <a:solidFill>
-                  <a:schemeClr val="tx1"/>
-                </a:solidFill>
-                <a:effectLst/>
-                <a:latin typeface="+mn-lt"/>
-                <a:ea typeface="+mn-ea"/>
-                <a:cs typeface="+mn-cs"/>
-              </a:rPr>
-              <a:t> here are to address the following following in your conclusion (in about 150 words) in a main section by itself:</a:t>
-            </a:r>
-            <a:br>
-              <a:rPr lang="en-US" sz="1200" b="0" i="0" kern="1200" dirty="0">
-                <a:solidFill>
-                  <a:schemeClr val="tx1"/>
-                </a:solidFill>
-                <a:effectLst/>
-                <a:latin typeface="+mn-lt"/>
-                <a:ea typeface="+mn-ea"/>
-                <a:cs typeface="+mn-cs"/>
-              </a:rPr>
-            </a:br>
-            <a:br>
-              <a:rPr lang="en-US" sz="1200" b="0" i="0" kern="1200" dirty="0">
-                <a:solidFill>
-                  <a:schemeClr val="tx1"/>
-                </a:solidFill>
-                <a:effectLst/>
-                <a:latin typeface="+mn-lt"/>
-                <a:ea typeface="+mn-ea"/>
-                <a:cs typeface="+mn-cs"/>
-              </a:rPr>
-            </a:br>
-            <a:r>
-              <a:rPr lang="en-US" sz="1200" b="0" i="0" kern="1200" dirty="0">
-                <a:solidFill>
-                  <a:schemeClr val="tx1"/>
-                </a:solidFill>
-                <a:effectLst/>
-                <a:latin typeface="+mn-lt"/>
-                <a:ea typeface="+mn-ea"/>
-                <a:cs typeface="+mn-cs"/>
-              </a:rPr>
-              <a:t>-- Restate your project focus explain why it’s important. Make sure that this part of the conclusion is concise and clear.</a:t>
-            </a:r>
-            <a:br>
-              <a:rPr lang="en-US" sz="1200" b="0" i="0" kern="1200" dirty="0">
-                <a:solidFill>
-                  <a:schemeClr val="tx1"/>
-                </a:solidFill>
-                <a:effectLst/>
-                <a:latin typeface="+mn-lt"/>
-                <a:ea typeface="+mn-ea"/>
-                <a:cs typeface="+mn-cs"/>
-              </a:rPr>
-            </a:br>
-            <a:br>
-              <a:rPr lang="en-US" sz="1200" b="0" i="0" kern="1200" dirty="0">
-                <a:solidFill>
-                  <a:schemeClr val="tx1"/>
-                </a:solidFill>
-                <a:effectLst/>
-                <a:latin typeface="+mn-lt"/>
-                <a:ea typeface="+mn-ea"/>
-                <a:cs typeface="+mn-cs"/>
-              </a:rPr>
-            </a:br>
-            <a:r>
-              <a:rPr lang="en-US" sz="1200" b="0" i="0" kern="1200" dirty="0">
-                <a:solidFill>
-                  <a:schemeClr val="tx1"/>
-                </a:solidFill>
-                <a:effectLst/>
-                <a:latin typeface="+mn-lt"/>
-                <a:ea typeface="+mn-ea"/>
-                <a:cs typeface="+mn-cs"/>
-              </a:rPr>
-              <a:t>-- Restate your hypothesis (e.g., ML pipelines with custom features can accurately forecast box office returns)</a:t>
-            </a:r>
-            <a:br>
-              <a:rPr lang="en-US" sz="1200" b="0" i="0" kern="1200" dirty="0">
-                <a:solidFill>
-                  <a:schemeClr val="tx1"/>
-                </a:solidFill>
-                <a:effectLst/>
-                <a:latin typeface="+mn-lt"/>
-                <a:ea typeface="+mn-ea"/>
-                <a:cs typeface="+mn-cs"/>
-              </a:rPr>
-            </a:br>
-            <a:br>
-              <a:rPr lang="en-US" sz="1200" b="0" i="0" kern="1200" dirty="0">
-                <a:solidFill>
-                  <a:schemeClr val="tx1"/>
-                </a:solidFill>
-                <a:effectLst/>
-                <a:latin typeface="+mn-lt"/>
-                <a:ea typeface="+mn-ea"/>
-                <a:cs typeface="+mn-cs"/>
-              </a:rPr>
-            </a:br>
-            <a:r>
-              <a:rPr lang="en-US" sz="1200" b="0" i="0" kern="1200" dirty="0">
-                <a:solidFill>
-                  <a:schemeClr val="tx1"/>
-                </a:solidFill>
-                <a:effectLst/>
-                <a:latin typeface="+mn-lt"/>
-                <a:ea typeface="+mn-ea"/>
-                <a:cs typeface="+mn-cs"/>
-              </a:rPr>
-              <a:t>-- Summarize main points of your project: Remind your readers your key points.</a:t>
-            </a:r>
-            <a:br>
-              <a:rPr lang="en-US" sz="1200" b="0" i="0" kern="1200" dirty="0">
-                <a:solidFill>
-                  <a:schemeClr val="tx1"/>
-                </a:solidFill>
-                <a:effectLst/>
-                <a:latin typeface="+mn-lt"/>
-                <a:ea typeface="+mn-ea"/>
-                <a:cs typeface="+mn-cs"/>
-              </a:rPr>
-            </a:br>
-            <a:br>
-              <a:rPr lang="en-US" sz="1200" b="0" i="0" kern="1200" dirty="0">
-                <a:solidFill>
-                  <a:schemeClr val="tx1"/>
-                </a:solidFill>
-                <a:effectLst/>
-                <a:latin typeface="+mn-lt"/>
-                <a:ea typeface="+mn-ea"/>
-                <a:cs typeface="+mn-cs"/>
-              </a:rPr>
-            </a:br>
-            <a:r>
-              <a:rPr lang="en-US" sz="1200" b="0" i="0" kern="1200" dirty="0">
-                <a:solidFill>
-                  <a:schemeClr val="tx1"/>
-                </a:solidFill>
-                <a:effectLst/>
-                <a:latin typeface="+mn-lt"/>
-                <a:ea typeface="+mn-ea"/>
-                <a:cs typeface="+mn-cs"/>
-              </a:rPr>
-              <a:t>-- Discuss the significance of your results</a:t>
-            </a:r>
-            <a:br>
-              <a:rPr lang="en-US" sz="1200" b="0" i="0" kern="1200" dirty="0">
-                <a:solidFill>
-                  <a:schemeClr val="tx1"/>
-                </a:solidFill>
-                <a:effectLst/>
-                <a:latin typeface="+mn-lt"/>
-                <a:ea typeface="+mn-ea"/>
-                <a:cs typeface="+mn-cs"/>
-              </a:rPr>
-            </a:br>
-            <a:br>
-              <a:rPr lang="en-US" sz="1200" b="0" i="0" kern="1200" dirty="0">
-                <a:solidFill>
-                  <a:schemeClr val="tx1"/>
-                </a:solidFill>
-                <a:effectLst/>
-                <a:latin typeface="+mn-lt"/>
-                <a:ea typeface="+mn-ea"/>
-                <a:cs typeface="+mn-cs"/>
-              </a:rPr>
-            </a:br>
-            <a:r>
-              <a:rPr lang="en-US" sz="1200" b="0" i="0" kern="1200" dirty="0">
-                <a:solidFill>
-                  <a:schemeClr val="tx1"/>
-                </a:solidFill>
-                <a:effectLst/>
-                <a:latin typeface="+mn-lt"/>
-                <a:ea typeface="+mn-ea"/>
-                <a:cs typeface="+mn-cs"/>
-              </a:rPr>
-              <a:t>-- Discuss the future of your project and closing thoughts.</a:t>
-            </a:r>
-          </a:p>
-          <a:p>
-            <a:endParaRPr lang="en-US" dirty="0"/>
-          </a:p>
-        </p:txBody>
-      </p:sp>
-      <p:sp>
-        <p:nvSpPr>
-          <p:cNvPr id="4" name="Slide Number Placeholder 3"/>
-          <p:cNvSpPr>
-            <a:spLocks noGrp="1"/>
-          </p:cNvSpPr>
-          <p:nvPr>
-            <p:ph type="sldNum" sz="quarter" idx="5"/>
-          </p:nvPr>
-        </p:nvSpPr>
-        <p:spPr/>
-        <p:txBody>
-          <a:bodyPr/>
-          <a:lstStyle/>
-          <a:p>
-            <a:fld id="{25E2E259-F0C1-274B-BB83-2518BC0EEFC9}" type="slidenum">
-              <a:rPr lang="en-US" smtClean="0"/>
-              <a:t>14</a:t>
             </a:fld>
             <a:endParaRPr lang="en-US"/>
           </a:p>
@@ -4356,7 +4120,7 @@
     </p:spTree>
     <p:extLst>
       <p:ext uri="{BB962C8B-B14F-4D97-AF65-F5344CB8AC3E}">
-        <p14:creationId xmlns:p14="http://schemas.microsoft.com/office/powerpoint/2010/main" val="2529856133"/>
+        <p14:creationId xmlns:p14="http://schemas.microsoft.com/office/powerpoint/2010/main" val="3148085847"/>
       </p:ext>
     </p:extLst>
   </p:cSld>
@@ -9972,11 +9736,11 @@
           <a:p>
             <a:r>
               <a:rPr lang="en-US" dirty="0"/>
-              <a:t>Models </a:t>
+              <a:t>Models</a:t>
             </a:r>
             <a:r>
               <a:rPr lang="en-US" sz="2400" dirty="0"/>
-              <a:t>- </a:t>
+              <a:t> - </a:t>
             </a:r>
             <a:r>
               <a:rPr lang="en-US" sz="2400" dirty="0">
@@ -10054,7 +9818,52 @@
             </a:pPr>
             <a:r>
               <a:rPr lang="en-US" dirty="0"/>
-              <a:t>describe</a:t>
+              <a:t>3 models evaluated with </a:t>
+            </a:r>
+            <a:r>
+              <a:rPr lang="en-US" dirty="0" err="1"/>
+              <a:t>GridSearchCV</a:t>
+            </a:r>
+            <a:r>
+              <a:rPr lang="en-US" dirty="0"/>
+              <a:t> and different alpha parameters and KNN parameters (in order of performance)</a:t>
+            </a:r>
+          </a:p>
+          <a:p>
+            <a:r>
+              <a:rPr lang="en-US" dirty="0"/>
+              <a:t>Lasso Linear Regression *</a:t>
+            </a:r>
+          </a:p>
+          <a:p>
+            <a:r>
+              <a:rPr lang="en-US" dirty="0"/>
+              <a:t>K Nearest Neighbor</a:t>
+            </a:r>
+          </a:p>
+          <a:p>
+            <a:r>
+              <a:rPr lang="en-US" dirty="0"/>
+              <a:t>Ridge Linear Regression</a:t>
+            </a:r>
+          </a:p>
+          <a:p>
+            <a:pPr marL="0" indent="0">
+              <a:buNone/>
+            </a:pPr>
+            <a:r>
+              <a:rPr lang="en-US" dirty="0"/>
+              <a:t>* winner with alpha = 1 during subset training</a:t>
+            </a:r>
+            <a:br>
+              <a:rPr lang="en-US" dirty="0"/>
+            </a:br>
+            <a:br>
+              <a:rPr lang="en-US" dirty="0"/>
+            </a:br>
+            <a:r>
+              <a:rPr lang="en-US" dirty="0"/>
+              <a:t>Winning model (along with its params) placed into the localization pipeline.</a:t>
             </a:r>
           </a:p>
         </p:txBody>
@@ -10111,12 +9920,28 @@
           </a:bodyPr>
           <a:lstStyle/>
           <a:p>
+            <a:r>
+              <a:rPr lang="en-US" dirty="0" err="1"/>
+              <a:t>SKLearn</a:t>
+            </a:r>
+            <a:r>
+              <a:rPr lang="en-US" dirty="0"/>
+              <a:t> Logistic Regression model</a:t>
+            </a:r>
+          </a:p>
+          <a:p>
+            <a:r>
+              <a:rPr lang="en-US" dirty="0"/>
+              <a:t>Homegrown Logistic Regression model using gradient descent</a:t>
+            </a:r>
+          </a:p>
+          <a:p>
             <a:pPr marL="0" indent="0">
               <a:buNone/>
             </a:pPr>
             <a:r>
               <a:rPr lang="en-US" dirty="0"/>
-              <a:t>describe</a:t>
+              <a:t>We did not have sufficient time to perform CV on these two models, but ran them both through training and test sets to compare predictions and performance.</a:t>
             </a:r>
           </a:p>
         </p:txBody>
@@ -10124,7 +9949,7 @@
     </p:spTree>
     <p:extLst>
       <p:ext uri="{BB962C8B-B14F-4D97-AF65-F5344CB8AC3E}">
-        <p14:creationId xmlns:p14="http://schemas.microsoft.com/office/powerpoint/2010/main" val="2995467700"/>
+        <p14:creationId xmlns:p14="http://schemas.microsoft.com/office/powerpoint/2010/main" val="4092814027"/>
       </p:ext>
     </p:extLst>
   </p:cSld>
@@ -10174,7 +9999,7 @@
           <a:p>
             <a:r>
               <a:rPr lang="en-US" dirty="0"/>
-              <a:t>Models </a:t>
+              <a:t>Metrics </a:t>
             </a:r>
             <a:r>
               <a:rPr lang="en-US" sz="2400" dirty="0"/>
@@ -10188,7 +10013,7 @@
                   </a:schemeClr>
                 </a:solidFill>
               </a:rPr>
-              <a:t>Mangesh</a:t>
+              <a:t>Ben</a:t>
             </a:r>
             <a:endParaRPr lang="en-US" sz="2400" dirty="0"/>
           </a:p>
@@ -10215,10 +10040,9 @@
           <a:bodyPr/>
           <a:lstStyle/>
           <a:p>
-            <a:pPr algn="l"/>
-            <a:r>
-              <a:rPr lang="en-US" b="1" dirty="0"/>
-              <a:t>Bounding Box Prediction Models</a:t>
+            <a:r>
+              <a:rPr lang="en-US" dirty="0"/>
+              <a:t>Planned Metrics</a:t>
             </a:r>
           </a:p>
         </p:txBody>
@@ -10239,147 +10063,32 @@
             <p:ph sz="half" idx="2"/>
           </p:nvPr>
         </p:nvSpPr>
-        <p:spPr>
-          <a:xfrm>
-            <a:off x="814729" y="2751138"/>
-            <a:ext cx="5189856" cy="3409632"/>
-          </a:xfrm>
-        </p:spPr>
-        <p:txBody>
-          <a:bodyPr>
-            <a:normAutofit/>
-          </a:bodyPr>
-          <a:lstStyle/>
-          <a:p>
-            <a:pPr marL="0" indent="0">
-              <a:buNone/>
-            </a:pPr>
-            <a:r>
-              <a:rPr lang="en-US" dirty="0"/>
-              <a:t>3 models evaluated with </a:t>
-            </a:r>
-            <a:r>
-              <a:rPr lang="en-US" dirty="0" err="1"/>
-              <a:t>GridSearchCV</a:t>
-            </a:r>
-            <a:r>
-              <a:rPr lang="en-US" dirty="0"/>
-              <a:t> and different alpha parameters and KNN parameters (in order of performance)</a:t>
-            </a:r>
-          </a:p>
-          <a:p>
-            <a:r>
-              <a:rPr lang="en-US" dirty="0"/>
-              <a:t>Lasso Linear Regression *</a:t>
-            </a:r>
-          </a:p>
-          <a:p>
-            <a:r>
-              <a:rPr lang="en-US" dirty="0"/>
-              <a:t>K Nearest Neighbor</a:t>
-            </a:r>
-          </a:p>
-          <a:p>
-            <a:r>
-              <a:rPr lang="en-US" dirty="0"/>
-              <a:t>Ridge Linear Regression</a:t>
-            </a:r>
-          </a:p>
-          <a:p>
-            <a:pPr marL="0" indent="0">
-              <a:buNone/>
-            </a:pPr>
-            <a:r>
-              <a:rPr lang="en-US" dirty="0"/>
-              <a:t>* winner with alpha = 1 during subset training</a:t>
-            </a:r>
-            <a:br>
-              <a:rPr lang="en-US" dirty="0"/>
-            </a:br>
-            <a:br>
-              <a:rPr lang="en-US" dirty="0"/>
-            </a:br>
-            <a:r>
-              <a:rPr lang="en-US" dirty="0"/>
-              <a:t>Winning model (along with its params) placed into the localization pipeline.</a:t>
-            </a:r>
-          </a:p>
-        </p:txBody>
-      </p:sp>
-      <p:sp>
-        <p:nvSpPr>
-          <p:cNvPr id="5" name="Text Placeholder 4">
-            <a:extLst>
-              <a:ext uri="{FF2B5EF4-FFF2-40B4-BE49-F238E27FC236}">
-                <a16:creationId xmlns:a16="http://schemas.microsoft.com/office/drawing/2014/main" id="{7E4336B0-BB02-A142-A285-FD9A822C128D}"/>
-              </a:ext>
-            </a:extLst>
-          </p:cNvPr>
-          <p:cNvSpPr>
-            <a:spLocks noGrp="1"/>
-          </p:cNvSpPr>
-          <p:nvPr>
-            <p:ph type="body" sz="quarter" idx="3"/>
-          </p:nvPr>
-        </p:nvSpPr>
         <p:spPr/>
         <p:txBody>
           <a:bodyPr/>
           <a:lstStyle/>
           <a:p>
-            <a:pPr algn="l"/>
-            <a:r>
-              <a:rPr lang="en-US" b="1" dirty="0"/>
-              <a:t>Classification Models</a:t>
-            </a:r>
-          </a:p>
-        </p:txBody>
-      </p:sp>
-      <p:sp>
-        <p:nvSpPr>
-          <p:cNvPr id="6" name="Content Placeholder 5">
-            <a:extLst>
-              <a:ext uri="{FF2B5EF4-FFF2-40B4-BE49-F238E27FC236}">
-                <a16:creationId xmlns:a16="http://schemas.microsoft.com/office/drawing/2014/main" id="{D12C8C3A-B4EC-FE46-AD92-3ADD3B823098}"/>
-              </a:ext>
-            </a:extLst>
-          </p:cNvPr>
-          <p:cNvSpPr>
-            <a:spLocks noGrp="1"/>
-          </p:cNvSpPr>
-          <p:nvPr>
-            <p:ph sz="quarter" idx="4"/>
-          </p:nvPr>
-        </p:nvSpPr>
-        <p:spPr/>
-        <p:txBody>
-          <a:bodyPr>
-            <a:normAutofit/>
-          </a:bodyPr>
-          <a:lstStyle/>
-          <a:p>
-            <a:r>
-              <a:rPr lang="en-US" dirty="0" err="1"/>
-              <a:t>SKLearn</a:t>
-            </a:r>
             <a:r>
               <a:rPr lang="en-US" dirty="0"/>
-              <a:t> Logistic Regression model</a:t>
+              <a:t>Explain</a:t>
             </a:r>
           </a:p>
           <a:p>
             <a:r>
               <a:rPr lang="en-US" dirty="0"/>
-              <a:t>Homegrown Logistic Regression model using gradient descent</a:t>
-            </a:r>
-          </a:p>
-          <a:p>
-            <a:pPr marL="0" indent="0">
-              <a:buNone/>
-            </a:pPr>
+              <a:t>Analyze</a:t>
+            </a:r>
+          </a:p>
+          <a:p>
             <a:r>
               <a:rPr lang="en-US" dirty="0"/>
-              <a:t>We did not have sufficient time to perform CV on these two models, but ran them both through training and test sets to compare predictions and performance.</a:t>
+              <a:t>Compare</a:t>
+            </a:r>
+          </a:p>
+          <a:p>
+            <a:r>
+              <a:rPr lang="en-US" dirty="0"/>
+              <a:t>Outcomes to be discussed</a:t>
             </a:r>
           </a:p>
         </p:txBody>
@@ -10387,7 +10096,7 @@
     </p:spTree>
     <p:extLst>
       <p:ext uri="{BB962C8B-B14F-4D97-AF65-F5344CB8AC3E}">
-        <p14:creationId xmlns:p14="http://schemas.microsoft.com/office/powerpoint/2010/main" val="4092814027"/>
+        <p14:creationId xmlns:p14="http://schemas.microsoft.com/office/powerpoint/2010/main" val="3656580415"/>
       </p:ext>
     </p:extLst>
   </p:cSld>
@@ -10437,51 +10146,9 @@
           <a:p>
             <a:r>
               <a:rPr lang="en-US" dirty="0"/>
-              <a:t>Metrics, Results, Discussion </a:t>
-            </a:r>
-            <a:r>
-              <a:rPr lang="en-US" sz="2400" dirty="0"/>
-              <a:t>- </a:t>
-            </a:r>
-            <a:r>
-              <a:rPr lang="en-US" sz="2400" dirty="0">
-                <a:solidFill>
-                  <a:schemeClr val="accent1">
-                    <a:lumMod val="50000"/>
-                  </a:schemeClr>
-                </a:solidFill>
-              </a:rPr>
-              <a:t>Ben</a:t>
+              <a:t>Results, Discussion</a:t>
             </a:r>
             <a:endParaRPr lang="en-US" sz="2400" dirty="0"/>
-          </a:p>
-        </p:txBody>
-      </p:sp>
-      <p:sp>
-        <p:nvSpPr>
-          <p:cNvPr id="3" name="Text Placeholder 2">
-            <a:extLst>
-              <a:ext uri="{FF2B5EF4-FFF2-40B4-BE49-F238E27FC236}">
-                <a16:creationId xmlns:a16="http://schemas.microsoft.com/office/drawing/2014/main" id="{20A48431-64F0-3A41-9438-12793F22BE0C}"/>
-              </a:ext>
-            </a:extLst>
-          </p:cNvPr>
-          <p:cNvSpPr>
-            <a:spLocks noGrp="1"/>
-          </p:cNvSpPr>
-          <p:nvPr>
-            <p:ph type="body" idx="1"/>
-          </p:nvPr>
-        </p:nvSpPr>
-        <p:spPr/>
-        <p:txBody>
-          <a:bodyPr/>
-          <a:lstStyle/>
-          <a:p>
-            <a:r>
-              <a:rPr lang="en-US" dirty="0"/>
-              <a:t>Results Summary</a:t>
-            </a:r>
           </a:p>
         </p:txBody>
       </p:sp>
@@ -10501,88 +10168,75 @@
             <p:ph sz="half" idx="2"/>
           </p:nvPr>
         </p:nvSpPr>
-        <p:spPr/>
-        <p:txBody>
-          <a:bodyPr/>
+        <p:spPr>
+          <a:xfrm>
+            <a:off x="814728" y="2751138"/>
+            <a:ext cx="10567270" cy="3659674"/>
+          </a:xfrm>
+        </p:spPr>
+        <p:txBody>
+          <a:bodyPr>
+            <a:normAutofit lnSpcReduction="10000"/>
+          </a:bodyPr>
           <a:lstStyle/>
           <a:p>
-            <a:r>
-              <a:rPr lang="en-US" dirty="0"/>
-              <a:t>Explain</a:t>
-            </a:r>
-          </a:p>
-          <a:p>
-            <a:r>
-              <a:rPr lang="en-US" dirty="0"/>
-              <a:t>Analyze</a:t>
-            </a:r>
-          </a:p>
-          <a:p>
-            <a:r>
-              <a:rPr lang="en-US" dirty="0"/>
-              <a:t>Compare</a:t>
-            </a:r>
-          </a:p>
-          <a:p>
-            <a:r>
-              <a:rPr lang="en-US" dirty="0"/>
-              <a:t>Outcomes to be discussed</a:t>
-            </a:r>
-          </a:p>
-        </p:txBody>
-      </p:sp>
-      <p:sp>
-        <p:nvSpPr>
-          <p:cNvPr id="5" name="Text Placeholder 4">
-            <a:extLst>
-              <a:ext uri="{FF2B5EF4-FFF2-40B4-BE49-F238E27FC236}">
-                <a16:creationId xmlns:a16="http://schemas.microsoft.com/office/drawing/2014/main" id="{7E4336B0-BB02-A142-A285-FD9A822C128D}"/>
-              </a:ext>
-            </a:extLst>
-          </p:cNvPr>
-          <p:cNvSpPr>
-            <a:spLocks noGrp="1"/>
-          </p:cNvSpPr>
-          <p:nvPr>
-            <p:ph type="body" sz="quarter" idx="3"/>
-          </p:nvPr>
-        </p:nvSpPr>
-        <p:spPr/>
-        <p:txBody>
-          <a:bodyPr/>
-          <a:lstStyle/>
-          <a:p>
-            <a:r>
-              <a:rPr lang="en-US" dirty="0"/>
-              <a:t>Discussion</a:t>
-            </a:r>
-          </a:p>
-        </p:txBody>
-      </p:sp>
-      <p:sp>
-        <p:nvSpPr>
-          <p:cNvPr id="6" name="Content Placeholder 5">
-            <a:extLst>
-              <a:ext uri="{FF2B5EF4-FFF2-40B4-BE49-F238E27FC236}">
-                <a16:creationId xmlns:a16="http://schemas.microsoft.com/office/drawing/2014/main" id="{D12C8C3A-B4EC-FE46-AD92-3ADD3B823098}"/>
-              </a:ext>
-            </a:extLst>
-          </p:cNvPr>
-          <p:cNvSpPr>
-            <a:spLocks noGrp="1"/>
-          </p:cNvSpPr>
-          <p:nvPr>
-            <p:ph sz="quarter" idx="4"/>
-          </p:nvPr>
-        </p:nvSpPr>
-        <p:spPr/>
-        <p:txBody>
-          <a:bodyPr/>
-          <a:lstStyle/>
-          <a:p>
-            <a:r>
-              <a:rPr lang="en-US" dirty="0"/>
-              <a:t>Discussion for any of the results to the left</a:t>
+            <a:pPr marL="0" indent="0">
+              <a:buNone/>
+            </a:pPr>
+            <a:r>
+              <a:rPr lang="en-US" sz="2400" b="1" dirty="0"/>
+              <a:t>Project challenges/difficulties</a:t>
+            </a:r>
+          </a:p>
+          <a:p>
+            <a:endParaRPr lang="en-US" dirty="0"/>
+          </a:p>
+          <a:p>
+            <a:r>
+              <a:rPr lang="en-US" sz="2000" dirty="0"/>
+              <a:t>Confusion over which models to use and Phase 1 expectations took time away from coding efforts, took a while to understand which data to use for which step</a:t>
+            </a:r>
+          </a:p>
+          <a:p>
+            <a:r>
+              <a:rPr lang="en-US" sz="2000" dirty="0"/>
+              <a:t>Not able to perform ideal optimization or cross validation of Homegrown vs </a:t>
+            </a:r>
+            <a:r>
+              <a:rPr lang="en-US" sz="2000" dirty="0" err="1"/>
+              <a:t>LogReg</a:t>
+            </a:r>
+            <a:r>
+              <a:rPr lang="en-US" sz="2000" dirty="0"/>
+              <a:t> model for classification</a:t>
+            </a:r>
+          </a:p>
+          <a:p>
+            <a:r>
+              <a:rPr lang="en-US" sz="2000" dirty="0"/>
+              <a:t>Pipelines not optimized, unable to debug Feature Union in time for ideal flow from </a:t>
+            </a:r>
+            <a:r>
+              <a:rPr lang="en-US" sz="2000" dirty="0" err="1"/>
+              <a:t>bbox</a:t>
+            </a:r>
+            <a:r>
+              <a:rPr lang="en-US" sz="2000" dirty="0"/>
+              <a:t> predict &gt; feature engineering &gt; class predict</a:t>
+            </a:r>
+          </a:p>
+          <a:p>
+            <a:r>
+              <a:rPr lang="en-US" sz="2000" dirty="0"/>
+              <a:t>Irregular image results (raccoon image classified as dog, inaccurate bounding boxes, </a:t>
+            </a:r>
+            <a:r>
+              <a:rPr lang="en-US" sz="2000" dirty="0" err="1"/>
+              <a:t>etc</a:t>
+            </a:r>
+            <a:r>
+              <a:rPr lang="en-US" sz="2000" dirty="0"/>
+              <a:t>)</a:t>
             </a:r>
           </a:p>
         </p:txBody>
@@ -10590,7 +10244,7 @@
     </p:spTree>
     <p:extLst>
       <p:ext uri="{BB962C8B-B14F-4D97-AF65-F5344CB8AC3E}">
-        <p14:creationId xmlns:p14="http://schemas.microsoft.com/office/powerpoint/2010/main" val="3656580415"/>
+        <p14:creationId xmlns:p14="http://schemas.microsoft.com/office/powerpoint/2010/main" val="1837173560"/>
       </p:ext>
     </p:extLst>
   </p:cSld>
@@ -10619,152 +10273,6 @@
       </p:grpSpPr>
       <p:sp>
         <p:nvSpPr>
-          <p:cNvPr id="2" name="Title 1">
-            <a:extLst>
-              <a:ext uri="{FF2B5EF4-FFF2-40B4-BE49-F238E27FC236}">
-                <a16:creationId xmlns:a16="http://schemas.microsoft.com/office/drawing/2014/main" id="{0CAFC94C-B8F1-2F46-8429-1C6AC60091C5}"/>
-              </a:ext>
-            </a:extLst>
-          </p:cNvPr>
-          <p:cNvSpPr>
-            <a:spLocks noGrp="1"/>
-          </p:cNvSpPr>
-          <p:nvPr>
-            <p:ph type="title"/>
-          </p:nvPr>
-        </p:nvSpPr>
-        <p:spPr/>
-        <p:txBody>
-          <a:bodyPr/>
-          <a:lstStyle/>
-          <a:p>
-            <a:r>
-              <a:rPr lang="en-US" dirty="0"/>
-              <a:t>Metrics, Results, Discussion </a:t>
-            </a:r>
-            <a:r>
-              <a:rPr lang="en-US" sz="2400" dirty="0"/>
-              <a:t>- </a:t>
-            </a:r>
-            <a:r>
-              <a:rPr lang="en-US" sz="2400" dirty="0">
-                <a:solidFill>
-                  <a:schemeClr val="accent1">
-                    <a:lumMod val="50000"/>
-                  </a:schemeClr>
-                </a:solidFill>
-              </a:rPr>
-              <a:t>Ben</a:t>
-            </a:r>
-            <a:endParaRPr lang="en-US" sz="2400" dirty="0"/>
-          </a:p>
-        </p:txBody>
-      </p:sp>
-      <p:sp>
-        <p:nvSpPr>
-          <p:cNvPr id="4" name="Content Placeholder 3">
-            <a:extLst>
-              <a:ext uri="{FF2B5EF4-FFF2-40B4-BE49-F238E27FC236}">
-                <a16:creationId xmlns:a16="http://schemas.microsoft.com/office/drawing/2014/main" id="{7E935AF4-F7C7-9748-99D9-82C158F6E60A}"/>
-              </a:ext>
-            </a:extLst>
-          </p:cNvPr>
-          <p:cNvSpPr>
-            <a:spLocks noGrp="1"/>
-          </p:cNvSpPr>
-          <p:nvPr>
-            <p:ph sz="half" idx="2"/>
-          </p:nvPr>
-        </p:nvSpPr>
-        <p:spPr>
-          <a:xfrm>
-            <a:off x="814728" y="2751138"/>
-            <a:ext cx="10567270" cy="3659674"/>
-          </a:xfrm>
-        </p:spPr>
-        <p:txBody>
-          <a:bodyPr/>
-          <a:lstStyle/>
-          <a:p>
-            <a:pPr marL="0" indent="0">
-              <a:buNone/>
-            </a:pPr>
-            <a:r>
-              <a:rPr lang="en-US" sz="2400" b="1" dirty="0"/>
-              <a:t>Project challenges/difficulties</a:t>
-            </a:r>
-          </a:p>
-          <a:p>
-            <a:endParaRPr lang="en-US" dirty="0"/>
-          </a:p>
-          <a:p>
-            <a:r>
-              <a:rPr lang="en-US" sz="2000" dirty="0"/>
-              <a:t>Confusion over which models to use and Phase 1 expectations took time away from coding efforts</a:t>
-            </a:r>
-          </a:p>
-          <a:p>
-            <a:r>
-              <a:rPr lang="en-US" sz="2000" dirty="0"/>
-              <a:t>Not able to perform ideal optimization or cross validation of Homegrown vs </a:t>
-            </a:r>
-            <a:r>
-              <a:rPr lang="en-US" sz="2000" dirty="0" err="1"/>
-              <a:t>LogReg</a:t>
-            </a:r>
-            <a:r>
-              <a:rPr lang="en-US" sz="2000" dirty="0"/>
-              <a:t> model</a:t>
-            </a:r>
-          </a:p>
-          <a:p>
-            <a:r>
-              <a:rPr lang="en-US" sz="2000" dirty="0"/>
-              <a:t>Pipelines not optimized, unable to debug Feature Union in time for ideal flow from </a:t>
-            </a:r>
-            <a:r>
-              <a:rPr lang="en-US" sz="2000" dirty="0" err="1"/>
-              <a:t>bbox</a:t>
-            </a:r>
-            <a:r>
-              <a:rPr lang="en-US" sz="2000" dirty="0"/>
-              <a:t> predict &gt; feature engineering &gt; class predict</a:t>
-            </a:r>
-          </a:p>
-        </p:txBody>
-      </p:sp>
-    </p:spTree>
-    <p:extLst>
-      <p:ext uri="{BB962C8B-B14F-4D97-AF65-F5344CB8AC3E}">
-        <p14:creationId xmlns:p14="http://schemas.microsoft.com/office/powerpoint/2010/main" val="1837173560"/>
-      </p:ext>
-    </p:extLst>
-  </p:cSld>
-  <p:clrMapOvr>
-    <a:masterClrMapping/>
-  </p:clrMapOvr>
-</p:sld>
-</file>
-
-<file path=ppt/slides/slide14.xml><?xml version="1.0" encoding="utf-8"?>
-<p:sld xmlns:a="http://schemas.openxmlformats.org/drawingml/2006/main" xmlns:r="http://schemas.openxmlformats.org/officeDocument/2006/relationships" xmlns:p="http://schemas.openxmlformats.org/presentationml/2006/main">
-  <p:cSld>
-    <p:spTree>
-      <p:nvGrpSpPr>
-        <p:cNvPr id="1" name=""/>
-        <p:cNvGrpSpPr/>
-        <p:nvPr/>
-      </p:nvGrpSpPr>
-      <p:grpSpPr>
-        <a:xfrm>
-          <a:off x="0" y="0"/>
-          <a:ext cx="0" cy="0"/>
-          <a:chOff x="0" y="0"/>
-          <a:chExt cx="0" cy="0"/>
-        </a:xfrm>
-      </p:grpSpPr>
-      <p:sp>
-        <p:nvSpPr>
           <p:cNvPr id="4" name="Title 3">
             <a:extLst>
               <a:ext uri="{FF2B5EF4-FFF2-40B4-BE49-F238E27FC236}">
@@ -10792,21 +10300,7 @@
             <a:pPr algn="l"/>
             <a:r>
               <a:rPr lang="en-US" dirty="0"/>
-              <a:t>Conclusion </a:t>
-            </a:r>
-            <a:r>
-              <a:rPr lang="en-US" sz="2400" dirty="0"/>
-              <a:t>- </a:t>
-            </a:r>
-            <a:r>
-              <a:rPr lang="en-US" sz="2400" dirty="0">
-                <a:solidFill>
-                  <a:schemeClr val="accent1">
-                    <a:lumMod val="50000"/>
-                  </a:schemeClr>
-                </a:solidFill>
-              </a:rPr>
-              <a:t>Ben</a:t>
+              <a:t>Conclusion</a:t>
             </a:r>
             <a:endParaRPr lang="en-US" sz="2400" dirty="0"/>
           </a:p>
@@ -10872,7 +10366,7 @@
         <p:spPr>
           <a:xfrm>
             <a:off x="1155939" y="966158"/>
-            <a:ext cx="9558068" cy="3139321"/>
+            <a:ext cx="9558068" cy="3693319"/>
           </a:xfrm>
           <a:prstGeom prst="rect">
             <a:avLst/>
@@ -10891,92 +10385,55 @@
                   <a:schemeClr val="bg1"/>
                 </a:solidFill>
               </a:rPr>
-              <a:t>Conclusion should be 150 words</a:t>
-            </a:r>
-          </a:p>
-          <a:p>
-            <a:endParaRPr lang="en-US" dirty="0">
-              <a:solidFill>
-                <a:schemeClr val="bg1"/>
-              </a:solidFill>
-            </a:endParaRPr>
-          </a:p>
-          <a:p>
+              <a:t>We aimed to train a model to predict bounding boxes based on provided images and then predict whether each image was a dog or cat as a classification step, using pipelines, </a:t>
+            </a:r>
+            <a:r>
+              <a:rPr lang="en-US" dirty="0" err="1">
+                <a:solidFill>
+                  <a:schemeClr val="bg1"/>
+                </a:solidFill>
+              </a:rPr>
+              <a:t>SKLearn</a:t>
+            </a:r>
             <a:r>
               <a:rPr lang="en-US" dirty="0">
                 <a:solidFill>
                   <a:schemeClr val="bg1"/>
                 </a:solidFill>
               </a:rPr>
-              <a:t>Restate project focus &amp; why important.</a:t>
-            </a:r>
-          </a:p>
-          <a:p>
-            <a:endParaRPr lang="en-US" dirty="0">
-              <a:solidFill>
-                <a:schemeClr val="bg1"/>
-              </a:solidFill>
-            </a:endParaRPr>
-          </a:p>
-          <a:p>
+              <a:t>, and a homegrown model. Image classification’s a complex ML problem. Focusing on a subset of data allowed a short-term project to be approachable. Class prediction based on bounding-boxes alone doesn’t seem to indicate a high probability of success. We’d hoped to achieve above 50% accuracy and planned to use confusion matrices and a combination of F1/accuracy scoring to compare our classification models. Time limitations affected our outcome and though the </a:t>
+            </a:r>
+            <a:r>
+              <a:rPr lang="en-US" dirty="0" err="1">
+                <a:solidFill>
+                  <a:schemeClr val="bg1"/>
+                </a:solidFill>
+              </a:rPr>
+              <a:t>bbox</a:t>
+            </a:r>
             <a:r>
               <a:rPr lang="en-US" dirty="0">
                 <a:solidFill>
                   <a:schemeClr val="bg1"/>
                 </a:solidFill>
               </a:rPr>
-              <a:t>Restate hypothesis. </a:t>
-            </a:r>
-          </a:p>
-          <a:p>
-            <a:endParaRPr lang="en-US" dirty="0">
-              <a:solidFill>
-                <a:schemeClr val="bg1"/>
-              </a:solidFill>
-            </a:endParaRPr>
-          </a:p>
-          <a:p>
+              <a:t> prediction models and pipelines function properly, the predictions from our classification models were not usable. They predicted the same values for all images. We hope that implementing unsupervised machine learning with </a:t>
+            </a:r>
+            <a:r>
+              <a:rPr lang="en-US" dirty="0" err="1">
+                <a:solidFill>
+                  <a:schemeClr val="bg1"/>
+                </a:solidFill>
+              </a:rPr>
+              <a:t>PyTorch</a:t>
+            </a:r>
             <a:r>
               <a:rPr lang="en-US" dirty="0">
                 <a:solidFill>
                   <a:schemeClr val="bg1"/>
                 </a:solidFill>
               </a:rPr>
-              <a:t>Summarize main points.</a:t>
-            </a:r>
-          </a:p>
-          <a:p>
-            <a:endParaRPr lang="en-US" dirty="0">
-              <a:solidFill>
-                <a:schemeClr val="bg1"/>
-              </a:solidFill>
-            </a:endParaRPr>
-          </a:p>
-          <a:p>
-            <a:r>
-              <a:rPr lang="en-US" dirty="0">
-                <a:solidFill>
-                  <a:schemeClr val="bg1"/>
-                </a:solidFill>
-              </a:rPr>
-              <a:t>Significance of results?</a:t>
-            </a:r>
-          </a:p>
-          <a:p>
-            <a:endParaRPr lang="en-US" dirty="0">
-              <a:solidFill>
-                <a:schemeClr val="bg1"/>
-              </a:solidFill>
-            </a:endParaRPr>
-          </a:p>
-          <a:p>
-            <a:r>
-              <a:rPr lang="en-US" dirty="0">
-                <a:solidFill>
-                  <a:schemeClr val="bg1"/>
-                </a:solidFill>
-              </a:rPr>
-              <a:t>Future of project (next steps) &amp; closing thoughts.</a:t>
+              <a:t> and additional tools available therein will allow us to examine metrics on the classification task.</a:t>
             </a:r>
           </a:p>
         </p:txBody>
@@ -12999,21 +12456,7 @@
           <a:p>
             <a:r>
               <a:rPr lang="en-US" dirty="0"/>
-              <a:t>Data: Bounding Box Details </a:t>
-            </a:r>
-            <a:r>
-              <a:rPr lang="en-US" sz="2400" dirty="0"/>
-              <a:t>- </a:t>
-            </a:r>
-            <a:r>
-              <a:rPr lang="en-US" sz="2400" dirty="0">
-                <a:solidFill>
-                  <a:schemeClr val="accent1">
-                    <a:lumMod val="50000"/>
-                  </a:schemeClr>
-                </a:solidFill>
-              </a:rPr>
-              <a:t>Lauren</a:t>
+              <a:t>Data: Bounding Box Detail</a:t>
             </a:r>
             <a:endParaRPr lang="en-US" sz="2400" dirty="0"/>
           </a:p>

</xml_diff>

<commit_message>
Added homegrown logistic regression training chart to metrics slide
</commit_message>
<xml_diff>
--- a/other/Group2_Phase1.pptx
+++ b/other/Group2_Phase1.pptx
@@ -10062,9 +10062,14 @@
             <p:ph type="title"/>
           </p:nvPr>
         </p:nvSpPr>
-        <p:spPr/>
+        <p:spPr>
+          <a:xfrm>
+            <a:off x="556798" y="345588"/>
+            <a:ext cx="10571998" cy="970450"/>
+          </a:xfrm>
+        </p:spPr>
         <p:txBody>
-          <a:bodyPr/>
+          <a:bodyPr anchor="t"/>
           <a:lstStyle/>
           <a:p>
             <a:r>
@@ -10075,80 +10080,35 @@
           </a:p>
         </p:txBody>
       </p:sp>
-      <p:sp>
-        <p:nvSpPr>
-          <p:cNvPr id="3" name="Text Placeholder 2">
+      <p:pic>
+        <p:nvPicPr>
+          <p:cNvPr id="12" name="Picture 11" descr="Chart&#10;&#10;Description automatically generated">
             <a:extLst>
               <a:ext uri="{FF2B5EF4-FFF2-40B4-BE49-F238E27FC236}">
-                <a16:creationId xmlns:a16="http://schemas.microsoft.com/office/drawing/2014/main" id="{20A48431-64F0-3A41-9438-12793F22BE0C}"/>
+                <a16:creationId xmlns:a16="http://schemas.microsoft.com/office/drawing/2014/main" id="{3855AA50-30B8-B741-B36E-604C4EF7941F}"/>
               </a:ext>
             </a:extLst>
           </p:cNvPr>
-          <p:cNvSpPr>
-            <a:spLocks noGrp="1"/>
-          </p:cNvSpPr>
-          <p:nvPr>
-            <p:ph type="body" idx="1"/>
-          </p:nvPr>
-        </p:nvSpPr>
-        <p:spPr/>
-        <p:txBody>
-          <a:bodyPr/>
-          <a:lstStyle/>
-          <a:p>
-            <a:r>
-              <a:rPr lang="en-US" dirty="0"/>
-              <a:t>Planned Metrics</a:t>
-            </a:r>
-          </a:p>
-        </p:txBody>
-      </p:sp>
-      <p:sp>
-        <p:nvSpPr>
-          <p:cNvPr id="4" name="Content Placeholder 3">
-            <a:extLst>
-              <a:ext uri="{FF2B5EF4-FFF2-40B4-BE49-F238E27FC236}">
-                <a16:creationId xmlns:a16="http://schemas.microsoft.com/office/drawing/2014/main" id="{7E935AF4-F7C7-9748-99D9-82C158F6E60A}"/>
-              </a:ext>
-            </a:extLst>
-          </p:cNvPr>
-          <p:cNvSpPr>
-            <a:spLocks noGrp="1"/>
-          </p:cNvSpPr>
-          <p:nvPr>
-            <p:ph sz="half" idx="2"/>
-          </p:nvPr>
-        </p:nvSpPr>
-        <p:spPr/>
-        <p:txBody>
-          <a:bodyPr/>
-          <a:lstStyle/>
-          <a:p>
-            <a:r>
-              <a:rPr lang="en-US" dirty="0"/>
-              <a:t>Explain</a:t>
-            </a:r>
-          </a:p>
-          <a:p>
-            <a:r>
-              <a:rPr lang="en-US" dirty="0"/>
-              <a:t>Analyze</a:t>
-            </a:r>
-          </a:p>
-          <a:p>
-            <a:r>
-              <a:rPr lang="en-US" dirty="0"/>
-              <a:t>Compare</a:t>
-            </a:r>
-          </a:p>
-          <a:p>
-            <a:r>
-              <a:rPr lang="en-US" dirty="0"/>
-              <a:t>Outcomes to be discussed</a:t>
-            </a:r>
-          </a:p>
-        </p:txBody>
-      </p:sp>
+          <p:cNvPicPr>
+            <a:picLocks noChangeAspect="1"/>
+          </p:cNvPicPr>
+          <p:nvPr/>
+        </p:nvPicPr>
+        <p:blipFill rotWithShape="1">
+          <a:blip r:embed="rId3"/>
+          <a:srcRect t="3345"/>
+          <a:stretch/>
+        </p:blipFill>
+        <p:spPr>
+          <a:xfrm>
+            <a:off x="1282700" y="1689100"/>
+            <a:ext cx="9846096" cy="4823312"/>
+          </a:xfrm>
+          <a:prstGeom prst="rect">
+            <a:avLst/>
+          </a:prstGeom>
+        </p:spPr>
+      </p:pic>
     </p:spTree>
     <p:extLst>
       <p:ext uri="{BB962C8B-B14F-4D97-AF65-F5344CB8AC3E}">
@@ -10226,13 +10186,13 @@
         </p:nvSpPr>
         <p:spPr>
           <a:xfrm>
-            <a:off x="814728" y="2751138"/>
-            <a:ext cx="10567270" cy="3659674"/>
+            <a:off x="814727" y="2751138"/>
+            <a:ext cx="11197319" cy="4106862"/>
           </a:xfrm>
         </p:spPr>
         <p:txBody>
           <a:bodyPr>
-            <a:normAutofit lnSpcReduction="10000"/>
+            <a:normAutofit/>
           </a:bodyPr>
           <a:lstStyle/>
           <a:p>
@@ -10283,16 +10243,98 @@
           </a:p>
           <a:p>
             <a:r>
+              <a:rPr lang="en-US" sz="2000" b="1" dirty="0"/>
+              <a:t>Irregular image ground truth </a:t>
+            </a:r>
+            <a:r>
               <a:rPr lang="en-US" sz="2000" dirty="0"/>
-              <a:t>Irregular image results (raccoon image classified as dog, inaccurate bounding boxes, </a:t>
-            </a:r>
-            <a:r>
-              <a:rPr lang="en-US" sz="2000" dirty="0" err="1"/>
-              <a:t>etc</a:t>
-            </a:r>
-            <a:r>
-              <a:rPr lang="en-US" sz="2000" dirty="0"/>
-              <a:t>)</a:t>
+              <a:t>(raccoon image classified as dog, inaccurate bounding boxes, “depictions” which could be paintings, statues, filtered images, etc.)</a:t>
+            </a:r>
+          </a:p>
+        </p:txBody>
+      </p:sp>
+      <p:pic>
+        <p:nvPicPr>
+          <p:cNvPr id="7" name="Picture 6" descr="A picture containing text, mammal, indoor&#10;&#10;Description automatically generated">
+            <a:extLst>
+              <a:ext uri="{FF2B5EF4-FFF2-40B4-BE49-F238E27FC236}">
+                <a16:creationId xmlns:a16="http://schemas.microsoft.com/office/drawing/2014/main" id="{D1D5A68E-5BF2-8B4B-96ED-C01F176BDC1C}"/>
+              </a:ext>
+            </a:extLst>
+          </p:cNvPr>
+          <p:cNvPicPr>
+            <a:picLocks noChangeAspect="1"/>
+          </p:cNvPicPr>
+          <p:nvPr/>
+        </p:nvPicPr>
+        <p:blipFill rotWithShape="1">
+          <a:blip r:embed="rId3"/>
+          <a:srcRect b="3614"/>
+          <a:stretch/>
+        </p:blipFill>
+        <p:spPr>
+          <a:xfrm>
+            <a:off x="8456047" y="123911"/>
+            <a:ext cx="3556000" cy="2720889"/>
+          </a:xfrm>
+          <a:prstGeom prst="round2DiagRect">
+            <a:avLst>
+              <a:gd name="adj1" fmla="val 16667"/>
+              <a:gd name="adj2" fmla="val 0"/>
+            </a:avLst>
+          </a:prstGeom>
+          <a:ln w="88900" cap="sq">
+            <a:solidFill>
+              <a:srgbClr val="FFFFFF"/>
+            </a:solidFill>
+            <a:miter lim="800000"/>
+          </a:ln>
+          <a:effectLst>
+            <a:outerShdw blurRad="254000" algn="tl" rotWithShape="0">
+              <a:srgbClr val="000000">
+                <a:alpha val="43000"/>
+              </a:srgbClr>
+            </a:outerShdw>
+          </a:effectLst>
+        </p:spPr>
+      </p:pic>
+      <p:sp>
+        <p:nvSpPr>
+          <p:cNvPr id="8" name="TextBox 7">
+            <a:extLst>
+              <a:ext uri="{FF2B5EF4-FFF2-40B4-BE49-F238E27FC236}">
+                <a16:creationId xmlns:a16="http://schemas.microsoft.com/office/drawing/2014/main" id="{2E8FC593-31CB-9E41-A2D2-BFC2847188C2}"/>
+              </a:ext>
+            </a:extLst>
+          </p:cNvPr>
+          <p:cNvSpPr txBox="1"/>
+          <p:nvPr/>
+        </p:nvSpPr>
+        <p:spPr>
+          <a:xfrm>
+            <a:off x="7292598" y="701580"/>
+            <a:ext cx="1066800" cy="461665"/>
+          </a:xfrm>
+          <a:prstGeom prst="rect">
+            <a:avLst/>
+          </a:prstGeom>
+          <a:noFill/>
+        </p:spPr>
+        <p:txBody>
+          <a:bodyPr wrap="square" rtlCol="0">
+            <a:spAutoFit/>
+          </a:bodyPr>
+          <a:lstStyle/>
+          <a:p>
+            <a:r>
+              <a:rPr lang="en-US" sz="2400" b="1" dirty="0">
+                <a:solidFill>
+                  <a:schemeClr val="accent1">
+                    <a:lumMod val="50000"/>
+                  </a:schemeClr>
+                </a:solidFill>
+              </a:rPr>
+              <a:t>dog?</a:t>
             </a:r>
           </a:p>
         </p:txBody>

</xml_diff>

<commit_message>
Add slide 11 detail, table
</commit_message>
<xml_diff>
--- a/other/Group2_Phase1.pptx
+++ b/other/Group2_Phase1.pptx
@@ -4309,7 +4309,7 @@
           <a:effectLst/>
           <a:extLst>
             <a:ext uri="{91240B29-F687-4f45-9708-019B960494DF}">
-              <a14:hiddenLine xmlns:a14="http://schemas.microsoft.com/office/drawing/2010/main" xmlns="" w="9525">
+              <a14:hiddenLine xmlns="" xmlns:a14="http://schemas.microsoft.com/office/drawing/2010/main" w="9525">
                 <a:solidFill>
                   <a:srgbClr val="000000"/>
                 </a:solidFill>
@@ -5831,7 +5831,7 @@
           <a:ln/>
           <a:extLst>
             <a:ext uri="{91240B29-F687-4f45-9708-019B960494DF}">
-              <a14:hiddenLine xmlns:a14="http://schemas.microsoft.com/office/drawing/2010/main" xmlns="" w="9525">
+              <a14:hiddenLine xmlns="" xmlns:a14="http://schemas.microsoft.com/office/drawing/2010/main" w="9525">
                 <a:solidFill>
                   <a:srgbClr val="000000"/>
                 </a:solidFill>
@@ -6106,7 +6106,7 @@
           <a:ln/>
           <a:extLst>
             <a:ext uri="{91240B29-F687-4f45-9708-019B960494DF}">
-              <a14:hiddenLine xmlns:a14="http://schemas.microsoft.com/office/drawing/2010/main" xmlns="" w="9525">
+              <a14:hiddenLine xmlns="" xmlns:a14="http://schemas.microsoft.com/office/drawing/2010/main" w="9525">
                 <a:solidFill>
                   <a:srgbClr val="000000"/>
                 </a:solidFill>
@@ -6389,7 +6389,7 @@
           <a:ln/>
           <a:extLst>
             <a:ext uri="{91240B29-F687-4f45-9708-019B960494DF}">
-              <a14:hiddenLine xmlns:a14="http://schemas.microsoft.com/office/drawing/2010/main" xmlns="" w="9525">
+              <a14:hiddenLine xmlns="" xmlns:a14="http://schemas.microsoft.com/office/drawing/2010/main" w="9525">
                 <a:solidFill>
                   <a:srgbClr val="000000"/>
                 </a:solidFill>
@@ -7015,7 +7015,7 @@
           <a:ln/>
           <a:extLst>
             <a:ext uri="{91240B29-F687-4f45-9708-019B960494DF}">
-              <a14:hiddenLine xmlns:a14="http://schemas.microsoft.com/office/drawing/2010/main" xmlns="" w="9525">
+              <a14:hiddenLine xmlns="" xmlns:a14="http://schemas.microsoft.com/office/drawing/2010/main" w="9525">
                 <a:solidFill>
                   <a:srgbClr val="000000"/>
                 </a:solidFill>
@@ -7354,7 +7354,7 @@
           <a:ln/>
           <a:extLst>
             <a:ext uri="{91240B29-F687-4f45-9708-019B960494DF}">
-              <a14:hiddenLine xmlns:a14="http://schemas.microsoft.com/office/drawing/2010/main" xmlns="" w="9525">
+              <a14:hiddenLine xmlns="" xmlns:a14="http://schemas.microsoft.com/office/drawing/2010/main" w="9525">
                 <a:solidFill>
                   <a:srgbClr val="000000"/>
                 </a:solidFill>
@@ -7831,7 +7831,7 @@
           <a:ln/>
           <a:extLst>
             <a:ext uri="{91240B29-F687-4f45-9708-019B960494DF}">
-              <a14:hiddenLine xmlns:a14="http://schemas.microsoft.com/office/drawing/2010/main" xmlns="" w="9525">
+              <a14:hiddenLine xmlns="" xmlns:a14="http://schemas.microsoft.com/office/drawing/2010/main" w="9525">
                 <a:solidFill>
                   <a:srgbClr val="000000"/>
                 </a:solidFill>
@@ -8260,7 +8260,7 @@
           <a:ln/>
           <a:extLst>
             <a:ext uri="{91240B29-F687-4f45-9708-019B960494DF}">
-              <a14:hiddenLine xmlns:a14="http://schemas.microsoft.com/office/drawing/2010/main" xmlns="" w="9525">
+              <a14:hiddenLine xmlns="" xmlns:a14="http://schemas.microsoft.com/office/drawing/2010/main" w="9525">
                 <a:solidFill>
                   <a:srgbClr val="000000"/>
                 </a:solidFill>
@@ -9576,14 +9576,8 @@
               <a:t>Left to right: 	Ben Perkins				 	</a:t>
             </a:r>
             <a:r>
-              <a:rPr lang="en-US" dirty="0">
-                <a:hlinkClick r:id="rId3"/>
-              </a:rPr>
-              <a:t>perkins.benjamin@gmail.com</a:t>
-            </a:r>
-            <a:r>
-              <a:rPr lang="en-US" dirty="0"/>
-              <a:t> </a:t>
+              <a:rPr lang="en-US" dirty="0" err="1"/>
+              <a:t>benperki@iu.edu</a:t>
             </a:r>
             <a:br>
               <a:rPr lang="en-US" dirty="0"/>
@@ -9594,7 +9588,7 @@
             </a:r>
             <a:r>
               <a:rPr lang="en-US" dirty="0">
-                <a:hlinkClick r:id="rId4"/>
+                <a:hlinkClick r:id="rId3"/>
               </a:rPr>
               <a:t>laurenmadar@gmail.com</a:t>
             </a:r>
@@ -9615,7 +9609,7 @@
             </a:r>
             <a:r>
               <a:rPr lang="en-US" dirty="0">
-                <a:hlinkClick r:id="rId5"/>
+                <a:hlinkClick r:id="rId4"/>
               </a:rPr>
               <a:t>mwalimbe@iu.edu</a:t>
             </a:r>
@@ -9648,7 +9642,7 @@
             </a:r>
             <a:r>
               <a:rPr lang="en-US" dirty="0">
-                <a:hlinkClick r:id="rId6"/>
+                <a:hlinkClick r:id="rId5"/>
               </a:rPr>
               <a:t>s.barghan@gmail.com</a:t>
             </a:r>
@@ -9694,7 +9688,7 @@
             <p:nvPr/>
           </p:nvPicPr>
           <p:blipFill rotWithShape="1">
-            <a:blip r:embed="rId7"/>
+            <a:blip r:embed="rId6"/>
             <a:srcRect b="17642"/>
             <a:stretch/>
           </p:blipFill>
@@ -9723,7 +9717,7 @@
             <p:nvPr/>
           </p:nvPicPr>
           <p:blipFill rotWithShape="1">
-            <a:blip r:embed="rId7"/>
+            <a:blip r:embed="rId6"/>
             <a:srcRect l="24546" t="62124" r="50832" b="17642"/>
             <a:stretch/>
           </p:blipFill>
@@ -9752,7 +9746,7 @@
             <p:nvPr/>
           </p:nvPicPr>
           <p:blipFill rotWithShape="1">
-            <a:blip r:embed="rId7"/>
+            <a:blip r:embed="rId6"/>
             <a:srcRect t="61690" r="75378" b="18076"/>
             <a:stretch/>
           </p:blipFill>
@@ -10101,14 +10095,118 @@
         </p:blipFill>
         <p:spPr>
           <a:xfrm>
-            <a:off x="1282700" y="1689100"/>
-            <a:ext cx="9846096" cy="4823312"/>
+            <a:off x="190500" y="2108200"/>
+            <a:ext cx="5905500" cy="3413612"/>
           </a:xfrm>
           <a:prstGeom prst="rect">
             <a:avLst/>
           </a:prstGeom>
         </p:spPr>
       </p:pic>
+      <p:pic>
+        <p:nvPicPr>
+          <p:cNvPr id="4" name="Picture 3" descr="Table&#10;&#10;Description automatically generated">
+            <a:extLst>
+              <a:ext uri="{FF2B5EF4-FFF2-40B4-BE49-F238E27FC236}">
+                <a16:creationId xmlns:a16="http://schemas.microsoft.com/office/drawing/2014/main" id="{DA6B71DC-553F-154A-83BE-A9DC9B6293E3}"/>
+              </a:ext>
+            </a:extLst>
+          </p:cNvPr>
+          <p:cNvPicPr>
+            <a:picLocks noChangeAspect="1"/>
+          </p:cNvPicPr>
+          <p:nvPr/>
+        </p:nvPicPr>
+        <p:blipFill>
+          <a:blip r:embed="rId4"/>
+          <a:stretch>
+            <a:fillRect/>
+          </a:stretch>
+        </p:blipFill>
+        <p:spPr>
+          <a:xfrm>
+            <a:off x="6540500" y="2087806"/>
+            <a:ext cx="5346700" cy="2827094"/>
+          </a:xfrm>
+          <a:prstGeom prst="rect">
+            <a:avLst/>
+          </a:prstGeom>
+        </p:spPr>
+      </p:pic>
+      <p:sp>
+        <p:nvSpPr>
+          <p:cNvPr id="5" name="TextBox 4">
+            <a:extLst>
+              <a:ext uri="{FF2B5EF4-FFF2-40B4-BE49-F238E27FC236}">
+                <a16:creationId xmlns:a16="http://schemas.microsoft.com/office/drawing/2014/main" id="{5CCFA8BA-102A-814F-A288-A982069E7238}"/>
+              </a:ext>
+            </a:extLst>
+          </p:cNvPr>
+          <p:cNvSpPr txBox="1"/>
+          <p:nvPr/>
+        </p:nvSpPr>
+        <p:spPr>
+          <a:xfrm>
+            <a:off x="6557963" y="5157788"/>
+            <a:ext cx="5057775" cy="369332"/>
+          </a:xfrm>
+          <a:prstGeom prst="rect">
+            <a:avLst/>
+          </a:prstGeom>
+          <a:noFill/>
+        </p:spPr>
+        <p:txBody>
+          <a:bodyPr wrap="square" rtlCol="0">
+            <a:spAutoFit/>
+          </a:bodyPr>
+          <a:lstStyle/>
+          <a:p>
+            <a:r>
+              <a:rPr lang="en-US" dirty="0"/>
+              <a:t>Linear Model Comparison with MSE</a:t>
+            </a:r>
+          </a:p>
+        </p:txBody>
+      </p:sp>
+      <p:sp>
+        <p:nvSpPr>
+          <p:cNvPr id="6" name="TextBox 5">
+            <a:extLst>
+              <a:ext uri="{FF2B5EF4-FFF2-40B4-BE49-F238E27FC236}">
+                <a16:creationId xmlns:a16="http://schemas.microsoft.com/office/drawing/2014/main" id="{C69F0322-2477-E547-80D9-C01F408423B6}"/>
+              </a:ext>
+            </a:extLst>
+          </p:cNvPr>
+          <p:cNvSpPr txBox="1"/>
+          <p:nvPr/>
+        </p:nvSpPr>
+        <p:spPr>
+          <a:xfrm>
+            <a:off x="190500" y="5715000"/>
+            <a:ext cx="5905500" cy="369332"/>
+          </a:xfrm>
+          <a:prstGeom prst="rect">
+            <a:avLst/>
+          </a:prstGeom>
+          <a:noFill/>
+        </p:spPr>
+        <p:txBody>
+          <a:bodyPr wrap="square" rtlCol="0">
+            <a:spAutoFit/>
+          </a:bodyPr>
+          <a:lstStyle/>
+          <a:p>
+            <a:r>
+              <a:rPr lang="en-US" dirty="0"/>
+              <a:t>Loss and Cost over Epochs with </a:t>
+            </a:r>
+            <a:r>
+              <a:rPr lang="en-US"/>
+              <a:t>Logistic Regression</a:t>
+            </a:r>
+          </a:p>
+        </p:txBody>
+      </p:sp>
     </p:spTree>
     <p:extLst>
       <p:ext uri="{BB962C8B-B14F-4D97-AF65-F5344CB8AC3E}">

</xml_diff>